<commit_message>
Updated  the title of presentation
</commit_message>
<xml_diff>
--- a/Presentation Elementary Engineers .pptx
+++ b/Presentation Elementary Engineers .pptx
@@ -287,7 +287,7 @@
           <a:p>
             <a:fld id="{48A87A34-81AB-432B-8DAE-1953F412C126}" type="datetimeFigureOut">
               <a:rPr lang="en-US" dirty="0"/>
-              <a:t>2/16/16</a:t>
+              <a:t>2/17/16</a:t>
             </a:fld>
             <a:endParaRPr lang="en-US" dirty="0"/>
           </a:p>
@@ -549,7 +549,7 @@
           <a:p>
             <a:fld id="{48A87A34-81AB-432B-8DAE-1953F412C126}" type="datetimeFigureOut">
               <a:rPr lang="en-US" dirty="0"/>
-              <a:t>2/16/16</a:t>
+              <a:t>2/17/16</a:t>
             </a:fld>
             <a:endParaRPr lang="en-US" dirty="0"/>
           </a:p>
@@ -776,7 +776,7 @@
             <a:fld id="{48A87A34-81AB-432B-8DAE-1953F412C126}" type="datetimeFigureOut">
               <a:rPr lang="en-US" dirty="0"/>
               <a:pPr/>
-              <a:t>2/16/16</a:t>
+              <a:t>2/17/16</a:t>
             </a:fld>
             <a:endParaRPr lang="en-US" dirty="0"/>
           </a:p>
@@ -1082,7 +1082,7 @@
             <a:fld id="{48A87A34-81AB-432B-8DAE-1953F412C126}" type="datetimeFigureOut">
               <a:rPr lang="en-US" dirty="0"/>
               <a:pPr/>
-              <a:t>2/16/16</a:t>
+              <a:t>2/17/16</a:t>
             </a:fld>
             <a:endParaRPr lang="en-US" dirty="0"/>
           </a:p>
@@ -1551,7 +1551,7 @@
             <a:fld id="{48A87A34-81AB-432B-8DAE-1953F412C126}" type="datetimeFigureOut">
               <a:rPr lang="en-US" dirty="0"/>
               <a:pPr/>
-              <a:t>2/16/16</a:t>
+              <a:t>2/17/16</a:t>
             </a:fld>
             <a:endParaRPr lang="en-US" dirty="0"/>
           </a:p>
@@ -2093,7 +2093,7 @@
           <a:p>
             <a:fld id="{48A87A34-81AB-432B-8DAE-1953F412C126}" type="datetimeFigureOut">
               <a:rPr lang="en-US" dirty="0"/>
-              <a:t>2/16/16</a:t>
+              <a:t>2/17/16</a:t>
             </a:fld>
             <a:endParaRPr lang="en-US" dirty="0"/>
           </a:p>
@@ -2862,7 +2862,7 @@
           <a:p>
             <a:fld id="{48A87A34-81AB-432B-8DAE-1953F412C126}" type="datetimeFigureOut">
               <a:rPr lang="en-US" dirty="0"/>
-              <a:t>2/16/16</a:t>
+              <a:t>2/17/16</a:t>
             </a:fld>
             <a:endParaRPr lang="en-US" dirty="0"/>
           </a:p>
@@ -3032,7 +3032,7 @@
           <a:p>
             <a:fld id="{48A87A34-81AB-432B-8DAE-1953F412C126}" type="datetimeFigureOut">
               <a:rPr lang="en-US" dirty="0"/>
-              <a:t>2/16/16</a:t>
+              <a:t>2/17/16</a:t>
             </a:fld>
             <a:endParaRPr lang="en-US" dirty="0"/>
           </a:p>
@@ -3251,7 +3251,7 @@
             <a:fld id="{48A87A34-81AB-432B-8DAE-1953F412C126}" type="datetimeFigureOut">
               <a:rPr lang="en-US" dirty="0"/>
               <a:pPr/>
-              <a:t>2/16/16</a:t>
+              <a:t>2/17/16</a:t>
             </a:fld>
             <a:endParaRPr lang="en-US" dirty="0"/>
           </a:p>
@@ -3426,7 +3426,7 @@
           <a:p>
             <a:fld id="{48A87A34-81AB-432B-8DAE-1953F412C126}" type="datetimeFigureOut">
               <a:rPr lang="en-US" dirty="0"/>
-              <a:t>2/16/16</a:t>
+              <a:t>2/17/16</a:t>
             </a:fld>
             <a:endParaRPr lang="en-US" dirty="0"/>
           </a:p>
@@ -3711,7 +3711,7 @@
             <a:fld id="{48A87A34-81AB-432B-8DAE-1953F412C126}" type="datetimeFigureOut">
               <a:rPr lang="en-US" dirty="0"/>
               <a:pPr/>
-              <a:t>2/16/16</a:t>
+              <a:t>2/17/16</a:t>
             </a:fld>
             <a:endParaRPr lang="en-US" dirty="0"/>
           </a:p>
@@ -3948,7 +3948,7 @@
           <a:p>
             <a:fld id="{48A87A34-81AB-432B-8DAE-1953F412C126}" type="datetimeFigureOut">
               <a:rPr lang="en-US" dirty="0"/>
-              <a:t>2/16/16</a:t>
+              <a:t>2/17/16</a:t>
             </a:fld>
             <a:endParaRPr lang="en-US" dirty="0"/>
           </a:p>
@@ -4322,7 +4322,7 @@
           <a:p>
             <a:fld id="{48A87A34-81AB-432B-8DAE-1953F412C126}" type="datetimeFigureOut">
               <a:rPr lang="en-US" dirty="0"/>
-              <a:t>2/16/16</a:t>
+              <a:t>2/17/16</a:t>
             </a:fld>
             <a:endParaRPr lang="en-US" dirty="0"/>
           </a:p>
@@ -4435,7 +4435,7 @@
           <a:p>
             <a:fld id="{48A87A34-81AB-432B-8DAE-1953F412C126}" type="datetimeFigureOut">
               <a:rPr lang="en-US" dirty="0"/>
-              <a:t>2/16/16</a:t>
+              <a:t>2/17/16</a:t>
             </a:fld>
             <a:endParaRPr lang="en-US" dirty="0"/>
           </a:p>
@@ -4525,7 +4525,7 @@
           <a:p>
             <a:fld id="{48A87A34-81AB-432B-8DAE-1953F412C126}" type="datetimeFigureOut">
               <a:rPr lang="en-US" dirty="0"/>
-              <a:t>2/16/16</a:t>
+              <a:t>2/17/16</a:t>
             </a:fld>
             <a:endParaRPr lang="en-US" dirty="0"/>
           </a:p>
@@ -4769,7 +4769,7 @@
           <a:p>
             <a:fld id="{48A87A34-81AB-432B-8DAE-1953F412C126}" type="datetimeFigureOut">
               <a:rPr lang="en-US" dirty="0"/>
-              <a:t>2/16/16</a:t>
+              <a:t>2/17/16</a:t>
             </a:fld>
             <a:endParaRPr lang="en-US" dirty="0"/>
           </a:p>
@@ -5021,7 +5021,7 @@
           <a:p>
             <a:fld id="{48A87A34-81AB-432B-8DAE-1953F412C126}" type="datetimeFigureOut">
               <a:rPr lang="en-US" dirty="0"/>
-              <a:t>2/16/16</a:t>
+              <a:t>2/17/16</a:t>
             </a:fld>
             <a:endParaRPr lang="en-US" dirty="0"/>
           </a:p>
@@ -5260,7 +5260,7 @@
             <a:fld id="{48A87A34-81AB-432B-8DAE-1953F412C126}" type="datetimeFigureOut">
               <a:rPr lang="en-US" dirty="0"/>
               <a:pPr/>
-              <a:t>2/16/16</a:t>
+              <a:t>2/17/16</a:t>
             </a:fld>
             <a:endParaRPr lang="en-US" dirty="0"/>
           </a:p>
@@ -5677,45 +5677,109 @@
             <p:ph type="ctrTitle"/>
           </p:nvPr>
         </p:nvSpPr>
-        <p:spPr/>
+        <p:spPr>
+          <a:xfrm rot="10800000" flipV="1">
+            <a:off x="1371600" y="852359"/>
+            <a:ext cx="9448800" cy="3739936"/>
+          </a:xfrm>
+        </p:spPr>
         <p:txBody>
           <a:bodyPr>
-            <a:normAutofit fontScale="90000"/>
+            <a:normAutofit/>
           </a:bodyPr>
           <a:lstStyle/>
           <a:p>
+            <a:pPr algn="ctr"/>
+            <a:r>
+              <a:rPr lang="en-US" sz="4800" dirty="0" smtClean="0"/>
+              <a:t>Software Requirements specification </a:t>
+            </a:r>
+            <a:r>
+              <a:rPr lang="en-US" sz="4800" dirty="0" smtClean="0"/>
+              <a:t/>
+            </a:r>
+            <a:br>
+              <a:rPr lang="en-US" sz="4800" dirty="0" smtClean="0"/>
+            </a:br>
+            <a:r>
+              <a:rPr lang="en-US" sz="4800" dirty="0" smtClean="0"/>
+              <a:t>for </a:t>
+            </a:r>
+            <a:br>
+              <a:rPr lang="en-US" sz="4800" dirty="0" smtClean="0"/>
+            </a:br>
+            <a:r>
+              <a:rPr lang="en-US" sz="4800" dirty="0" smtClean="0"/>
+              <a:t>Fraction Worksheet Creator</a:t>
+            </a:r>
+            <a:endParaRPr lang="en-US" sz="4800" dirty="0"/>
+          </a:p>
+        </p:txBody>
+      </p:sp>
+      <p:sp>
+        <p:nvSpPr>
+          <p:cNvPr id="3" name="Subtitle 2"/>
+          <p:cNvSpPr>
+            <a:spLocks noGrp="1"/>
+          </p:cNvSpPr>
+          <p:nvPr>
+            <p:ph type="subTitle" idx="1"/>
+          </p:nvPr>
+        </p:nvSpPr>
+        <p:spPr>
+          <a:xfrm>
+            <a:off x="6594032" y="4815064"/>
+            <a:ext cx="4819385" cy="1882031"/>
+          </a:xfrm>
+        </p:spPr>
+        <p:txBody>
+          <a:bodyPr>
+            <a:normAutofit lnSpcReduction="10000"/>
+          </a:bodyPr>
+          <a:lstStyle/>
+          <a:p>
             <a:r>
               <a:rPr lang="en-US" dirty="0" smtClean="0"/>
-              <a:t>Software Requirements specification </a:t>
-            </a:r>
-            <a:endParaRPr lang="en-US" dirty="0"/>
-          </a:p>
-        </p:txBody>
-      </p:sp>
-      <p:sp>
-        <p:nvSpPr>
-          <p:cNvPr id="3" name="Subtitle 2"/>
-          <p:cNvSpPr>
-            <a:spLocks noGrp="1"/>
-          </p:cNvSpPr>
-          <p:nvPr>
-            <p:ph type="subTitle" idx="1"/>
-          </p:nvPr>
-        </p:nvSpPr>
-        <p:spPr/>
-        <p:txBody>
-          <a:bodyPr/>
-          <a:lstStyle/>
+              <a:t>Prepared by Elementary Engineers</a:t>
+            </a:r>
+          </a:p>
           <a:p>
             <a:r>
               <a:rPr lang="en-US" dirty="0" smtClean="0"/>
-              <a:t>BY</a:t>
-            </a:r>
-            <a:r>
-              <a:rPr lang="en-US" smtClean="0"/>
-              <a:t>: Elementary Engineers</a:t>
-            </a:r>
-            <a:endParaRPr lang="en-US"/>
+              <a:t>Olga Sheehan, Sara </a:t>
+            </a:r>
+            <a:r>
+              <a:rPr lang="en-US" dirty="0" err="1" smtClean="0"/>
+              <a:t>Hakkoum</a:t>
+            </a:r>
+            <a:r>
+              <a:rPr lang="en-US" dirty="0" smtClean="0"/>
+              <a:t>,</a:t>
+            </a:r>
+          </a:p>
+          <a:p>
+            <a:r>
+              <a:rPr lang="en-US" dirty="0" smtClean="0"/>
+              <a:t>Eric Homes, Ethan </a:t>
+            </a:r>
+            <a:r>
+              <a:rPr lang="en-US" dirty="0" err="1" smtClean="0"/>
+              <a:t>Feiro</a:t>
+            </a:r>
+            <a:endParaRPr lang="en-US" dirty="0" smtClean="0"/>
+          </a:p>
+          <a:p>
+            <a:endParaRPr lang="en-US" dirty="0" smtClean="0"/>
+          </a:p>
+          <a:p>
+            <a:r>
+              <a:rPr lang="en-US" dirty="0" smtClean="0"/>
+              <a:t>Framingham State University</a:t>
+            </a:r>
+            <a:endParaRPr lang="en-US" dirty="0"/>
+          </a:p>
+          <a:p>
+            <a:endParaRPr lang="en-US" dirty="0"/>
           </a:p>
         </p:txBody>
       </p:sp>
@@ -5943,8 +6007,8 @@
         </p:blipFill>
         <p:spPr>
           <a:xfrm>
-            <a:off x="2346960" y="2787968"/>
-            <a:ext cx="6126480" cy="2450465"/>
+            <a:off x="1678135" y="2787967"/>
+            <a:ext cx="8436037" cy="3430717"/>
           </a:xfrm>
           <a:prstGeom prst="rect">
             <a:avLst/>
@@ -6021,7 +6085,19 @@
           <a:p>
             <a:r>
               <a:rPr lang="en-US" dirty="0" smtClean="0"/>
-              <a:t>1.1 Purpose--(FWC) software</a:t>
+              <a:t>1.1 Purpose</a:t>
+            </a:r>
+            <a:r>
+              <a:rPr lang="en-US" smtClean="0"/>
+              <a:t>-</a:t>
+            </a:r>
+            <a:r>
+              <a:rPr lang="en-US" smtClean="0"/>
+              <a:t>-Fraction Worksheet Creator  </a:t>
+            </a:r>
+            <a:r>
+              <a:rPr lang="en-US" dirty="0" smtClean="0"/>
+              <a:t>software</a:t>
             </a:r>
           </a:p>
           <a:p>
@@ -7121,7 +7197,7 @@
     </a:clrScheme>
     <a:fontScheme name="Vapor Trail">
       <a:majorFont>
-        <a:latin typeface="Century Gothic" panose="020B0502020202020204"/>
+        <a:latin typeface="Century Gothic"/>
         <a:ea typeface=""/>
         <a:cs typeface=""/>
         <a:font script="Jpan" typeface="ＭＳ Ｐゴシック"/>
@@ -7156,7 +7232,7 @@
         <a:font script="Geor" typeface="Sylfaen"/>
       </a:majorFont>
       <a:minorFont>
-        <a:latin typeface="Century Gothic" panose="020B0502020202020204"/>
+        <a:latin typeface="Century Gothic"/>
         <a:ea typeface=""/>
         <a:cs typeface=""/>
         <a:font script="Jpan" typeface="ＭＳ Ｐゴシック"/>
@@ -7342,7 +7418,7 @@
   <a:extraClrSchemeLst/>
   <a:extLst>
     <a:ext uri="{05A4C25C-085E-4340-85A3-A5531E510DB2}">
-      <thm15:themeFamily xmlns:thm15="http://schemas.microsoft.com/office/thememl/2012/main" name="Vapor Trail" id="{4FDF2955-7D9C-493C-B9F9-C205151B46CD}" vid="{8F31A783-2159-4870-BC29-2BA7D038EA44}"/>
+      <thm15:themeFamily xmlns:thm15="http://schemas.microsoft.com/office/thememl/2012/main" xmlns="" name="Vapor Trail" id="{4FDF2955-7D9C-493C-B9F9-C205151B46CD}" vid="{8F31A783-2159-4870-BC29-2BA7D038EA44}"/>
     </a:ext>
   </a:extLst>
 </a:theme>

</xml_diff>

<commit_message>
Updated the Other requirements slide
</commit_message>
<xml_diff>
--- a/Presentation Elementary Engineers .pptx
+++ b/Presentation Elementary Engineers .pptx
@@ -5694,10 +5694,6 @@
               <a:rPr lang="en-US" sz="4800" dirty="0" smtClean="0"/>
               <a:t>Software Requirements specification </a:t>
             </a:r>
-            <a:r>
-              <a:rPr lang="en-US" sz="4800" dirty="0" smtClean="0"/>
-              <a:t/>
-            </a:r>
             <a:br>
               <a:rPr lang="en-US" sz="4800" dirty="0" smtClean="0"/>
             </a:br>
@@ -5740,8 +5736,13 @@
           <a:p>
             <a:r>
               <a:rPr lang="en-US" dirty="0" smtClean="0"/>
-              <a:t>Prepared by Elementary Engineers</a:t>
-            </a:r>
+              <a:t>Prepared by Elementary </a:t>
+            </a:r>
+            <a:r>
+              <a:rPr lang="en-US" dirty="0" smtClean="0"/>
+              <a:t>Engineers: </a:t>
+            </a:r>
+            <a:endParaRPr lang="en-US" dirty="0" smtClean="0"/>
           </a:p>
           <a:p>
             <a:r>
@@ -5760,18 +5761,23 @@
           <a:p>
             <a:r>
               <a:rPr lang="en-US" dirty="0" smtClean="0"/>
-              <a:t>Eric Homes, Ethan </a:t>
+              <a:t>Eric </a:t>
+            </a:r>
+            <a:r>
+              <a:rPr lang="en-US" dirty="0" smtClean="0"/>
+              <a:t>Holm, </a:t>
+            </a:r>
+            <a:r>
+              <a:rPr lang="en-US" dirty="0" smtClean="0"/>
+              <a:t>Ethan </a:t>
             </a:r>
             <a:r>
               <a:rPr lang="en-US" dirty="0" err="1" smtClean="0"/>
-              <a:t>Feiro</a:t>
+              <a:t>Fieiro</a:t>
             </a:r>
             <a:endParaRPr lang="en-US" dirty="0" smtClean="0"/>
           </a:p>
           <a:p>
-            <a:endParaRPr lang="en-US" dirty="0" smtClean="0"/>
-          </a:p>
-          <a:p>
             <a:r>
               <a:rPr lang="en-US" dirty="0" smtClean="0"/>
               <a:t>Framingham State University</a:t>
@@ -5779,6 +5785,10 @@
             <a:endParaRPr lang="en-US" dirty="0"/>
           </a:p>
           <a:p>
+            <a:r>
+              <a:rPr lang="en-US" smtClean="0"/>
+              <a:t>2016</a:t>
+            </a:r>
             <a:endParaRPr lang="en-US" dirty="0"/>
           </a:p>
         </p:txBody>
@@ -6085,19 +6095,7 @@
           <a:p>
             <a:r>
               <a:rPr lang="en-US" dirty="0" smtClean="0"/>
-              <a:t>1.1 Purpose</a:t>
-            </a:r>
-            <a:r>
-              <a:rPr lang="en-US" smtClean="0"/>
-              <a:t>-</a:t>
-            </a:r>
-            <a:r>
-              <a:rPr lang="en-US" smtClean="0"/>
-              <a:t>-Fraction Worksheet Creator  </a:t>
-            </a:r>
-            <a:r>
-              <a:rPr lang="en-US" dirty="0" smtClean="0"/>
-              <a:t>software</a:t>
+              <a:t>1.1 Purpose--Fraction Worksheet Creator  software</a:t>
             </a:r>
           </a:p>
           <a:p>
@@ -7418,7 +7416,7 @@
   <a:extraClrSchemeLst/>
   <a:extLst>
     <a:ext uri="{05A4C25C-085E-4340-85A3-A5531E510DB2}">
-      <thm15:themeFamily xmlns:thm15="http://schemas.microsoft.com/office/thememl/2012/main" xmlns="" name="Vapor Trail" id="{4FDF2955-7D9C-493C-B9F9-C205151B46CD}" vid="{8F31A783-2159-4870-BC29-2BA7D038EA44}"/>
+      <thm15:themeFamily xmlns="" xmlns:thm15="http://schemas.microsoft.com/office/thememl/2012/main" name="Vapor Trail" id="{4FDF2955-7D9C-493C-B9F9-C205151B46CD}" vid="{8F31A783-2159-4870-BC29-2BA7D038EA44}"/>
     </a:ext>
   </a:extLst>
 </a:theme>

</xml_diff>

<commit_message>
Added the content to the slide Introduction and the diagram to the Description Slide
</commit_message>
<xml_diff>
--- a/Presentation Elementary Engineers .pptx
+++ b/Presentation Elementary Engineers .pptx
@@ -5692,7 +5692,19 @@
             <a:pPr algn="ctr"/>
             <a:r>
               <a:rPr lang="en-US" sz="4800" dirty="0" smtClean="0"/>
-              <a:t>Software Requirements specification </a:t>
+              <a:t>Software Requirements </a:t>
+            </a:r>
+            <a:r>
+              <a:rPr lang="en-US" sz="4800" smtClean="0"/>
+              <a:t>specification </a:t>
+            </a:r>
+            <a:r>
+              <a:rPr lang="en-US" sz="4800" smtClean="0"/>
+              <a:t>(SRS)</a:t>
+            </a:r>
+            <a:r>
+              <a:rPr lang="en-US" sz="4800" dirty="0" smtClean="0"/>
+              <a:t/>
             </a:r>
             <a:br>
               <a:rPr lang="en-US" sz="4800" dirty="0" smtClean="0"/>
@@ -5736,13 +5748,8 @@
           <a:p>
             <a:r>
               <a:rPr lang="en-US" dirty="0" smtClean="0"/>
-              <a:t>Prepared by Elementary </a:t>
-            </a:r>
-            <a:r>
-              <a:rPr lang="en-US" dirty="0" smtClean="0"/>
-              <a:t>Engineers: </a:t>
-            </a:r>
-            <a:endParaRPr lang="en-US" dirty="0" smtClean="0"/>
+              <a:t>Prepared by Elementary Engineers: </a:t>
+            </a:r>
           </a:p>
           <a:p>
             <a:r>
@@ -5761,15 +5768,7 @@
           <a:p>
             <a:r>
               <a:rPr lang="en-US" dirty="0" smtClean="0"/>
-              <a:t>Eric </a:t>
-            </a:r>
-            <a:r>
-              <a:rPr lang="en-US" dirty="0" smtClean="0"/>
-              <a:t>Holm, </a:t>
-            </a:r>
-            <a:r>
-              <a:rPr lang="en-US" dirty="0" smtClean="0"/>
-              <a:t>Ethan </a:t>
+              <a:t>Eric Holm, Ethan </a:t>
             </a:r>
             <a:r>
               <a:rPr lang="en-US" dirty="0" err="1" smtClean="0"/>
@@ -6065,7 +6064,12 @@
             <p:ph type="title"/>
           </p:nvPr>
         </p:nvSpPr>
-        <p:spPr/>
+        <p:spPr>
+          <a:xfrm>
+            <a:off x="2895600" y="223095"/>
+            <a:ext cx="8610600" cy="1063988"/>
+          </a:xfrm>
+        </p:spPr>
         <p:txBody>
           <a:bodyPr/>
           <a:lstStyle/>
@@ -6088,27 +6092,115 @@
             <p:ph idx="1"/>
           </p:nvPr>
         </p:nvSpPr>
-        <p:spPr/>
-        <p:txBody>
-          <a:bodyPr/>
-          <a:lstStyle/>
-          <a:p>
+        <p:spPr>
+          <a:xfrm>
+            <a:off x="685800" y="1149793"/>
+            <a:ext cx="10820400" cy="5165487"/>
+          </a:xfrm>
+        </p:spPr>
+        <p:txBody>
+          <a:bodyPr>
+            <a:normAutofit lnSpcReduction="10000"/>
+          </a:bodyPr>
+          <a:lstStyle/>
+          <a:p>
+            <a:r>
+              <a:rPr lang="en-US" b="1" u="sng" dirty="0" smtClean="0"/>
+              <a:t>1.1 </a:t>
+            </a:r>
+            <a:r>
+              <a:rPr lang="en-US" b="1" u="sng" dirty="0" smtClean="0"/>
+              <a:t>Purpose </a:t>
+            </a:r>
+          </a:p>
+          <a:p>
+            <a:pPr marL="0" indent="0">
+              <a:buNone/>
+            </a:pPr>
+            <a:endParaRPr lang="en-US" dirty="0"/>
+          </a:p>
+          <a:p>
+            <a:pPr lvl="1"/>
+            <a:r>
+              <a:rPr lang="en-US" dirty="0"/>
+              <a:t>give a detailed description of the requirements for the “Fraction Worksheet Creator” (FWC) software</a:t>
+            </a:r>
+            <a:r>
+              <a:rPr lang="en-US" dirty="0"/>
+              <a:t> </a:t>
+            </a:r>
+            <a:endParaRPr lang="en-US" dirty="0" smtClean="0"/>
+          </a:p>
+          <a:p>
+            <a:pPr lvl="1"/>
+            <a:r>
+              <a:rPr lang="en-US" dirty="0"/>
+              <a:t>explain system constraints, interface and interactions with other external applications</a:t>
+            </a:r>
+            <a:r>
+              <a:rPr lang="en-US" dirty="0"/>
+              <a:t> </a:t>
+            </a:r>
+            <a:endParaRPr lang="en-US" dirty="0" smtClean="0"/>
+          </a:p>
+          <a:p>
+            <a:pPr lvl="1"/>
+            <a:r>
+              <a:rPr lang="en-US" dirty="0"/>
+              <a:t>to be proposed to a customer for its approval and a reference for developing the first version of the system for the development team</a:t>
+            </a:r>
+            <a:r>
+              <a:rPr lang="en-US" dirty="0"/>
+              <a:t> </a:t>
+            </a:r>
+            <a:endParaRPr lang="en-US" dirty="0" smtClean="0"/>
+          </a:p>
+          <a:p>
+            <a:r>
+              <a:rPr lang="en-US" b="1" u="sng" dirty="0" smtClean="0"/>
+              <a:t>1.2 Product Scope </a:t>
+            </a:r>
+            <a:endParaRPr lang="en-US" b="1" u="sng" dirty="0" smtClean="0"/>
+          </a:p>
+          <a:p>
+            <a:endParaRPr lang="en-US" b="1" u="sng" dirty="0"/>
+          </a:p>
+          <a:p>
+            <a:pPr lvl="1"/>
+            <a:r>
+              <a:rPr lang="en-US" dirty="0"/>
+              <a:t>is an off-line worksheet generation tool </a:t>
+            </a:r>
             <a:r>
               <a:rPr lang="en-US" dirty="0" smtClean="0"/>
-              <a:t>1.1 Purpose--Fraction Worksheet Creator  software</a:t>
-            </a:r>
-          </a:p>
-          <a:p>
+              <a:t>to </a:t>
+            </a:r>
+            <a:r>
+              <a:rPr lang="en-US" dirty="0"/>
+              <a:t>help elementary school teachers to create a lot of exercises for students to study and practice fractions. </a:t>
+            </a:r>
+            <a:endParaRPr lang="en-US" dirty="0" smtClean="0"/>
+          </a:p>
+          <a:p>
+            <a:r>
+              <a:rPr lang="en-US" b="1" u="sng" dirty="0" smtClean="0"/>
+              <a:t>1.3 Intender Audience</a:t>
+            </a:r>
+          </a:p>
+          <a:p>
+            <a:endParaRPr lang="en-US" b="1" u="sng" dirty="0" smtClean="0"/>
+          </a:p>
+          <a:p>
+            <a:pPr lvl="1"/>
             <a:r>
               <a:rPr lang="en-US" dirty="0" smtClean="0"/>
-              <a:t>1.2 Product Scope – Off-line worksheet generation tool</a:t>
-            </a:r>
-          </a:p>
-          <a:p>
-            <a:r>
-              <a:rPr lang="en-US" dirty="0" smtClean="0"/>
-              <a:t>1.3 Intender Audience</a:t>
-            </a:r>
+              <a:t>To be read by the </a:t>
+            </a:r>
+            <a:r>
+              <a:rPr lang="en-US" dirty="0"/>
+              <a:t>customer, development team, the project managers, testers, documentation writers and end users. </a:t>
+            </a:r>
+            <a:endParaRPr lang="en-US" dirty="0" smtClean="0"/>
           </a:p>
           <a:p>
             <a:endParaRPr lang="en-US" dirty="0"/>
@@ -6155,9 +6247,16 @@
             <p:ph type="title"/>
           </p:nvPr>
         </p:nvSpPr>
-        <p:spPr/>
-        <p:txBody>
-          <a:bodyPr/>
+        <p:spPr>
+          <a:xfrm>
+            <a:off x="2895600" y="208741"/>
+            <a:ext cx="8610600" cy="521851"/>
+          </a:xfrm>
+        </p:spPr>
+        <p:txBody>
+          <a:bodyPr>
+            <a:normAutofit fontScale="90000"/>
+          </a:bodyPr>
           <a:lstStyle/>
           <a:p>
             <a:r>
@@ -6178,7 +6277,12 @@
             <p:ph idx="1"/>
           </p:nvPr>
         </p:nvSpPr>
-        <p:spPr/>
+        <p:spPr>
+          <a:xfrm>
+            <a:off x="546612" y="1011696"/>
+            <a:ext cx="10820400" cy="1284451"/>
+          </a:xfrm>
+        </p:spPr>
         <p:txBody>
           <a:bodyPr/>
           <a:lstStyle/>
@@ -6188,6 +6292,78 @@
               <a:t>2.1 Product Perspective </a:t>
             </a:r>
             <a:endParaRPr lang="en-US" dirty="0"/>
+          </a:p>
+        </p:txBody>
+      </p:sp>
+      <p:pic>
+        <p:nvPicPr>
+          <p:cNvPr id="5" name="Picture 4"/>
+          <p:cNvPicPr/>
+          <p:nvPr/>
+        </p:nvPicPr>
+        <p:blipFill>
+          <a:blip r:embed="rId2">
+            <a:extLst>
+              <a:ext uri="{28A0092B-C50C-407E-A947-70E740481C1C}">
+                <a14:useLocalDpi xmlns:a14="http://schemas.microsoft.com/office/drawing/2010/main" val="0"/>
+              </a:ext>
+            </a:extLst>
+          </a:blip>
+          <a:stretch>
+            <a:fillRect/>
+          </a:stretch>
+        </p:blipFill>
+        <p:spPr>
+          <a:xfrm>
+            <a:off x="1531067" y="1588016"/>
+            <a:ext cx="8925431" cy="4644479"/>
+          </a:xfrm>
+          <a:prstGeom prst="rect">
+            <a:avLst/>
+          </a:prstGeom>
+        </p:spPr>
+      </p:pic>
+      <p:sp>
+        <p:nvSpPr>
+          <p:cNvPr id="7" name="Rectangle 6"/>
+          <p:cNvSpPr/>
+          <p:nvPr/>
+        </p:nvSpPr>
+        <p:spPr>
+          <a:xfrm>
+            <a:off x="1531067" y="6211347"/>
+            <a:ext cx="8925432" cy="369332"/>
+          </a:xfrm>
+          <a:prstGeom prst="rect">
+            <a:avLst/>
+          </a:prstGeom>
+        </p:spPr>
+        <p:txBody>
+          <a:bodyPr wrap="square">
+            <a:spAutoFit/>
+          </a:bodyPr>
+          <a:lstStyle/>
+          <a:p>
+            <a:r>
+              <a:rPr lang="en-US" b="1" dirty="0"/>
+              <a:t>Figure 1 </a:t>
+            </a:r>
+            <a:r>
+              <a:rPr lang="en-US" i="1" dirty="0"/>
+              <a:t>–</a:t>
+            </a:r>
+            <a:r>
+              <a:rPr lang="en-US" b="1" dirty="0"/>
+              <a:t> </a:t>
+            </a:r>
+            <a:r>
+              <a:rPr lang="en-US" i="1" dirty="0"/>
+              <a:t>Context diagram for release 1.0 of the Fraction Worksheet Creator</a:t>
+            </a:r>
+            <a:r>
+              <a:rPr lang="en-US" dirty="0"/>
+              <a:t> </a:t>
+            </a:r>
           </a:p>
         </p:txBody>
       </p:sp>
@@ -7416,7 +7592,7 @@
   <a:extraClrSchemeLst/>
   <a:extLst>
     <a:ext uri="{05A4C25C-085E-4340-85A3-A5531E510DB2}">
-      <thm15:themeFamily xmlns="" xmlns:thm15="http://schemas.microsoft.com/office/thememl/2012/main" name="Vapor Trail" id="{4FDF2955-7D9C-493C-B9F9-C205151B46CD}" vid="{8F31A783-2159-4870-BC29-2BA7D038EA44}"/>
+      <thm15:themeFamily xmlns:thm15="http://schemas.microsoft.com/office/thememl/2012/main" xmlns="" name="Vapor Trail" id="{4FDF2955-7D9C-493C-B9F9-C205151B46CD}" vid="{8F31A783-2159-4870-BC29-2BA7D038EA44}"/>
     </a:ext>
   </a:extLst>
 </a:theme>

</xml_diff>

<commit_message>
Added the content to Nonfunctional requirements 5.1 -5.5
</commit_message>
<xml_diff>
--- a/Presentation Elementary Engineers .pptx
+++ b/Presentation Elementary Engineers .pptx
@@ -5692,19 +5692,7 @@
             <a:pPr algn="ctr"/>
             <a:r>
               <a:rPr lang="en-US" sz="4800" dirty="0" smtClean="0"/>
-              <a:t>Software Requirements </a:t>
-            </a:r>
-            <a:r>
-              <a:rPr lang="en-US" sz="4800" smtClean="0"/>
-              <a:t>specification </a:t>
-            </a:r>
-            <a:r>
-              <a:rPr lang="en-US" sz="4800" smtClean="0"/>
-              <a:t>(SRS)</a:t>
-            </a:r>
-            <a:r>
-              <a:rPr lang="en-US" sz="4800" dirty="0" smtClean="0"/>
-              <a:t/>
+              <a:t>Software Requirements specification (SRS)</a:t>
             </a:r>
             <a:br>
               <a:rPr lang="en-US" sz="4800" dirty="0" smtClean="0"/>
@@ -5861,9 +5849,16 @@
           <a:lstStyle/>
           <a:p>
             <a:r>
-              <a:rPr lang="en-US" dirty="0" smtClean="0"/>
+              <a:rPr lang="en-US" b="1" u="sng" dirty="0" smtClean="0"/>
               <a:t>5.5 Business Rules </a:t>
             </a:r>
+            <a:endParaRPr lang="en-US" b="1" u="sng" dirty="0" smtClean="0"/>
+          </a:p>
+          <a:p>
+            <a:pPr marL="914400" lvl="2" indent="0">
+              <a:buNone/>
+            </a:pPr>
+            <a:endParaRPr lang="en-US" dirty="0" smtClean="0"/>
           </a:p>
           <a:p>
             <a:pPr marL="0" indent="0">
@@ -5877,6 +5872,34 @@
               <a:rPr lang="en-US" dirty="0" smtClean="0"/>
               <a:t>	- Do not allow students to register </a:t>
             </a:r>
+            <a:endParaRPr lang="en-US" dirty="0" smtClean="0"/>
+          </a:p>
+          <a:p>
+            <a:pPr marL="0" indent="0">
+              <a:buNone/>
+            </a:pPr>
+            <a:r>
+              <a:rPr lang="en-US" dirty="0"/>
+              <a:t>	</a:t>
+            </a:r>
+            <a:r>
+              <a:rPr lang="en-US" dirty="0" smtClean="0"/>
+              <a:t>- Allow teachers to register student accounts</a:t>
+            </a:r>
+          </a:p>
+          <a:p>
+            <a:pPr marL="0" indent="0">
+              <a:buNone/>
+            </a:pPr>
+            <a:r>
+              <a:rPr lang="en-US" dirty="0"/>
+              <a:t>	</a:t>
+            </a:r>
+            <a:r>
+              <a:rPr lang="en-US" dirty="0" smtClean="0"/>
+              <a:t>- Allow the administrator to register teacher accounts</a:t>
+            </a:r>
+            <a:endParaRPr lang="en-US" dirty="0" smtClean="0"/>
           </a:p>
           <a:p>
             <a:pPr marL="0" indent="0">
@@ -5960,16 +5983,21 @@
             <p:ph type="title"/>
           </p:nvPr>
         </p:nvSpPr>
-        <p:spPr/>
-        <p:txBody>
-          <a:bodyPr/>
-          <a:lstStyle/>
-          <a:p>
-            <a:r>
-              <a:rPr lang="en-US" smtClean="0"/>
+        <p:spPr>
+          <a:xfrm>
+            <a:off x="2895600" y="117859"/>
+            <a:ext cx="8610600" cy="1293028"/>
+          </a:xfrm>
+        </p:spPr>
+        <p:txBody>
+          <a:bodyPr/>
+          <a:lstStyle/>
+          <a:p>
+            <a:r>
+              <a:rPr lang="en-US" dirty="0" smtClean="0"/>
               <a:t>Other Requirements </a:t>
             </a:r>
-            <a:endParaRPr lang="en-US"/>
+            <a:endParaRPr lang="en-US" dirty="0"/>
           </a:p>
         </p:txBody>
       </p:sp>
@@ -5983,22 +6011,26 @@
             <p:ph idx="1"/>
           </p:nvPr>
         </p:nvSpPr>
-        <p:spPr/>
-        <p:txBody>
-          <a:bodyPr/>
-          <a:lstStyle/>
-          <a:p>
-            <a:r>
-              <a:rPr lang="en-US" dirty="0" smtClean="0"/>
-              <a:t>6.1 Database Schema</a:t>
-            </a:r>
+        <p:spPr>
+          <a:xfrm>
+            <a:off x="685800" y="2194560"/>
+            <a:ext cx="10820400" cy="4017753"/>
+          </a:xfrm>
+        </p:spPr>
+        <p:txBody>
+          <a:bodyPr/>
+          <a:lstStyle/>
+          <a:p>
+            <a:pPr marL="0" indent="0">
+              <a:buNone/>
+            </a:pPr>
             <a:endParaRPr lang="en-US" dirty="0"/>
           </a:p>
         </p:txBody>
       </p:sp>
       <p:pic>
         <p:nvPicPr>
-          <p:cNvPr id="4" name="Picture 3"/>
+          <p:cNvPr id="5" name="Picture 4"/>
           <p:cNvPicPr/>
           <p:nvPr/>
         </p:nvPicPr>
@@ -6016,14 +6048,44 @@
         </p:blipFill>
         <p:spPr>
           <a:xfrm>
-            <a:off x="1678135" y="2787967"/>
-            <a:ext cx="8436037" cy="3430717"/>
+            <a:off x="497720" y="1887720"/>
+            <a:ext cx="11008480" cy="4633494"/>
           </a:xfrm>
           <a:prstGeom prst="rect">
             <a:avLst/>
           </a:prstGeom>
         </p:spPr>
       </p:pic>
+      <p:sp>
+        <p:nvSpPr>
+          <p:cNvPr id="6" name="TextBox 5"/>
+          <p:cNvSpPr txBox="1"/>
+          <p:nvPr/>
+        </p:nvSpPr>
+        <p:spPr>
+          <a:xfrm>
+            <a:off x="685800" y="1345920"/>
+            <a:ext cx="4823447" cy="400110"/>
+          </a:xfrm>
+          <a:prstGeom prst="rect">
+            <a:avLst/>
+          </a:prstGeom>
+          <a:noFill/>
+        </p:spPr>
+        <p:txBody>
+          <a:bodyPr wrap="square" rtlCol="0">
+            <a:spAutoFit/>
+          </a:bodyPr>
+          <a:lstStyle/>
+          <a:p>
+            <a:r>
+              <a:rPr lang="en-US" sz="2000" dirty="0"/>
+              <a:t>6.1 Database Schema</a:t>
+            </a:r>
+            <a:endParaRPr lang="en-US" sz="2000" dirty="0"/>
+          </a:p>
+        </p:txBody>
+      </p:sp>
     </p:spTree>
     <p:extLst>
       <p:ext uri="{BB962C8B-B14F-4D97-AF65-F5344CB8AC3E}">
@@ -6106,11 +6168,7 @@
           <a:p>
             <a:r>
               <a:rPr lang="en-US" b="1" u="sng" dirty="0" smtClean="0"/>
-              <a:t>1.1 </a:t>
-            </a:r>
-            <a:r>
-              <a:rPr lang="en-US" b="1" u="sng" dirty="0" smtClean="0"/>
-              <a:t>Purpose </a:t>
+              <a:t>1.1 Purpose </a:t>
             </a:r>
           </a:p>
           <a:p>
@@ -6123,11 +6181,15 @@
             <a:pPr lvl="1"/>
             <a:r>
               <a:rPr lang="en-US" dirty="0"/>
-              <a:t>give a detailed description of the requirements for the “Fraction Worksheet Creator” (FWC) software</a:t>
-            </a:r>
+              <a:t>give a detailed description of the requirements for the “Fraction Worksheet Creator” (FWC) software </a:t>
+            </a:r>
+            <a:endParaRPr lang="en-US" dirty="0" smtClean="0"/>
+          </a:p>
+          <a:p>
+            <a:pPr lvl="1"/>
             <a:r>
               <a:rPr lang="en-US" dirty="0"/>
-              <a:t> </a:t>
+              <a:t>explain system constraints, interface and interactions with other external applications </a:t>
             </a:r>
             <a:endParaRPr lang="en-US" dirty="0" smtClean="0"/>
           </a:p>
@@ -6135,23 +6197,7 @@
             <a:pPr lvl="1"/>
             <a:r>
               <a:rPr lang="en-US" dirty="0"/>
-              <a:t>explain system constraints, interface and interactions with other external applications</a:t>
-            </a:r>
-            <a:r>
-              <a:rPr lang="en-US" dirty="0"/>
-              <a:t> </a:t>
-            </a:r>
-            <a:endParaRPr lang="en-US" dirty="0" smtClean="0"/>
-          </a:p>
-          <a:p>
-            <a:pPr lvl="1"/>
-            <a:r>
-              <a:rPr lang="en-US" dirty="0"/>
-              <a:t>to be proposed to a customer for its approval and a reference for developing the first version of the system for the development team</a:t>
-            </a:r>
-            <a:r>
-              <a:rPr lang="en-US" dirty="0"/>
-              <a:t> </a:t>
+              <a:t>to be proposed to a customer for its approval and a reference for developing the first version of the system for the development team </a:t>
             </a:r>
             <a:endParaRPr lang="en-US" dirty="0" smtClean="0"/>
           </a:p>
@@ -6160,7 +6206,6 @@
               <a:rPr lang="en-US" b="1" u="sng" dirty="0" smtClean="0"/>
               <a:t>1.2 Product Scope </a:t>
             </a:r>
-            <a:endParaRPr lang="en-US" b="1" u="sng" dirty="0" smtClean="0"/>
           </a:p>
           <a:p>
             <a:endParaRPr lang="en-US" b="1" u="sng" dirty="0"/>
@@ -7158,7 +7203,12 @@
             <p:ph type="title"/>
           </p:nvPr>
         </p:nvSpPr>
-        <p:spPr/>
+        <p:spPr>
+          <a:xfrm>
+            <a:off x="2895600" y="117859"/>
+            <a:ext cx="8610600" cy="1293028"/>
+          </a:xfrm>
+        </p:spPr>
         <p:txBody>
           <a:bodyPr/>
           <a:lstStyle/>
@@ -7183,18 +7233,18 @@
         </p:nvSpPr>
         <p:spPr>
           <a:xfrm>
-            <a:off x="685800" y="2194560"/>
-            <a:ext cx="10820400" cy="4206240"/>
+            <a:off x="685800" y="1445209"/>
+            <a:ext cx="10820400" cy="4784266"/>
           </a:xfrm>
         </p:spPr>
         <p:txBody>
           <a:bodyPr>
-            <a:normAutofit fontScale="92500" lnSpcReduction="10000"/>
+            <a:normAutofit/>
           </a:bodyPr>
           <a:lstStyle/>
           <a:p>
             <a:r>
-              <a:rPr lang="en-US" dirty="0" smtClean="0"/>
+              <a:rPr lang="en-US" b="1" u="sng" dirty="0" smtClean="0"/>
               <a:t>5.1 Performance Requirements </a:t>
             </a:r>
           </a:p>
@@ -7206,10 +7256,15 @@
               <a:rPr lang="en-US" dirty="0" smtClean="0"/>
               <a:t>	-Number of Users </a:t>
             </a:r>
-          </a:p>
-          <a:p>
             <a:r>
               <a:rPr lang="en-US" dirty="0" smtClean="0"/>
+              <a:t> shall not be limited</a:t>
+            </a:r>
+            <a:endParaRPr lang="en-US" dirty="0" smtClean="0"/>
+          </a:p>
+          <a:p>
+            <a:r>
+              <a:rPr lang="en-US" b="1" u="sng" dirty="0" smtClean="0"/>
               <a:t>5.2 Safety Requirements </a:t>
             </a:r>
           </a:p>
@@ -7228,7 +7283,7 @@
           </a:p>
           <a:p>
             <a:r>
-              <a:rPr lang="en-US" dirty="0" smtClean="0"/>
+              <a:rPr lang="en-US" b="1" u="sng" dirty="0" smtClean="0"/>
               <a:t>5.3 Security Requirements </a:t>
             </a:r>
           </a:p>
@@ -7266,11 +7321,15 @@
               <a:rPr lang="en-US" dirty="0" smtClean="0"/>
               <a:t>	-  Securely Store password </a:t>
             </a:r>
-            <a:endParaRPr lang="en-US" dirty="0"/>
-          </a:p>
-          <a:p>
             <a:r>
               <a:rPr lang="en-US" dirty="0" smtClean="0"/>
+              <a:t>in a database</a:t>
+            </a:r>
+            <a:endParaRPr lang="en-US" dirty="0"/>
+          </a:p>
+          <a:p>
+            <a:r>
+              <a:rPr lang="en-US" b="1" u="sng" dirty="0" smtClean="0"/>
               <a:t>5.4 Software Quality Attributes </a:t>
             </a:r>
           </a:p>
@@ -7592,7 +7651,7 @@
   <a:extraClrSchemeLst/>
   <a:extLst>
     <a:ext uri="{05A4C25C-085E-4340-85A3-A5531E510DB2}">
-      <thm15:themeFamily xmlns:thm15="http://schemas.microsoft.com/office/thememl/2012/main" xmlns="" name="Vapor Trail" id="{4FDF2955-7D9C-493C-B9F9-C205151B46CD}" vid="{8F31A783-2159-4870-BC29-2BA7D038EA44}"/>
+      <thm15:themeFamily xmlns="" xmlns:thm15="http://schemas.microsoft.com/office/thememl/2012/main" name="Vapor Trail" id="{4FDF2955-7D9C-493C-B9F9-C205151B46CD}" vid="{8F31A783-2159-4870-BC29-2BA7D038EA44}"/>
     </a:ext>
   </a:extLst>
 </a:theme>

</xml_diff>

<commit_message>
Added slide 1.5. Overview to Introduction part
</commit_message>
<xml_diff>
--- a/Presentation Elementary Engineers .pptx
+++ b/Presentation Elementary Engineers .pptx
@@ -7,15 +7,16 @@
   <p:sldIdLst>
     <p:sldId id="256" r:id="rId2"/>
     <p:sldId id="257" r:id="rId3"/>
-    <p:sldId id="258" r:id="rId4"/>
-    <p:sldId id="259" r:id="rId5"/>
-    <p:sldId id="260" r:id="rId6"/>
-    <p:sldId id="261" r:id="rId7"/>
-    <p:sldId id="262" r:id="rId8"/>
-    <p:sldId id="263" r:id="rId9"/>
-    <p:sldId id="264" r:id="rId10"/>
-    <p:sldId id="265" r:id="rId11"/>
-    <p:sldId id="266" r:id="rId12"/>
+    <p:sldId id="267" r:id="rId4"/>
+    <p:sldId id="258" r:id="rId5"/>
+    <p:sldId id="259" r:id="rId6"/>
+    <p:sldId id="260" r:id="rId7"/>
+    <p:sldId id="261" r:id="rId8"/>
+    <p:sldId id="262" r:id="rId9"/>
+    <p:sldId id="263" r:id="rId10"/>
+    <p:sldId id="264" r:id="rId11"/>
+    <p:sldId id="265" r:id="rId12"/>
+    <p:sldId id="266" r:id="rId13"/>
   </p:sldIdLst>
   <p:sldSz cx="12192000" cy="6858000"/>
   <p:notesSz cx="6858000" cy="9144000"/>
@@ -5820,6 +5821,217 @@
             <p:ph type="title"/>
           </p:nvPr>
         </p:nvSpPr>
+        <p:spPr>
+          <a:xfrm>
+            <a:off x="2895600" y="117859"/>
+            <a:ext cx="8610600" cy="1293028"/>
+          </a:xfrm>
+        </p:spPr>
+        <p:txBody>
+          <a:bodyPr/>
+          <a:lstStyle/>
+          <a:p>
+            <a:r>
+              <a:rPr lang="en-US" dirty="0" smtClean="0"/>
+              <a:t>Other nonfunctional Requirements </a:t>
+            </a:r>
+            <a:endParaRPr lang="en-US" dirty="0"/>
+          </a:p>
+        </p:txBody>
+      </p:sp>
+      <p:sp>
+        <p:nvSpPr>
+          <p:cNvPr id="3" name="Content Placeholder 2"/>
+          <p:cNvSpPr>
+            <a:spLocks noGrp="1"/>
+          </p:cNvSpPr>
+          <p:nvPr>
+            <p:ph idx="1"/>
+          </p:nvPr>
+        </p:nvSpPr>
+        <p:spPr>
+          <a:xfrm>
+            <a:off x="685800" y="1445209"/>
+            <a:ext cx="10820400" cy="4784266"/>
+          </a:xfrm>
+        </p:spPr>
+        <p:txBody>
+          <a:bodyPr>
+            <a:normAutofit/>
+          </a:bodyPr>
+          <a:lstStyle/>
+          <a:p>
+            <a:r>
+              <a:rPr lang="en-US" b="1" u="sng" dirty="0" smtClean="0"/>
+              <a:t>5.1 Performance Requirements </a:t>
+            </a:r>
+          </a:p>
+          <a:p>
+            <a:pPr marL="457200" lvl="1" indent="0">
+              <a:buNone/>
+            </a:pPr>
+            <a:r>
+              <a:rPr lang="en-US" dirty="0" smtClean="0"/>
+              <a:t>	-Number of Users </a:t>
+            </a:r>
+            <a:r>
+              <a:rPr lang="en-US" dirty="0" smtClean="0"/>
+              <a:t> shall not be limited</a:t>
+            </a:r>
+            <a:endParaRPr lang="en-US" dirty="0" smtClean="0"/>
+          </a:p>
+          <a:p>
+            <a:r>
+              <a:rPr lang="en-US" b="1" u="sng" dirty="0" smtClean="0"/>
+              <a:t>5.2 Safety Requirements </a:t>
+            </a:r>
+          </a:p>
+          <a:p>
+            <a:pPr marL="0" indent="0">
+              <a:buNone/>
+            </a:pPr>
+            <a:r>
+              <a:rPr lang="en-US" dirty="0"/>
+              <a:t>	</a:t>
+            </a:r>
+            <a:r>
+              <a:rPr lang="en-US" dirty="0" smtClean="0"/>
+              <a:t>-None have been identified </a:t>
+            </a:r>
+          </a:p>
+          <a:p>
+            <a:r>
+              <a:rPr lang="en-US" b="1" u="sng" dirty="0" smtClean="0"/>
+              <a:t>5.3 Security Requirements </a:t>
+            </a:r>
+          </a:p>
+          <a:p>
+            <a:pPr marL="457200" lvl="1" indent="0">
+              <a:buNone/>
+            </a:pPr>
+            <a:r>
+              <a:rPr lang="en-US" dirty="0"/>
+              <a:t> </a:t>
+            </a:r>
+            <a:r>
+              <a:rPr lang="en-US" dirty="0" smtClean="0"/>
+              <a:t>	-  Only allow authorized users </a:t>
+            </a:r>
+          </a:p>
+          <a:p>
+            <a:pPr marL="457200" lvl="1" indent="0">
+              <a:buNone/>
+            </a:pPr>
+            <a:r>
+              <a:rPr lang="en-US" dirty="0"/>
+              <a:t>	</a:t>
+            </a:r>
+            <a:r>
+              <a:rPr lang="en-US" dirty="0" smtClean="0"/>
+              <a:t>-  Require username and password </a:t>
+            </a:r>
+          </a:p>
+          <a:p>
+            <a:pPr marL="457200" lvl="1" indent="0">
+              <a:buNone/>
+            </a:pPr>
+            <a:r>
+              <a:rPr lang="en-US" dirty="0" smtClean="0"/>
+              <a:t>	-  Securely Store password </a:t>
+            </a:r>
+            <a:r>
+              <a:rPr lang="en-US" dirty="0" smtClean="0"/>
+              <a:t>in a database</a:t>
+            </a:r>
+            <a:endParaRPr lang="en-US" dirty="0"/>
+          </a:p>
+          <a:p>
+            <a:r>
+              <a:rPr lang="en-US" b="1" u="sng" dirty="0" smtClean="0"/>
+              <a:t>5.4 Software Quality Attributes </a:t>
+            </a:r>
+          </a:p>
+          <a:p>
+            <a:pPr marL="0" indent="0">
+              <a:buNone/>
+            </a:pPr>
+            <a:r>
+              <a:rPr lang="en-US" dirty="0"/>
+              <a:t>	</a:t>
+            </a:r>
+            <a:r>
+              <a:rPr lang="en-US" dirty="0" smtClean="0"/>
+              <a:t>- Correctness </a:t>
+            </a:r>
+          </a:p>
+          <a:p>
+            <a:pPr marL="0" indent="0">
+              <a:buNone/>
+            </a:pPr>
+            <a:r>
+              <a:rPr lang="en-US" dirty="0"/>
+              <a:t>	</a:t>
+            </a:r>
+            <a:r>
+              <a:rPr lang="en-US" dirty="0" smtClean="0"/>
+              <a:t>- Interoperability</a:t>
+            </a:r>
+          </a:p>
+          <a:p>
+            <a:pPr marL="0" indent="0">
+              <a:buNone/>
+            </a:pPr>
+            <a:r>
+              <a:rPr lang="en-US" dirty="0"/>
+              <a:t>	</a:t>
+            </a:r>
+            <a:r>
+              <a:rPr lang="en-US" dirty="0" smtClean="0"/>
+              <a:t>- Usability</a:t>
+            </a:r>
+          </a:p>
+        </p:txBody>
+      </p:sp>
+    </p:spTree>
+    <p:extLst>
+      <p:ext uri="{BB962C8B-B14F-4D97-AF65-F5344CB8AC3E}">
+        <p14:creationId xmlns:p14="http://schemas.microsoft.com/office/powerpoint/2010/main" val="1418613171"/>
+      </p:ext>
+    </p:extLst>
+  </p:cSld>
+  <p:clrMapOvr>
+    <a:masterClrMapping/>
+  </p:clrMapOvr>
+</p:sld>
+</file>
+
+<file path=ppt/slides/slide11.xml><?xml version="1.0" encoding="utf-8"?>
+<p:sld xmlns:a="http://schemas.openxmlformats.org/drawingml/2006/main" xmlns:r="http://schemas.openxmlformats.org/officeDocument/2006/relationships" xmlns:p="http://schemas.openxmlformats.org/presentationml/2006/main">
+  <p:cSld>
+    <p:spTree>
+      <p:nvGrpSpPr>
+        <p:cNvPr id="1" name=""/>
+        <p:cNvGrpSpPr/>
+        <p:nvPr/>
+      </p:nvGrpSpPr>
+      <p:grpSpPr>
+        <a:xfrm>
+          <a:off x="0" y="0"/>
+          <a:ext cx="0" cy="0"/>
+          <a:chOff x="0" y="0"/>
+          <a:chExt cx="0" cy="0"/>
+        </a:xfrm>
+      </p:grpSpPr>
+      <p:sp>
+        <p:nvSpPr>
+          <p:cNvPr id="2" name="Title 1"/>
+          <p:cNvSpPr>
+            <a:spLocks noGrp="1"/>
+          </p:cNvSpPr>
+          <p:nvPr>
+            <p:ph type="title"/>
+          </p:nvPr>
+        </p:nvSpPr>
         <p:spPr/>
         <p:txBody>
           <a:bodyPr/>
@@ -5956,7 +6168,7 @@
 </p:sld>
 </file>
 
-<file path=ppt/slides/slide11.xml><?xml version="1.0" encoding="utf-8"?>
+<file path=ppt/slides/slide12.xml><?xml version="1.0" encoding="utf-8"?>
 <p:sld xmlns:a="http://schemas.openxmlformats.org/drawingml/2006/main" xmlns:r="http://schemas.openxmlformats.org/officeDocument/2006/relationships" xmlns:p="http://schemas.openxmlformats.org/presentationml/2006/main">
   <p:cSld>
     <p:spTree>
@@ -6294,47 +6506,19 @@
         </p:nvSpPr>
         <p:spPr>
           <a:xfrm>
-            <a:off x="2895600" y="208741"/>
-            <a:ext cx="8610600" cy="521851"/>
+            <a:off x="7405081" y="188773"/>
+            <a:ext cx="4101118" cy="812982"/>
           </a:xfrm>
         </p:spPr>
         <p:txBody>
           <a:bodyPr>
-            <a:normAutofit fontScale="90000"/>
+            <a:normAutofit/>
           </a:bodyPr>
           <a:lstStyle/>
           <a:p>
             <a:r>
               <a:rPr lang="en-US" dirty="0" smtClean="0"/>
-              <a:t>Description </a:t>
-            </a:r>
-            <a:endParaRPr lang="en-US" dirty="0"/>
-          </a:p>
-        </p:txBody>
-      </p:sp>
-      <p:sp>
-        <p:nvSpPr>
-          <p:cNvPr id="3" name="Content Placeholder 2"/>
-          <p:cNvSpPr>
-            <a:spLocks noGrp="1"/>
-          </p:cNvSpPr>
-          <p:nvPr>
-            <p:ph idx="1"/>
-          </p:nvPr>
-        </p:nvSpPr>
-        <p:spPr>
-          <a:xfrm>
-            <a:off x="546612" y="1011696"/>
-            <a:ext cx="10820400" cy="1284451"/>
-          </a:xfrm>
-        </p:spPr>
-        <p:txBody>
-          <a:bodyPr/>
-          <a:lstStyle/>
-          <a:p>
-            <a:r>
-              <a:rPr lang="en-US" dirty="0" smtClean="0"/>
-              <a:t>2.1 Product Perspective </a:t>
+              <a:t>INTRODUCTION</a:t>
             </a:r>
             <a:endParaRPr lang="en-US" dirty="0"/>
           </a:p>
@@ -6342,80 +6526,62 @@
       </p:sp>
       <p:pic>
         <p:nvPicPr>
-          <p:cNvPr id="5" name="Picture 4"/>
-          <p:cNvPicPr/>
-          <p:nvPr/>
+          <p:cNvPr id="17" name="Content Placeholder 16"/>
+          <p:cNvPicPr>
+            <a:picLocks noGrp="1" noChangeAspect="1"/>
+          </p:cNvPicPr>
+          <p:nvPr>
+            <p:ph idx="1"/>
+          </p:nvPr>
         </p:nvPicPr>
         <p:blipFill>
-          <a:blip r:embed="rId2">
-            <a:extLst>
-              <a:ext uri="{28A0092B-C50C-407E-A947-70E740481C1C}">
-                <a14:useLocalDpi xmlns:a14="http://schemas.microsoft.com/office/drawing/2010/main" val="0"/>
-              </a:ext>
-            </a:extLst>
-          </a:blip>
+          <a:blip r:embed="rId2"/>
+          <a:srcRect l="-92974" r="-92974"/>
           <a:stretch>
             <a:fillRect/>
           </a:stretch>
         </p:blipFill>
         <p:spPr>
           <a:xfrm>
-            <a:off x="1531067" y="1588016"/>
-            <a:ext cx="8925431" cy="4644479"/>
+            <a:off x="-996582" y="331881"/>
+            <a:ext cx="12502781" cy="6280957"/>
+          </a:xfrm>
+        </p:spPr>
+      </p:pic>
+      <p:sp>
+        <p:nvSpPr>
+          <p:cNvPr id="18" name="TextBox 17"/>
+          <p:cNvSpPr txBox="1"/>
+          <p:nvPr/>
+        </p:nvSpPr>
+        <p:spPr>
+          <a:xfrm>
+            <a:off x="7905907" y="1216417"/>
+            <a:ext cx="3600292" cy="461665"/>
           </a:xfrm>
           <a:prstGeom prst="rect">
             <a:avLst/>
           </a:prstGeom>
-        </p:spPr>
-      </p:pic>
-      <p:sp>
-        <p:nvSpPr>
-          <p:cNvPr id="7" name="Rectangle 6"/>
-          <p:cNvSpPr/>
-          <p:nvPr/>
-        </p:nvSpPr>
-        <p:spPr>
-          <a:xfrm>
-            <a:off x="1531067" y="6211347"/>
-            <a:ext cx="8925432" cy="369332"/>
-          </a:xfrm>
-          <a:prstGeom prst="rect">
-            <a:avLst/>
-          </a:prstGeom>
-        </p:spPr>
-        <p:txBody>
-          <a:bodyPr wrap="square">
+          <a:noFill/>
+        </p:spPr>
+        <p:txBody>
+          <a:bodyPr wrap="square" rtlCol="0">
             <a:spAutoFit/>
           </a:bodyPr>
           <a:lstStyle/>
           <a:p>
             <a:r>
-              <a:rPr lang="en-US" b="1" dirty="0"/>
-              <a:t>Figure 1 </a:t>
-            </a:r>
-            <a:r>
-              <a:rPr lang="en-US" i="1" dirty="0"/>
-              <a:t>–</a:t>
-            </a:r>
-            <a:r>
-              <a:rPr lang="en-US" b="1" dirty="0"/>
-              <a:t> </a:t>
-            </a:r>
-            <a:r>
-              <a:rPr lang="en-US" i="1" dirty="0"/>
-              <a:t>Context diagram for release 1.0 of the Fraction Worksheet Creator</a:t>
-            </a:r>
-            <a:r>
-              <a:rPr lang="en-US" dirty="0"/>
-              <a:t> </a:t>
-            </a:r>
+              <a:rPr lang="en-US" sz="2400" dirty="0" smtClean="0"/>
+              <a:t>1.5. Overview</a:t>
+            </a:r>
+            <a:endParaRPr lang="en-US" sz="2400" dirty="0"/>
           </a:p>
         </p:txBody>
       </p:sp>
     </p:spTree>
     <p:extLst>
       <p:ext uri="{BB962C8B-B14F-4D97-AF65-F5344CB8AC3E}">
-        <p14:creationId xmlns:p14="http://schemas.microsoft.com/office/powerpoint/2010/main" val="883840056"/>
+        <p14:creationId xmlns:p14="http://schemas.microsoft.com/office/powerpoint/2010/main" val="2978638478"/>
       </p:ext>
     </p:extLst>
   </p:cSld>
@@ -6452,14 +6618,21 @@
             <p:ph type="title"/>
           </p:nvPr>
         </p:nvSpPr>
-        <p:spPr/>
-        <p:txBody>
-          <a:bodyPr/>
+        <p:spPr>
+          <a:xfrm>
+            <a:off x="2895600" y="208741"/>
+            <a:ext cx="8610600" cy="521851"/>
+          </a:xfrm>
+        </p:spPr>
+        <p:txBody>
+          <a:bodyPr>
+            <a:normAutofit fontScale="90000"/>
+          </a:bodyPr>
           <a:lstStyle/>
           <a:p>
             <a:r>
               <a:rPr lang="en-US" dirty="0" smtClean="0"/>
-              <a:t>User Requirements</a:t>
+              <a:t>Description </a:t>
             </a:r>
             <a:endParaRPr lang="en-US" dirty="0"/>
           </a:p>
@@ -6475,94 +6648,92 @@
             <p:ph idx="1"/>
           </p:nvPr>
         </p:nvSpPr>
-        <p:spPr/>
+        <p:spPr>
+          <a:xfrm>
+            <a:off x="546612" y="1011696"/>
+            <a:ext cx="10820400" cy="1284451"/>
+          </a:xfrm>
+        </p:spPr>
         <p:txBody>
           <a:bodyPr/>
           <a:lstStyle/>
           <a:p>
             <a:r>
               <a:rPr lang="en-US" dirty="0" smtClean="0"/>
-              <a:t>3.1 Functional Requirements </a:t>
-            </a:r>
-          </a:p>
-          <a:p>
-            <a:pPr marL="0" indent="0">
-              <a:buNone/>
-            </a:pPr>
-            <a:r>
-              <a:rPr lang="en-US" dirty="0" smtClean="0"/>
-              <a:t>	- Requirement for the Admin </a:t>
-            </a:r>
-          </a:p>
-          <a:p>
-            <a:pPr marL="0" indent="0">
-              <a:buNone/>
-            </a:pPr>
+              <a:t>2.1 Product Perspective </a:t>
+            </a:r>
+            <a:endParaRPr lang="en-US" dirty="0"/>
+          </a:p>
+        </p:txBody>
+      </p:sp>
+      <p:pic>
+        <p:nvPicPr>
+          <p:cNvPr id="5" name="Picture 4"/>
+          <p:cNvPicPr/>
+          <p:nvPr/>
+        </p:nvPicPr>
+        <p:blipFill>
+          <a:blip r:embed="rId2">
+            <a:extLst>
+              <a:ext uri="{28A0092B-C50C-407E-A947-70E740481C1C}">
+                <a14:useLocalDpi xmlns:a14="http://schemas.microsoft.com/office/drawing/2010/main" val="0"/>
+              </a:ext>
+            </a:extLst>
+          </a:blip>
+          <a:stretch>
+            <a:fillRect/>
+          </a:stretch>
+        </p:blipFill>
+        <p:spPr>
+          <a:xfrm>
+            <a:off x="1531067" y="1588016"/>
+            <a:ext cx="8925431" cy="4644479"/>
+          </a:xfrm>
+          <a:prstGeom prst="rect">
+            <a:avLst/>
+          </a:prstGeom>
+        </p:spPr>
+      </p:pic>
+      <p:sp>
+        <p:nvSpPr>
+          <p:cNvPr id="7" name="Rectangle 6"/>
+          <p:cNvSpPr/>
+          <p:nvPr/>
+        </p:nvSpPr>
+        <p:spPr>
+          <a:xfrm>
+            <a:off x="1531067" y="6211347"/>
+            <a:ext cx="8925432" cy="369332"/>
+          </a:xfrm>
+          <a:prstGeom prst="rect">
+            <a:avLst/>
+          </a:prstGeom>
+        </p:spPr>
+        <p:txBody>
+          <a:bodyPr wrap="square">
+            <a:spAutoFit/>
+          </a:bodyPr>
+          <a:lstStyle/>
+          <a:p>
+            <a:r>
+              <a:rPr lang="en-US" b="1" dirty="0"/>
+              <a:t>Figure 1 </a:t>
+            </a:r>
+            <a:r>
+              <a:rPr lang="en-US" i="1" dirty="0"/>
+              <a:t>–</a:t>
+            </a:r>
+            <a:r>
+              <a:rPr lang="en-US" b="1" dirty="0"/>
+              <a:t> </a:t>
+            </a:r>
+            <a:r>
+              <a:rPr lang="en-US" i="1" dirty="0"/>
+              <a:t>Context diagram for release 1.0 of the Fraction Worksheet Creator</a:t>
+            </a:r>
             <a:r>
               <a:rPr lang="en-US" dirty="0"/>
-              <a:t>	</a:t>
-            </a:r>
-            <a:r>
-              <a:rPr lang="en-US" dirty="0" smtClean="0"/>
-              <a:t>- General System Features </a:t>
-            </a:r>
-          </a:p>
-          <a:p>
-            <a:pPr marL="0" indent="0">
-              <a:buNone/>
-            </a:pPr>
-            <a:r>
-              <a:rPr lang="en-US" dirty="0"/>
-              <a:t>	</a:t>
-            </a:r>
-            <a:r>
-              <a:rPr lang="en-US" dirty="0" smtClean="0"/>
-              <a:t>- Teacher System Features</a:t>
-            </a:r>
-          </a:p>
-          <a:p>
-            <a:pPr marL="0" indent="0">
-              <a:buNone/>
-            </a:pPr>
-            <a:r>
-              <a:rPr lang="en-US" dirty="0"/>
-              <a:t>	</a:t>
-            </a:r>
-            <a:r>
-              <a:rPr lang="en-US" dirty="0" smtClean="0"/>
-              <a:t>- Student System Features </a:t>
-            </a:r>
-          </a:p>
-          <a:p>
-            <a:r>
-              <a:rPr lang="en-US" dirty="0" smtClean="0"/>
-              <a:t>3.2 Non-Functional Requirements </a:t>
-            </a:r>
-          </a:p>
-          <a:p>
-            <a:pPr marL="0" indent="0">
-              <a:buNone/>
-            </a:pPr>
-            <a:r>
-              <a:rPr lang="en-US" dirty="0"/>
-              <a:t>	</a:t>
-            </a:r>
-            <a:r>
-              <a:rPr lang="en-US" dirty="0" smtClean="0"/>
-              <a:t>-OS systems it should run on </a:t>
-            </a:r>
-          </a:p>
-          <a:p>
-            <a:pPr marL="0" indent="0">
-              <a:buNone/>
-            </a:pPr>
-            <a:r>
-              <a:rPr lang="en-US" dirty="0"/>
-              <a:t>	</a:t>
-            </a:r>
-            <a:r>
-              <a:rPr lang="en-US" dirty="0" smtClean="0"/>
-              <a:t>- System should have access to a printer</a:t>
+              <a:t> </a:t>
             </a:r>
           </a:p>
         </p:txBody>
@@ -6570,7 +6741,7 @@
     </p:spTree>
     <p:extLst>
       <p:ext uri="{BB962C8B-B14F-4D97-AF65-F5344CB8AC3E}">
-        <p14:creationId xmlns:p14="http://schemas.microsoft.com/office/powerpoint/2010/main" val="1237032422"/>
+        <p14:creationId xmlns:p14="http://schemas.microsoft.com/office/powerpoint/2010/main" val="883840056"/>
       </p:ext>
     </p:extLst>
   </p:cSld>
@@ -6614,7 +6785,7 @@
           <a:p>
             <a:r>
               <a:rPr lang="en-US" dirty="0" smtClean="0"/>
-              <a:t>User Requirements continued </a:t>
+              <a:t>User Requirements</a:t>
             </a:r>
             <a:endParaRPr lang="en-US" dirty="0"/>
           </a:p>
@@ -6637,11 +6808,20 @@
           <a:p>
             <a:r>
               <a:rPr lang="en-US" dirty="0" smtClean="0"/>
-              <a:t>3.3 Software Interfaces </a:t>
-            </a:r>
-          </a:p>
-          <a:p>
-            <a:pPr marL="457200" lvl="1" indent="0">
+              <a:t>3.1 Functional Requirements </a:t>
+            </a:r>
+          </a:p>
+          <a:p>
+            <a:pPr marL="0" indent="0">
+              <a:buNone/>
+            </a:pPr>
+            <a:r>
+              <a:rPr lang="en-US" dirty="0" smtClean="0"/>
+              <a:t>	- Requirement for the Admin </a:t>
+            </a:r>
+          </a:p>
+          <a:p>
+            <a:pPr marL="0" indent="0">
               <a:buNone/>
             </a:pPr>
             <a:r>
@@ -6650,11 +6830,11 @@
             </a:r>
             <a:r>
               <a:rPr lang="en-US" dirty="0" smtClean="0"/>
-              <a:t>- will interface with a database</a:t>
-            </a:r>
-          </a:p>
-          <a:p>
-            <a:pPr marL="457200" lvl="1" indent="0">
+              <a:t>- General System Features </a:t>
+            </a:r>
+          </a:p>
+          <a:p>
+            <a:pPr marL="0" indent="0">
               <a:buNone/>
             </a:pPr>
             <a:r>
@@ -6663,11 +6843,11 @@
             </a:r>
             <a:r>
               <a:rPr lang="en-US" dirty="0" smtClean="0"/>
-              <a:t>- interface with a API</a:t>
-            </a:r>
-          </a:p>
-          <a:p>
-            <a:pPr marL="457200" lvl="1" indent="0">
+              <a:t>- Teacher System Features</a:t>
+            </a:r>
+          </a:p>
+          <a:p>
+            <a:pPr marL="0" indent="0">
               <a:buNone/>
             </a:pPr>
             <a:r>
@@ -6676,16 +6856,47 @@
             </a:r>
             <a:r>
               <a:rPr lang="en-US" dirty="0" smtClean="0"/>
-              <a:t>- interface with Adobe Reader</a:t>
-            </a:r>
-            <a:endParaRPr lang="en-US" dirty="0"/>
+              <a:t>- Student System Features </a:t>
+            </a:r>
+          </a:p>
+          <a:p>
+            <a:r>
+              <a:rPr lang="en-US" dirty="0" smtClean="0"/>
+              <a:t>3.2 Non-Functional Requirements </a:t>
+            </a:r>
+          </a:p>
+          <a:p>
+            <a:pPr marL="0" indent="0">
+              <a:buNone/>
+            </a:pPr>
+            <a:r>
+              <a:rPr lang="en-US" dirty="0"/>
+              <a:t>	</a:t>
+            </a:r>
+            <a:r>
+              <a:rPr lang="en-US" dirty="0" smtClean="0"/>
+              <a:t>-OS systems it should run on </a:t>
+            </a:r>
+          </a:p>
+          <a:p>
+            <a:pPr marL="0" indent="0">
+              <a:buNone/>
+            </a:pPr>
+            <a:r>
+              <a:rPr lang="en-US" dirty="0"/>
+              <a:t>	</a:t>
+            </a:r>
+            <a:r>
+              <a:rPr lang="en-US" dirty="0" smtClean="0"/>
+              <a:t>- System should have access to a printer</a:t>
+            </a:r>
           </a:p>
         </p:txBody>
       </p:sp>
     </p:spTree>
     <p:extLst>
       <p:ext uri="{BB962C8B-B14F-4D97-AF65-F5344CB8AC3E}">
-        <p14:creationId xmlns:p14="http://schemas.microsoft.com/office/powerpoint/2010/main" val="2021458727"/>
+        <p14:creationId xmlns:p14="http://schemas.microsoft.com/office/powerpoint/2010/main" val="1237032422"/>
       </p:ext>
     </p:extLst>
   </p:cSld>
@@ -6729,7 +6940,7 @@
           <a:p>
             <a:r>
               <a:rPr lang="en-US" dirty="0" smtClean="0"/>
-              <a:t>System Requirements </a:t>
+              <a:t>User Requirements continued </a:t>
             </a:r>
             <a:endParaRPr lang="en-US" dirty="0"/>
           </a:p>
@@ -6752,14 +6963,7 @@
           <a:p>
             <a:r>
               <a:rPr lang="en-US" dirty="0" smtClean="0"/>
-              <a:t>4.1 Admin System Features</a:t>
-            </a:r>
-          </a:p>
-          <a:p>
-            <a:pPr lvl="1"/>
-            <a:r>
-              <a:rPr lang="en-US" dirty="0" smtClean="0"/>
-              <a:t>4.1.1 Teacher Registration </a:t>
+              <a:t>3.3 Software Interfaces </a:t>
             </a:r>
           </a:p>
           <a:p>
@@ -6772,15 +6976,7 @@
             </a:r>
             <a:r>
               <a:rPr lang="en-US" dirty="0" smtClean="0"/>
-              <a:t>- Register Teachers Accounts</a:t>
-            </a:r>
-            <a:endParaRPr lang="en-US" dirty="0"/>
-          </a:p>
-          <a:p>
-            <a:pPr lvl="1"/>
-            <a:r>
-              <a:rPr lang="en-US" dirty="0" smtClean="0"/>
-              <a:t>4.1.2 Teacher Password Reset</a:t>
+              <a:t>- will interface with a database</a:t>
             </a:r>
           </a:p>
           <a:p>
@@ -6793,7 +6989,7 @@
             </a:r>
             <a:r>
               <a:rPr lang="en-US" dirty="0" smtClean="0"/>
-              <a:t>- Admin shall reset teachers account passwords</a:t>
+              <a:t>- interface with a API</a:t>
             </a:r>
           </a:p>
           <a:p>
@@ -6806,7 +7002,7 @@
             </a:r>
             <a:r>
               <a:rPr lang="en-US" dirty="0" smtClean="0"/>
-              <a:t>- Generates a randomly generated password</a:t>
+              <a:t>- interface with Adobe Reader</a:t>
             </a:r>
             <a:endParaRPr lang="en-US" dirty="0"/>
           </a:p>
@@ -6815,7 +7011,7 @@
     </p:spTree>
     <p:extLst>
       <p:ext uri="{BB962C8B-B14F-4D97-AF65-F5344CB8AC3E}">
-        <p14:creationId xmlns:p14="http://schemas.microsoft.com/office/powerpoint/2010/main" val="1193365723"/>
+        <p14:creationId xmlns:p14="http://schemas.microsoft.com/office/powerpoint/2010/main" val="2021458727"/>
       </p:ext>
     </p:extLst>
   </p:cSld>
@@ -6859,7 +7055,7 @@
           <a:p>
             <a:r>
               <a:rPr lang="en-US" dirty="0" smtClean="0"/>
-              <a:t>System requirements continued</a:t>
+              <a:t>System Requirements </a:t>
             </a:r>
             <a:endParaRPr lang="en-US" dirty="0"/>
           </a:p>
@@ -6882,87 +7078,61 @@
           <a:p>
             <a:r>
               <a:rPr lang="en-US" dirty="0" smtClean="0"/>
-              <a:t>4.2 General System features </a:t>
-            </a:r>
-          </a:p>
-          <a:p>
-            <a:pPr lvl="1">
-              <a:buFontTx/>
-              <a:buChar char="-"/>
+              <a:t>4.1 Admin System Features</a:t>
+            </a:r>
+          </a:p>
+          <a:p>
+            <a:pPr lvl="1"/>
+            <a:r>
+              <a:rPr lang="en-US" dirty="0" smtClean="0"/>
+              <a:t>4.1.1 Teacher Registration </a:t>
+            </a:r>
+          </a:p>
+          <a:p>
+            <a:pPr marL="457200" lvl="1" indent="0">
+              <a:buNone/>
             </a:pPr>
             <a:r>
+              <a:rPr lang="en-US" dirty="0"/>
+              <a:t>	</a:t>
+            </a:r>
+            <a:r>
               <a:rPr lang="en-US" dirty="0" smtClean="0"/>
-              <a:t>4.2.1 Admin Account Setup</a:t>
-            </a:r>
-          </a:p>
-          <a:p>
-            <a:pPr lvl="1">
-              <a:buFontTx/>
-              <a:buChar char="-"/>
+              <a:t>- Register Teachers Accounts</a:t>
+            </a:r>
+            <a:endParaRPr lang="en-US" dirty="0"/>
+          </a:p>
+          <a:p>
+            <a:pPr lvl="1"/>
+            <a:r>
+              <a:rPr lang="en-US" dirty="0" smtClean="0"/>
+              <a:t>4.1.2 Teacher Password Reset</a:t>
+            </a:r>
+          </a:p>
+          <a:p>
+            <a:pPr marL="457200" lvl="1" indent="0">
+              <a:buNone/>
             </a:pPr>
             <a:r>
+              <a:rPr lang="en-US" dirty="0"/>
+              <a:t>	</a:t>
+            </a:r>
+            <a:r>
               <a:rPr lang="en-US" dirty="0" smtClean="0"/>
-              <a:t>4.2.2 Graphical User Interface </a:t>
-            </a:r>
-          </a:p>
-          <a:p>
-            <a:pPr lvl="1">
-              <a:buFontTx/>
-              <a:buChar char="-"/>
+              <a:t>- Admin shall reset teachers account passwords</a:t>
+            </a:r>
+          </a:p>
+          <a:p>
+            <a:pPr marL="457200" lvl="1" indent="0">
+              <a:buNone/>
             </a:pPr>
             <a:r>
+              <a:rPr lang="en-US" dirty="0"/>
+              <a:t>	</a:t>
+            </a:r>
+            <a:r>
               <a:rPr lang="en-US" dirty="0" smtClean="0"/>
-              <a:t>4.2.3 Help System</a:t>
-            </a:r>
-          </a:p>
-          <a:p>
-            <a:pPr lvl="1">
-              <a:buFontTx/>
-              <a:buChar char="-"/>
-            </a:pPr>
-            <a:r>
-              <a:rPr lang="en-US" dirty="0" smtClean="0"/>
-              <a:t>4.2.4 Tutorial content</a:t>
-            </a:r>
-          </a:p>
-          <a:p>
-            <a:pPr lvl="1">
-              <a:buFontTx/>
-              <a:buChar char="-"/>
-            </a:pPr>
-            <a:r>
-              <a:rPr lang="en-US" dirty="0" smtClean="0"/>
-              <a:t>Random Exercise Generation </a:t>
-            </a:r>
-          </a:p>
-          <a:p>
-            <a:pPr lvl="1">
-              <a:buFontTx/>
-              <a:buChar char="-"/>
-            </a:pPr>
-            <a:r>
-              <a:rPr lang="en-US" dirty="0" smtClean="0"/>
-              <a:t>Worksheet Instructions </a:t>
-            </a:r>
-          </a:p>
-          <a:p>
-            <a:pPr lvl="1">
-              <a:buFontTx/>
-              <a:buChar char="-"/>
-            </a:pPr>
-            <a:r>
-              <a:rPr lang="en-US" dirty="0" smtClean="0"/>
-              <a:t>PDF Options</a:t>
-            </a:r>
-          </a:p>
-          <a:p>
-            <a:pPr lvl="1">
-              <a:buFontTx/>
-              <a:buChar char="-"/>
-            </a:pPr>
-            <a:r>
-              <a:rPr lang="en-US" dirty="0" smtClean="0"/>
-              <a:t>Search Features </a:t>
+              <a:t>- Generates a randomly generated password</a:t>
             </a:r>
             <a:endParaRPr lang="en-US" dirty="0"/>
           </a:p>
@@ -6971,7 +7141,7 @@
     </p:spTree>
     <p:extLst>
       <p:ext uri="{BB962C8B-B14F-4D97-AF65-F5344CB8AC3E}">
-        <p14:creationId xmlns:p14="http://schemas.microsoft.com/office/powerpoint/2010/main" val="1882224459"/>
+        <p14:creationId xmlns:p14="http://schemas.microsoft.com/office/powerpoint/2010/main" val="1193365723"/>
       </p:ext>
     </p:extLst>
   </p:cSld>
@@ -7015,7 +7185,7 @@
           <a:p>
             <a:r>
               <a:rPr lang="en-US" dirty="0" smtClean="0"/>
-              <a:t>System Requirements Continued </a:t>
+              <a:t>System requirements continued</a:t>
             </a:r>
             <a:endParaRPr lang="en-US" dirty="0"/>
           </a:p>
@@ -7033,131 +7203,92 @@
         </p:nvSpPr>
         <p:spPr/>
         <p:txBody>
-          <a:bodyPr>
-            <a:normAutofit lnSpcReduction="10000"/>
-          </a:bodyPr>
+          <a:bodyPr/>
           <a:lstStyle/>
           <a:p>
             <a:r>
               <a:rPr lang="en-US" dirty="0" smtClean="0"/>
-              <a:t>4.3 Teacher System Features </a:t>
-            </a:r>
-          </a:p>
-          <a:p>
-            <a:pPr marL="0" indent="0">
-              <a:buNone/>
+              <a:t>4.2 General System features </a:t>
+            </a:r>
+          </a:p>
+          <a:p>
+            <a:pPr lvl="1">
+              <a:buFontTx/>
+              <a:buChar char="-"/>
             </a:pPr>
             <a:r>
-              <a:rPr lang="en-US" dirty="0"/>
-              <a:t>	</a:t>
-            </a:r>
-            <a:r>
               <a:rPr lang="en-US" dirty="0" smtClean="0"/>
-              <a:t>- 4.3.1 Teacher System Access</a:t>
-            </a:r>
-          </a:p>
-          <a:p>
-            <a:pPr marL="0" indent="0">
-              <a:buNone/>
+              <a:t>4.2.1 Admin Account Setup</a:t>
+            </a:r>
+          </a:p>
+          <a:p>
+            <a:pPr lvl="1">
+              <a:buFontTx/>
+              <a:buChar char="-"/>
             </a:pPr>
             <a:r>
-              <a:rPr lang="en-US" dirty="0"/>
-              <a:t>	</a:t>
-            </a:r>
-            <a:r>
               <a:rPr lang="en-US" dirty="0" smtClean="0"/>
-              <a:t>- 4.3.2 Teacher Password Reset</a:t>
-            </a:r>
-          </a:p>
-          <a:p>
-            <a:pPr marL="0" indent="0">
-              <a:buNone/>
+              <a:t>4.2.2 Graphical User Interface </a:t>
+            </a:r>
+          </a:p>
+          <a:p>
+            <a:pPr lvl="1">
+              <a:buFontTx/>
+              <a:buChar char="-"/>
             </a:pPr>
             <a:r>
-              <a:rPr lang="en-US" dirty="0"/>
-              <a:t>	</a:t>
-            </a:r>
-            <a:r>
               <a:rPr lang="en-US" dirty="0" smtClean="0"/>
-              <a:t>- 4.3.3 Teacher Worksheet Selection</a:t>
-            </a:r>
-          </a:p>
-          <a:p>
-            <a:pPr marL="0" indent="0">
-              <a:buNone/>
+              <a:t>4.2.3 Help System</a:t>
+            </a:r>
+          </a:p>
+          <a:p>
+            <a:pPr lvl="1">
+              <a:buFontTx/>
+              <a:buChar char="-"/>
             </a:pPr>
             <a:r>
-              <a:rPr lang="en-US" dirty="0"/>
-              <a:t>	</a:t>
-            </a:r>
-            <a:r>
               <a:rPr lang="en-US" dirty="0" smtClean="0"/>
-              <a:t>- 4.3.4 Worksheet Parameter Option</a:t>
-            </a:r>
-          </a:p>
-          <a:p>
-            <a:pPr marL="0" indent="0">
-              <a:buNone/>
+              <a:t>4.2.4 Tutorial content</a:t>
+            </a:r>
+          </a:p>
+          <a:p>
+            <a:pPr lvl="1">
+              <a:buFontTx/>
+              <a:buChar char="-"/>
             </a:pPr>
             <a:r>
-              <a:rPr lang="en-US" dirty="0"/>
-              <a:t>	</a:t>
-            </a:r>
-            <a:r>
               <a:rPr lang="en-US" dirty="0" smtClean="0"/>
-              <a:t>- 4.3.5 Student Worksheet Review </a:t>
-            </a:r>
-          </a:p>
-          <a:p>
-            <a:pPr marL="0" indent="0">
-              <a:buNone/>
+              <a:t>Random Exercise Generation </a:t>
+            </a:r>
+          </a:p>
+          <a:p>
+            <a:pPr lvl="1">
+              <a:buFontTx/>
+              <a:buChar char="-"/>
             </a:pPr>
             <a:r>
               <a:rPr lang="en-US" dirty="0" smtClean="0"/>
-              <a:t>	- 4.3.6 Student Worksheet Deletion</a:t>
-            </a:r>
-          </a:p>
-          <a:p>
-            <a:pPr marL="0" indent="0">
-              <a:buNone/>
+              <a:t>Worksheet Instructions </a:t>
+            </a:r>
+          </a:p>
+          <a:p>
+            <a:pPr lvl="1">
+              <a:buFontTx/>
+              <a:buChar char="-"/>
             </a:pPr>
             <a:r>
-              <a:rPr lang="en-US" dirty="0"/>
-              <a:t>	</a:t>
-            </a:r>
-            <a:r>
               <a:rPr lang="en-US" dirty="0" smtClean="0"/>
-              <a:t>- 4.3.7 Class Roster Creation</a:t>
-            </a:r>
-          </a:p>
-          <a:p>
-            <a:pPr marL="0" indent="0">
-              <a:buNone/>
+              <a:t>PDF Options</a:t>
+            </a:r>
+          </a:p>
+          <a:p>
+            <a:pPr lvl="1">
+              <a:buFontTx/>
+              <a:buChar char="-"/>
             </a:pPr>
             <a:r>
-              <a:rPr lang="en-US" dirty="0"/>
-              <a:t>	</a:t>
-            </a:r>
-            <a:r>
               <a:rPr lang="en-US" dirty="0" smtClean="0"/>
-              <a:t>- 4.3.8 Student Login Management</a:t>
-            </a:r>
-          </a:p>
-          <a:p>
-            <a:pPr marL="0" indent="0">
-              <a:buNone/>
-            </a:pPr>
-            <a:r>
-              <a:rPr lang="en-US" dirty="0"/>
-              <a:t>	</a:t>
-            </a:r>
-            <a:r>
-              <a:rPr lang="en-US" dirty="0" smtClean="0"/>
-              <a:t>- 4.3.9 Student Difficulty </a:t>
-            </a:r>
-            <a:r>
-              <a:rPr lang="en-US" dirty="0" err="1" smtClean="0"/>
-              <a:t>Managament</a:t>
+              <a:t>Search Features </a:t>
             </a:r>
             <a:endParaRPr lang="en-US" dirty="0"/>
           </a:p>
@@ -7166,7 +7297,7 @@
     </p:spTree>
     <p:extLst>
       <p:ext uri="{BB962C8B-B14F-4D97-AF65-F5344CB8AC3E}">
-        <p14:creationId xmlns:p14="http://schemas.microsoft.com/office/powerpoint/2010/main" val="1361008139"/>
+        <p14:creationId xmlns:p14="http://schemas.microsoft.com/office/powerpoint/2010/main" val="1882224459"/>
       </p:ext>
     </p:extLst>
   </p:cSld>
@@ -7203,19 +7334,14 @@
             <p:ph type="title"/>
           </p:nvPr>
         </p:nvSpPr>
-        <p:spPr>
-          <a:xfrm>
-            <a:off x="2895600" y="117859"/>
-            <a:ext cx="8610600" cy="1293028"/>
-          </a:xfrm>
-        </p:spPr>
+        <p:spPr/>
         <p:txBody>
           <a:bodyPr/>
           <a:lstStyle/>
           <a:p>
             <a:r>
               <a:rPr lang="en-US" dirty="0" smtClean="0"/>
-              <a:t>Other nonfunctional Requirements </a:t>
+              <a:t>System Requirements Continued </a:t>
             </a:r>
             <a:endParaRPr lang="en-US" dirty="0"/>
           </a:p>
@@ -7231,41 +7357,16 @@
             <p:ph idx="1"/>
           </p:nvPr>
         </p:nvSpPr>
-        <p:spPr>
-          <a:xfrm>
-            <a:off x="685800" y="1445209"/>
-            <a:ext cx="10820400" cy="4784266"/>
-          </a:xfrm>
-        </p:spPr>
+        <p:spPr/>
         <p:txBody>
           <a:bodyPr>
-            <a:normAutofit/>
+            <a:normAutofit lnSpcReduction="10000"/>
           </a:bodyPr>
           <a:lstStyle/>
           <a:p>
             <a:r>
-              <a:rPr lang="en-US" b="1" u="sng" dirty="0" smtClean="0"/>
-              <a:t>5.1 Performance Requirements </a:t>
-            </a:r>
-          </a:p>
-          <a:p>
-            <a:pPr marL="457200" lvl="1" indent="0">
-              <a:buNone/>
-            </a:pPr>
-            <a:r>
               <a:rPr lang="en-US" dirty="0" smtClean="0"/>
-              <a:t>	-Number of Users </a:t>
-            </a:r>
-            <a:r>
-              <a:rPr lang="en-US" dirty="0" smtClean="0"/>
-              <a:t> shall not be limited</a:t>
-            </a:r>
-            <a:endParaRPr lang="en-US" dirty="0" smtClean="0"/>
-          </a:p>
-          <a:p>
-            <a:r>
-              <a:rPr lang="en-US" b="1" u="sng" dirty="0" smtClean="0"/>
-              <a:t>5.2 Safety Requirements </a:t>
+              <a:t>4.3 Teacher System Features </a:t>
             </a:r>
           </a:p>
           <a:p>
@@ -7278,30 +7379,11 @@
             </a:r>
             <a:r>
               <a:rPr lang="en-US" dirty="0" smtClean="0"/>
-              <a:t>-None have been identified </a:t>
-            </a:r>
-          </a:p>
-          <a:p>
-            <a:r>
-              <a:rPr lang="en-US" b="1" u="sng" dirty="0" smtClean="0"/>
-              <a:t>5.3 Security Requirements </a:t>
-            </a:r>
-          </a:p>
-          <a:p>
-            <a:pPr marL="457200" lvl="1" indent="0">
-              <a:buNone/>
-            </a:pPr>
-            <a:r>
-              <a:rPr lang="en-US" dirty="0"/>
-              <a:t> </a:t>
-            </a:r>
-            <a:r>
-              <a:rPr lang="en-US" dirty="0" smtClean="0"/>
-              <a:t>	-  Only allow authorized users </a:t>
-            </a:r>
-          </a:p>
-          <a:p>
-            <a:pPr marL="457200" lvl="1" indent="0">
+              <a:t>- 4.3.1 Teacher System Access</a:t>
+            </a:r>
+          </a:p>
+          <a:p>
+            <a:pPr marL="0" indent="0">
               <a:buNone/>
             </a:pPr>
             <a:r>
@@ -7310,27 +7392,7 @@
             </a:r>
             <a:r>
               <a:rPr lang="en-US" dirty="0" smtClean="0"/>
-              <a:t>-  Require username and password </a:t>
-            </a:r>
-          </a:p>
-          <a:p>
-            <a:pPr marL="457200" lvl="1" indent="0">
-              <a:buNone/>
-            </a:pPr>
-            <a:r>
-              <a:rPr lang="en-US" dirty="0" smtClean="0"/>
-              <a:t>	-  Securely Store password </a:t>
-            </a:r>
-            <a:r>
-              <a:rPr lang="en-US" dirty="0" smtClean="0"/>
-              <a:t>in a database</a:t>
-            </a:r>
-            <a:endParaRPr lang="en-US" dirty="0"/>
-          </a:p>
-          <a:p>
-            <a:r>
-              <a:rPr lang="en-US" b="1" u="sng" dirty="0" smtClean="0"/>
-              <a:t>5.4 Software Quality Attributes </a:t>
+              <a:t>- 4.3.2 Teacher Password Reset</a:t>
             </a:r>
           </a:p>
           <a:p>
@@ -7343,7 +7405,7 @@
             </a:r>
             <a:r>
               <a:rPr lang="en-US" dirty="0" smtClean="0"/>
-              <a:t>- Correctness </a:t>
+              <a:t>- 4.3.3 Teacher Worksheet Selection</a:t>
             </a:r>
           </a:p>
           <a:p>
@@ -7356,7 +7418,7 @@
             </a:r>
             <a:r>
               <a:rPr lang="en-US" dirty="0" smtClean="0"/>
-              <a:t>- Interoperability</a:t>
+              <a:t>- 4.3.4 Worksheet Parameter Option</a:t>
             </a:r>
           </a:p>
           <a:p>
@@ -7369,15 +7431,68 @@
             </a:r>
             <a:r>
               <a:rPr lang="en-US" dirty="0" smtClean="0"/>
-              <a:t>- Usability</a:t>
-            </a:r>
+              <a:t>- 4.3.5 Student Worksheet Review </a:t>
+            </a:r>
+          </a:p>
+          <a:p>
+            <a:pPr marL="0" indent="0">
+              <a:buNone/>
+            </a:pPr>
+            <a:r>
+              <a:rPr lang="en-US" dirty="0" smtClean="0"/>
+              <a:t>	- 4.3.6 Student Worksheet Deletion</a:t>
+            </a:r>
+          </a:p>
+          <a:p>
+            <a:pPr marL="0" indent="0">
+              <a:buNone/>
+            </a:pPr>
+            <a:r>
+              <a:rPr lang="en-US" dirty="0"/>
+              <a:t>	</a:t>
+            </a:r>
+            <a:r>
+              <a:rPr lang="en-US" dirty="0" smtClean="0"/>
+              <a:t>- 4.3.7 Class Roster Creation</a:t>
+            </a:r>
+          </a:p>
+          <a:p>
+            <a:pPr marL="0" indent="0">
+              <a:buNone/>
+            </a:pPr>
+            <a:r>
+              <a:rPr lang="en-US" dirty="0"/>
+              <a:t>	</a:t>
+            </a:r>
+            <a:r>
+              <a:rPr lang="en-US" dirty="0" smtClean="0"/>
+              <a:t>- 4.3.8 Student Login Management</a:t>
+            </a:r>
+          </a:p>
+          <a:p>
+            <a:pPr marL="0" indent="0">
+              <a:buNone/>
+            </a:pPr>
+            <a:r>
+              <a:rPr lang="en-US" dirty="0"/>
+              <a:t>	</a:t>
+            </a:r>
+            <a:r>
+              <a:rPr lang="en-US" dirty="0" smtClean="0"/>
+              <a:t>- 4.3.9 Student Difficulty </a:t>
+            </a:r>
+            <a:r>
+              <a:rPr lang="en-US" dirty="0" err="1" smtClean="0"/>
+              <a:t>Managament</a:t>
+            </a:r>
+            <a:endParaRPr lang="en-US" dirty="0"/>
           </a:p>
         </p:txBody>
       </p:sp>
     </p:spTree>
     <p:extLst>
       <p:ext uri="{BB962C8B-B14F-4D97-AF65-F5344CB8AC3E}">
-        <p14:creationId xmlns:p14="http://schemas.microsoft.com/office/powerpoint/2010/main" val="1418613171"/>
+        <p14:creationId xmlns:p14="http://schemas.microsoft.com/office/powerpoint/2010/main" val="1361008139"/>
       </p:ext>
     </p:extLst>
   </p:cSld>

</xml_diff>

<commit_message>
Add SRS Section 2, GUI mockup, and transitions to PPT
Also formatted all text for consistency. The presentation is complete
at this point, unless we want to add the Appendices.
</commit_message>
<xml_diff>
--- a/Presentation Elementary Engineers .pptx
+++ b/Presentation Elementary Engineers .pptx
@@ -8,15 +8,19 @@
     <p:sldId id="256" r:id="rId2"/>
     <p:sldId id="257" r:id="rId3"/>
     <p:sldId id="267" r:id="rId4"/>
-    <p:sldId id="258" r:id="rId5"/>
-    <p:sldId id="259" r:id="rId6"/>
-    <p:sldId id="260" r:id="rId7"/>
-    <p:sldId id="261" r:id="rId8"/>
-    <p:sldId id="262" r:id="rId9"/>
-    <p:sldId id="263" r:id="rId10"/>
-    <p:sldId id="264" r:id="rId11"/>
-    <p:sldId id="265" r:id="rId12"/>
-    <p:sldId id="266" r:id="rId13"/>
+    <p:sldId id="268" r:id="rId5"/>
+    <p:sldId id="258" r:id="rId6"/>
+    <p:sldId id="269" r:id="rId7"/>
+    <p:sldId id="270" r:id="rId8"/>
+    <p:sldId id="259" r:id="rId9"/>
+    <p:sldId id="260" r:id="rId10"/>
+    <p:sldId id="261" r:id="rId11"/>
+    <p:sldId id="262" r:id="rId12"/>
+    <p:sldId id="263" r:id="rId13"/>
+    <p:sldId id="264" r:id="rId14"/>
+    <p:sldId id="265" r:id="rId15"/>
+    <p:sldId id="266" r:id="rId16"/>
+    <p:sldId id="271" r:id="rId17"/>
   </p:sldIdLst>
   <p:sldSz cx="12192000" cy="6858000"/>
   <p:notesSz cx="6858000" cy="9144000"/>
@@ -115,6 +119,22 @@
       </a:defRPr>
     </a:lvl9pPr>
   </p:defaultTextStyle>
+  <p:extLst>
+    <p:ext uri="{EFAFB233-063F-42B5-8137-9DF3F51BA10A}">
+      <p15:sldGuideLst xmlns:p15="http://schemas.microsoft.com/office/powerpoint/2012/main">
+        <p15:guide id="1" orient="horz" pos="2160">
+          <p15:clr>
+            <a:srgbClr val="A4A3A4"/>
+          </p15:clr>
+        </p15:guide>
+        <p15:guide id="2" pos="3840">
+          <p15:clr>
+            <a:srgbClr val="A4A3A4"/>
+          </p15:clr>
+        </p15:guide>
+      </p15:sldGuideLst>
+    </p:ext>
+  </p:extLst>
 </p:presentation>
 </file>
 
@@ -288,7 +308,7 @@
           <a:p>
             <a:fld id="{48A87A34-81AB-432B-8DAE-1953F412C126}" type="datetimeFigureOut">
               <a:rPr lang="en-US" dirty="0"/>
-              <a:t>2/17/16</a:t>
+              <a:t>2/18/16</a:t>
             </a:fld>
             <a:endParaRPr lang="en-US" dirty="0"/>
           </a:p>
@@ -351,6 +371,18 @@
   <p:clrMapOvr>
     <a:masterClrMapping/>
   </p:clrMapOvr>
+  <mc:AlternateContent xmlns:mc="http://schemas.openxmlformats.org/markup-compatibility/2006">
+    <mc:Choice xmlns:p14="http://schemas.microsoft.com/office/powerpoint/2010/main" Requires="p14">
+      <p:transition spd="slow">
+        <p14:reveal/>
+      </p:transition>
+    </mc:Choice>
+    <mc:Fallback>
+      <p:transition spd="slow">
+        <p:fade/>
+      </p:transition>
+    </mc:Fallback>
+  </mc:AlternateContent>
 </p:sldLayout>
 </file>
 
@@ -550,7 +582,7 @@
           <a:p>
             <a:fld id="{48A87A34-81AB-432B-8DAE-1953F412C126}" type="datetimeFigureOut">
               <a:rPr lang="en-US" dirty="0"/>
-              <a:t>2/17/16</a:t>
+              <a:t>2/18/16</a:t>
             </a:fld>
             <a:endParaRPr lang="en-US" dirty="0"/>
           </a:p>
@@ -603,6 +635,18 @@
   <p:clrMapOvr>
     <a:masterClrMapping/>
   </p:clrMapOvr>
+  <mc:AlternateContent xmlns:mc="http://schemas.openxmlformats.org/markup-compatibility/2006">
+    <mc:Choice xmlns:p14="http://schemas.microsoft.com/office/powerpoint/2010/main" Requires="p14">
+      <p:transition spd="slow">
+        <p14:reveal/>
+      </p:transition>
+    </mc:Choice>
+    <mc:Fallback>
+      <p:transition spd="slow">
+        <p:fade/>
+      </p:transition>
+    </mc:Fallback>
+  </mc:AlternateContent>
 </p:sldLayout>
 </file>
 
@@ -777,7 +821,7 @@
             <a:fld id="{48A87A34-81AB-432B-8DAE-1953F412C126}" type="datetimeFigureOut">
               <a:rPr lang="en-US" dirty="0"/>
               <a:pPr/>
-              <a:t>2/17/16</a:t>
+              <a:t>2/18/16</a:t>
             </a:fld>
             <a:endParaRPr lang="en-US" dirty="0"/>
           </a:p>
@@ -840,6 +884,18 @@
   <p:clrMapOvr>
     <a:masterClrMapping/>
   </p:clrMapOvr>
+  <mc:AlternateContent xmlns:mc="http://schemas.openxmlformats.org/markup-compatibility/2006">
+    <mc:Choice xmlns:p14="http://schemas.microsoft.com/office/powerpoint/2010/main" Requires="p14">
+      <p:transition spd="slow">
+        <p14:reveal/>
+      </p:transition>
+    </mc:Choice>
+    <mc:Fallback>
+      <p:transition spd="slow">
+        <p:fade/>
+      </p:transition>
+    </mc:Fallback>
+  </mc:AlternateContent>
 </p:sldLayout>
 </file>
 
@@ -1083,7 +1139,7 @@
             <a:fld id="{48A87A34-81AB-432B-8DAE-1953F412C126}" type="datetimeFigureOut">
               <a:rPr lang="en-US" dirty="0"/>
               <a:pPr/>
-              <a:t>2/17/16</a:t>
+              <a:t>2/18/16</a:t>
             </a:fld>
             <a:endParaRPr lang="en-US" dirty="0"/>
           </a:p>
@@ -1378,6 +1434,18 @@
   <p:clrMapOvr>
     <a:masterClrMapping/>
   </p:clrMapOvr>
+  <mc:AlternateContent xmlns:mc="http://schemas.openxmlformats.org/markup-compatibility/2006">
+    <mc:Choice xmlns:p14="http://schemas.microsoft.com/office/powerpoint/2010/main" Requires="p14">
+      <p:transition spd="slow">
+        <p14:reveal/>
+      </p:transition>
+    </mc:Choice>
+    <mc:Fallback>
+      <p:transition spd="slow">
+        <p:fade/>
+      </p:transition>
+    </mc:Fallback>
+  </mc:AlternateContent>
 </p:sldLayout>
 </file>
 
@@ -1552,7 +1620,7 @@
             <a:fld id="{48A87A34-81AB-432B-8DAE-1953F412C126}" type="datetimeFigureOut">
               <a:rPr lang="en-US" dirty="0"/>
               <a:pPr/>
-              <a:t>2/17/16</a:t>
+              <a:t>2/18/16</a:t>
             </a:fld>
             <a:endParaRPr lang="en-US" dirty="0"/>
           </a:p>
@@ -1615,6 +1683,18 @@
   <p:clrMapOvr>
     <a:masterClrMapping/>
   </p:clrMapOvr>
+  <mc:AlternateContent xmlns:mc="http://schemas.openxmlformats.org/markup-compatibility/2006">
+    <mc:Choice xmlns:p14="http://schemas.microsoft.com/office/powerpoint/2010/main" Requires="p14">
+      <p:transition spd="slow">
+        <p14:reveal/>
+      </p:transition>
+    </mc:Choice>
+    <mc:Fallback>
+      <p:transition spd="slow">
+        <p:fade/>
+      </p:transition>
+    </mc:Fallback>
+  </mc:AlternateContent>
 </p:sldLayout>
 </file>
 
@@ -2094,7 +2174,7 @@
           <a:p>
             <a:fld id="{48A87A34-81AB-432B-8DAE-1953F412C126}" type="datetimeFigureOut">
               <a:rPr lang="en-US" dirty="0"/>
-              <a:t>2/17/16</a:t>
+              <a:t>2/18/16</a:t>
             </a:fld>
             <a:endParaRPr lang="en-US" dirty="0"/>
           </a:p>
@@ -2147,6 +2227,18 @@
   <p:clrMapOvr>
     <a:masterClrMapping/>
   </p:clrMapOvr>
+  <mc:AlternateContent xmlns:mc="http://schemas.openxmlformats.org/markup-compatibility/2006">
+    <mc:Choice xmlns:p14="http://schemas.microsoft.com/office/powerpoint/2010/main" Requires="p14">
+      <p:transition spd="slow">
+        <p14:reveal/>
+      </p:transition>
+    </mc:Choice>
+    <mc:Fallback>
+      <p:transition spd="slow">
+        <p:fade/>
+      </p:transition>
+    </mc:Fallback>
+  </mc:AlternateContent>
 </p:sldLayout>
 </file>
 
@@ -2863,7 +2955,7 @@
           <a:p>
             <a:fld id="{48A87A34-81AB-432B-8DAE-1953F412C126}" type="datetimeFigureOut">
               <a:rPr lang="en-US" dirty="0"/>
-              <a:t>2/17/16</a:t>
+              <a:t>2/18/16</a:t>
             </a:fld>
             <a:endParaRPr lang="en-US" dirty="0"/>
           </a:p>
@@ -2916,6 +3008,18 @@
   <p:clrMapOvr>
     <a:masterClrMapping/>
   </p:clrMapOvr>
+  <mc:AlternateContent xmlns:mc="http://schemas.openxmlformats.org/markup-compatibility/2006">
+    <mc:Choice xmlns:p14="http://schemas.microsoft.com/office/powerpoint/2010/main" Requires="p14">
+      <p:transition spd="slow">
+        <p14:reveal/>
+      </p:transition>
+    </mc:Choice>
+    <mc:Fallback>
+      <p:transition spd="slow">
+        <p:fade/>
+      </p:transition>
+    </mc:Fallback>
+  </mc:AlternateContent>
 </p:sldLayout>
 </file>
 
@@ -3033,7 +3137,7 @@
           <a:p>
             <a:fld id="{48A87A34-81AB-432B-8DAE-1953F412C126}" type="datetimeFigureOut">
               <a:rPr lang="en-US" dirty="0"/>
-              <a:t>2/17/16</a:t>
+              <a:t>2/18/16</a:t>
             </a:fld>
             <a:endParaRPr lang="en-US" dirty="0"/>
           </a:p>
@@ -3086,6 +3190,18 @@
   <p:clrMapOvr>
     <a:masterClrMapping/>
   </p:clrMapOvr>
+  <mc:AlternateContent xmlns:mc="http://schemas.openxmlformats.org/markup-compatibility/2006">
+    <mc:Choice xmlns:p14="http://schemas.microsoft.com/office/powerpoint/2010/main" Requires="p14">
+      <p:transition spd="slow">
+        <p14:reveal/>
+      </p:transition>
+    </mc:Choice>
+    <mc:Fallback>
+      <p:transition spd="slow">
+        <p:fade/>
+      </p:transition>
+    </mc:Fallback>
+  </mc:AlternateContent>
 </p:sldLayout>
 </file>
 
@@ -3252,7 +3368,7 @@
             <a:fld id="{48A87A34-81AB-432B-8DAE-1953F412C126}" type="datetimeFigureOut">
               <a:rPr lang="en-US" dirty="0"/>
               <a:pPr/>
-              <a:t>2/17/16</a:t>
+              <a:t>2/18/16</a:t>
             </a:fld>
             <a:endParaRPr lang="en-US" dirty="0"/>
           </a:p>
@@ -3315,6 +3431,18 @@
   <p:clrMapOvr>
     <a:masterClrMapping/>
   </p:clrMapOvr>
+  <mc:AlternateContent xmlns:mc="http://schemas.openxmlformats.org/markup-compatibility/2006">
+    <mc:Choice xmlns:p14="http://schemas.microsoft.com/office/powerpoint/2010/main" Requires="p14">
+      <p:transition spd="slow">
+        <p14:reveal/>
+      </p:transition>
+    </mc:Choice>
+    <mc:Fallback>
+      <p:transition spd="slow">
+        <p:fade/>
+      </p:transition>
+    </mc:Fallback>
+  </mc:AlternateContent>
 </p:sldLayout>
 </file>
 
@@ -3427,7 +3555,7 @@
           <a:p>
             <a:fld id="{48A87A34-81AB-432B-8DAE-1953F412C126}" type="datetimeFigureOut">
               <a:rPr lang="en-US" dirty="0"/>
-              <a:t>2/17/16</a:t>
+              <a:t>2/18/16</a:t>
             </a:fld>
             <a:endParaRPr lang="en-US" dirty="0"/>
           </a:p>
@@ -3480,6 +3608,18 @@
   <p:clrMapOvr>
     <a:masterClrMapping/>
   </p:clrMapOvr>
+  <mc:AlternateContent xmlns:mc="http://schemas.openxmlformats.org/markup-compatibility/2006">
+    <mc:Choice xmlns:p14="http://schemas.microsoft.com/office/powerpoint/2010/main" Requires="p14">
+      <p:transition spd="slow">
+        <p14:reveal/>
+      </p:transition>
+    </mc:Choice>
+    <mc:Fallback>
+      <p:transition spd="slow">
+        <p:fade/>
+      </p:transition>
+    </mc:Fallback>
+  </mc:AlternateContent>
 </p:sldLayout>
 </file>
 
@@ -3712,7 +3852,7 @@
             <a:fld id="{48A87A34-81AB-432B-8DAE-1953F412C126}" type="datetimeFigureOut">
               <a:rPr lang="en-US" dirty="0"/>
               <a:pPr/>
-              <a:t>2/17/16</a:t>
+              <a:t>2/18/16</a:t>
             </a:fld>
             <a:endParaRPr lang="en-US" dirty="0"/>
           </a:p>
@@ -3775,6 +3915,18 @@
   <p:clrMapOvr>
     <a:masterClrMapping/>
   </p:clrMapOvr>
+  <mc:AlternateContent xmlns:mc="http://schemas.openxmlformats.org/markup-compatibility/2006">
+    <mc:Choice xmlns:p14="http://schemas.microsoft.com/office/powerpoint/2010/main" Requires="p14">
+      <p:transition spd="slow">
+        <p14:reveal/>
+      </p:transition>
+    </mc:Choice>
+    <mc:Fallback>
+      <p:transition spd="slow">
+        <p:fade/>
+      </p:transition>
+    </mc:Fallback>
+  </mc:AlternateContent>
 </p:sldLayout>
 </file>
 
@@ -3949,7 +4101,7 @@
           <a:p>
             <a:fld id="{48A87A34-81AB-432B-8DAE-1953F412C126}" type="datetimeFigureOut">
               <a:rPr lang="en-US" dirty="0"/>
-              <a:t>2/17/16</a:t>
+              <a:t>2/18/16</a:t>
             </a:fld>
             <a:endParaRPr lang="en-US" dirty="0"/>
           </a:p>
@@ -4002,6 +4154,18 @@
   <p:clrMapOvr>
     <a:masterClrMapping/>
   </p:clrMapOvr>
+  <mc:AlternateContent xmlns:mc="http://schemas.openxmlformats.org/markup-compatibility/2006">
+    <mc:Choice xmlns:p14="http://schemas.microsoft.com/office/powerpoint/2010/main" Requires="p14">
+      <p:transition spd="slow">
+        <p14:reveal/>
+      </p:transition>
+    </mc:Choice>
+    <mc:Fallback>
+      <p:transition spd="slow">
+        <p:fade/>
+      </p:transition>
+    </mc:Fallback>
+  </mc:AlternateContent>
 </p:sldLayout>
 </file>
 
@@ -4323,7 +4487,7 @@
           <a:p>
             <a:fld id="{48A87A34-81AB-432B-8DAE-1953F412C126}" type="datetimeFigureOut">
               <a:rPr lang="en-US" dirty="0"/>
-              <a:t>2/17/16</a:t>
+              <a:t>2/18/16</a:t>
             </a:fld>
             <a:endParaRPr lang="en-US" dirty="0"/>
           </a:p>
@@ -4376,6 +4540,18 @@
   <p:clrMapOvr>
     <a:masterClrMapping/>
   </p:clrMapOvr>
+  <mc:AlternateContent xmlns:mc="http://schemas.openxmlformats.org/markup-compatibility/2006">
+    <mc:Choice xmlns:p14="http://schemas.microsoft.com/office/powerpoint/2010/main" Requires="p14">
+      <p:transition spd="slow">
+        <p14:reveal/>
+      </p:transition>
+    </mc:Choice>
+    <mc:Fallback>
+      <p:transition spd="slow">
+        <p:fade/>
+      </p:transition>
+    </mc:Fallback>
+  </mc:AlternateContent>
 </p:sldLayout>
 </file>
 
@@ -4436,7 +4612,7 @@
           <a:p>
             <a:fld id="{48A87A34-81AB-432B-8DAE-1953F412C126}" type="datetimeFigureOut">
               <a:rPr lang="en-US" dirty="0"/>
-              <a:t>2/17/16</a:t>
+              <a:t>2/18/16</a:t>
             </a:fld>
             <a:endParaRPr lang="en-US" dirty="0"/>
           </a:p>
@@ -4489,6 +4665,18 @@
   <p:clrMapOvr>
     <a:masterClrMapping/>
   </p:clrMapOvr>
+  <mc:AlternateContent xmlns:mc="http://schemas.openxmlformats.org/markup-compatibility/2006">
+    <mc:Choice xmlns:p14="http://schemas.microsoft.com/office/powerpoint/2010/main" Requires="p14">
+      <p:transition spd="slow">
+        <p14:reveal/>
+      </p:transition>
+    </mc:Choice>
+    <mc:Fallback>
+      <p:transition spd="slow">
+        <p:fade/>
+      </p:transition>
+    </mc:Fallback>
+  </mc:AlternateContent>
 </p:sldLayout>
 </file>
 
@@ -4526,7 +4714,7 @@
           <a:p>
             <a:fld id="{48A87A34-81AB-432B-8DAE-1953F412C126}" type="datetimeFigureOut">
               <a:rPr lang="en-US" dirty="0"/>
-              <a:t>2/17/16</a:t>
+              <a:t>2/18/16</a:t>
             </a:fld>
             <a:endParaRPr lang="en-US" dirty="0"/>
           </a:p>
@@ -4579,6 +4767,18 @@
   <p:clrMapOvr>
     <a:masterClrMapping/>
   </p:clrMapOvr>
+  <mc:AlternateContent xmlns:mc="http://schemas.openxmlformats.org/markup-compatibility/2006">
+    <mc:Choice xmlns:p14="http://schemas.microsoft.com/office/powerpoint/2010/main" Requires="p14">
+      <p:transition spd="slow">
+        <p14:reveal/>
+      </p:transition>
+    </mc:Choice>
+    <mc:Fallback>
+      <p:transition spd="slow">
+        <p:fade/>
+      </p:transition>
+    </mc:Fallback>
+  </mc:AlternateContent>
 </p:sldLayout>
 </file>
 
@@ -4770,7 +4970,7 @@
           <a:p>
             <a:fld id="{48A87A34-81AB-432B-8DAE-1953F412C126}" type="datetimeFigureOut">
               <a:rPr lang="en-US" dirty="0"/>
-              <a:t>2/17/16</a:t>
+              <a:t>2/18/16</a:t>
             </a:fld>
             <a:endParaRPr lang="en-US" dirty="0"/>
           </a:p>
@@ -4823,6 +5023,18 @@
   <p:clrMapOvr>
     <a:masterClrMapping/>
   </p:clrMapOvr>
+  <mc:AlternateContent xmlns:mc="http://schemas.openxmlformats.org/markup-compatibility/2006">
+    <mc:Choice xmlns:p14="http://schemas.microsoft.com/office/powerpoint/2010/main" Requires="p14">
+      <p:transition spd="slow">
+        <p14:reveal/>
+      </p:transition>
+    </mc:Choice>
+    <mc:Fallback>
+      <p:transition spd="slow">
+        <p:fade/>
+      </p:transition>
+    </mc:Fallback>
+  </mc:AlternateContent>
 </p:sldLayout>
 </file>
 
@@ -5022,7 +5234,7 @@
           <a:p>
             <a:fld id="{48A87A34-81AB-432B-8DAE-1953F412C126}" type="datetimeFigureOut">
               <a:rPr lang="en-US" dirty="0"/>
-              <a:t>2/17/16</a:t>
+              <a:t>2/18/16</a:t>
             </a:fld>
             <a:endParaRPr lang="en-US" dirty="0"/>
           </a:p>
@@ -5075,6 +5287,18 @@
   <p:clrMapOvr>
     <a:masterClrMapping/>
   </p:clrMapOvr>
+  <mc:AlternateContent xmlns:mc="http://schemas.openxmlformats.org/markup-compatibility/2006">
+    <mc:Choice xmlns:p14="http://schemas.microsoft.com/office/powerpoint/2010/main" Requires="p14">
+      <p:transition spd="slow">
+        <p14:reveal/>
+      </p:transition>
+    </mc:Choice>
+    <mc:Fallback>
+      <p:transition spd="slow">
+        <p:fade/>
+      </p:transition>
+    </mc:Fallback>
+  </mc:AlternateContent>
 </p:sldLayout>
 </file>
 
@@ -5261,7 +5485,7 @@
             <a:fld id="{48A87A34-81AB-432B-8DAE-1953F412C126}" type="datetimeFigureOut">
               <a:rPr lang="en-US" dirty="0"/>
               <a:pPr/>
-              <a:t>2/17/16</a:t>
+              <a:t>2/18/16</a:t>
             </a:fld>
             <a:endParaRPr lang="en-US" dirty="0"/>
           </a:p>
@@ -5368,6 +5592,18 @@
     <p:sldLayoutId id="2147483658" r:id="rId16"/>
     <p:sldLayoutId id="2147483659" r:id="rId17"/>
   </p:sldLayoutIdLst>
+  <mc:AlternateContent xmlns:mc="http://schemas.openxmlformats.org/markup-compatibility/2006">
+    <mc:Choice xmlns:p14="http://schemas.microsoft.com/office/powerpoint/2010/main" Requires="p14">
+      <p:transition spd="slow">
+        <p14:reveal/>
+      </p:transition>
+    </mc:Choice>
+    <mc:Fallback>
+      <p:transition spd="slow">
+        <p:fade/>
+      </p:transition>
+    </mc:Fallback>
+  </mc:AlternateContent>
   <p:txStyles>
     <p:titleStyle>
       <a:lvl1pPr algn="r" defTabSz="914400" rtl="0" eaLnBrk="1" latinLnBrk="0" hangingPunct="1">
@@ -5761,7 +5997,7 @@
             </a:r>
             <a:r>
               <a:rPr lang="en-US" dirty="0" err="1" smtClean="0"/>
-              <a:t>Fieiro</a:t>
+              <a:t>Fiero</a:t>
             </a:r>
             <a:endParaRPr lang="en-US" dirty="0" smtClean="0"/>
           </a:p>
@@ -5774,7 +6010,7 @@
           </a:p>
           <a:p>
             <a:r>
-              <a:rPr lang="en-US" smtClean="0"/>
+              <a:rPr lang="en-US" dirty="0" smtClean="0"/>
               <a:t>2016</a:t>
             </a:r>
             <a:endParaRPr lang="en-US" dirty="0"/>
@@ -5791,6 +6027,25 @@
   <p:clrMapOvr>
     <a:masterClrMapping/>
   </p:clrMapOvr>
+  <mc:AlternateContent xmlns:mc="http://schemas.openxmlformats.org/markup-compatibility/2006">
+    <mc:Choice xmlns:p14="http://schemas.microsoft.com/office/powerpoint/2010/main" Requires="p14">
+      <p:transition spd="slow">
+        <p14:reveal/>
+      </p:transition>
+    </mc:Choice>
+    <mc:Fallback>
+      <p:transition spd="slow">
+        <p:fade/>
+      </p:transition>
+    </mc:Fallback>
+  </mc:AlternateContent>
+  <p:timing>
+    <p:tnLst>
+      <p:par>
+        <p:cTn id="1" dur="indefinite" restart="never" nodeType="tmRoot"/>
+      </p:par>
+    </p:tnLst>
+  </p:timing>
 </p:sld>
 </file>
 
@@ -5821,19 +6076,14 @@
             <p:ph type="title"/>
           </p:nvPr>
         </p:nvSpPr>
-        <p:spPr>
-          <a:xfrm>
-            <a:off x="2895600" y="117859"/>
-            <a:ext cx="8610600" cy="1293028"/>
-          </a:xfrm>
-        </p:spPr>
+        <p:spPr/>
         <p:txBody>
           <a:bodyPr/>
           <a:lstStyle/>
           <a:p>
             <a:r>
               <a:rPr lang="en-US" dirty="0" smtClean="0"/>
-              <a:t>Other nonfunctional Requirements </a:t>
+              <a:t>System Requirements </a:t>
             </a:r>
             <a:endParaRPr lang="en-US" dirty="0"/>
           </a:p>
@@ -5849,45 +6099,25 @@
             <p:ph idx="1"/>
           </p:nvPr>
         </p:nvSpPr>
-        <p:spPr>
-          <a:xfrm>
-            <a:off x="685800" y="1445209"/>
-            <a:ext cx="10820400" cy="4784266"/>
-          </a:xfrm>
-        </p:spPr>
-        <p:txBody>
-          <a:bodyPr>
-            <a:normAutofit/>
-          </a:bodyPr>
+        <p:spPr/>
+        <p:txBody>
+          <a:bodyPr/>
           <a:lstStyle/>
           <a:p>
             <a:r>
               <a:rPr lang="en-US" b="1" u="sng" dirty="0" smtClean="0"/>
-              <a:t>5.1 Performance Requirements </a:t>
+              <a:t>4.1 Admin System Features</a:t>
+            </a:r>
+          </a:p>
+          <a:p>
+            <a:pPr lvl="1"/>
+            <a:r>
+              <a:rPr lang="en-US" u="sng" dirty="0" smtClean="0"/>
+              <a:t>4.1.1 Teacher Registration </a:t>
             </a:r>
           </a:p>
           <a:p>
             <a:pPr marL="457200" lvl="1" indent="0">
-              <a:buNone/>
-            </a:pPr>
-            <a:r>
-              <a:rPr lang="en-US" dirty="0" smtClean="0"/>
-              <a:t>	-Number of Users </a:t>
-            </a:r>
-            <a:r>
-              <a:rPr lang="en-US" dirty="0" smtClean="0"/>
-              <a:t> shall not be limited</a:t>
-            </a:r>
-            <a:endParaRPr lang="en-US" dirty="0" smtClean="0"/>
-          </a:p>
-          <a:p>
-            <a:r>
-              <a:rPr lang="en-US" b="1" u="sng" dirty="0" smtClean="0"/>
-              <a:t>5.2 Safety Requirements </a:t>
-            </a:r>
-          </a:p>
-          <a:p>
-            <a:pPr marL="0" indent="0">
               <a:buNone/>
             </a:pPr>
             <a:r>
@@ -5896,26 +6126,23 @@
             </a:r>
             <a:r>
               <a:rPr lang="en-US" dirty="0" smtClean="0"/>
-              <a:t>-None have been identified </a:t>
-            </a:r>
-          </a:p>
-          <a:p>
-            <a:r>
-              <a:rPr lang="en-US" b="1" u="sng" dirty="0" smtClean="0"/>
-              <a:t>5.3 Security Requirements </a:t>
-            </a:r>
-          </a:p>
-          <a:p>
-            <a:pPr marL="457200" lvl="1" indent="0">
-              <a:buNone/>
-            </a:pPr>
-            <a:r>
-              <a:rPr lang="en-US" dirty="0"/>
-              <a:t> </a:t>
-            </a:r>
-            <a:r>
-              <a:rPr lang="en-US" dirty="0" smtClean="0"/>
-              <a:t>	-  Only allow authorized users </a:t>
+              <a:t>- Register </a:t>
+            </a:r>
+            <a:r>
+              <a:rPr lang="en-US" dirty="0" smtClean="0"/>
+              <a:t>Teacher </a:t>
+            </a:r>
+            <a:r>
+              <a:rPr lang="en-US" dirty="0" smtClean="0"/>
+              <a:t>Accounts</a:t>
+            </a:r>
+            <a:endParaRPr lang="en-US" dirty="0"/>
+          </a:p>
+          <a:p>
+            <a:pPr lvl="1"/>
+            <a:r>
+              <a:rPr lang="en-US" u="sng" dirty="0" smtClean="0"/>
+              <a:t>4.1.2 Teacher Password Reset</a:t>
             </a:r>
           </a:p>
           <a:p>
@@ -5928,31 +6155,19 @@
             </a:r>
             <a:r>
               <a:rPr lang="en-US" dirty="0" smtClean="0"/>
-              <a:t>-  Require username and password </a:t>
+              <a:t>- Admin shall reset </a:t>
+            </a:r>
+            <a:r>
+              <a:rPr lang="en-US" dirty="0" smtClean="0"/>
+              <a:t>teachers’ </a:t>
+            </a:r>
+            <a:r>
+              <a:rPr lang="en-US" dirty="0" smtClean="0"/>
+              <a:t>account passwords</a:t>
             </a:r>
           </a:p>
           <a:p>
             <a:pPr marL="457200" lvl="1" indent="0">
-              <a:buNone/>
-            </a:pPr>
-            <a:r>
-              <a:rPr lang="en-US" dirty="0" smtClean="0"/>
-              <a:t>	-  Securely Store password </a:t>
-            </a:r>
-            <a:r>
-              <a:rPr lang="en-US" dirty="0" smtClean="0"/>
-              <a:t>in a database</a:t>
-            </a:r>
-            <a:endParaRPr lang="en-US" dirty="0"/>
-          </a:p>
-          <a:p>
-            <a:r>
-              <a:rPr lang="en-US" b="1" u="sng" dirty="0" smtClean="0"/>
-              <a:t>5.4 Software Quality Attributes </a:t>
-            </a:r>
-          </a:p>
-          <a:p>
-            <a:pPr marL="0" indent="0">
               <a:buNone/>
             </a:pPr>
             <a:r>
@@ -5961,47 +6176,41 @@
             </a:r>
             <a:r>
               <a:rPr lang="en-US" dirty="0" smtClean="0"/>
-              <a:t>- Correctness </a:t>
-            </a:r>
-          </a:p>
-          <a:p>
-            <a:pPr marL="0" indent="0">
-              <a:buNone/>
-            </a:pPr>
-            <a:r>
-              <a:rPr lang="en-US" dirty="0"/>
-              <a:t>	</a:t>
-            </a:r>
-            <a:r>
-              <a:rPr lang="en-US" dirty="0" smtClean="0"/>
-              <a:t>- Interoperability</a:t>
-            </a:r>
-          </a:p>
-          <a:p>
-            <a:pPr marL="0" indent="0">
-              <a:buNone/>
-            </a:pPr>
-            <a:r>
-              <a:rPr lang="en-US" dirty="0"/>
-              <a:t>	</a:t>
-            </a:r>
-            <a:r>
-              <a:rPr lang="en-US" dirty="0" smtClean="0"/>
-              <a:t>- Usability</a:t>
-            </a:r>
+              <a:t>- Generates a randomly generated password</a:t>
+            </a:r>
+            <a:endParaRPr lang="en-US" dirty="0"/>
           </a:p>
         </p:txBody>
       </p:sp>
     </p:spTree>
     <p:extLst>
       <p:ext uri="{BB962C8B-B14F-4D97-AF65-F5344CB8AC3E}">
-        <p14:creationId xmlns:p14="http://schemas.microsoft.com/office/powerpoint/2010/main" val="1418613171"/>
+        <p14:creationId xmlns:p14="http://schemas.microsoft.com/office/powerpoint/2010/main" val="1193365723"/>
       </p:ext>
     </p:extLst>
   </p:cSld>
   <p:clrMapOvr>
     <a:masterClrMapping/>
   </p:clrMapOvr>
+  <mc:AlternateContent xmlns:mc="http://schemas.openxmlformats.org/markup-compatibility/2006">
+    <mc:Choice xmlns:p14="http://schemas.microsoft.com/office/powerpoint/2010/main" Requires="p14">
+      <p:transition spd="slow">
+        <p14:reveal/>
+      </p:transition>
+    </mc:Choice>
+    <mc:Fallback>
+      <p:transition spd="slow">
+        <p:fade/>
+      </p:transition>
+    </mc:Fallback>
+  </mc:AlternateContent>
+  <p:timing>
+    <p:tnLst>
+      <p:par>
+        <p:cTn id="1" dur="indefinite" restart="never" nodeType="tmRoot"/>
+      </p:par>
+    </p:tnLst>
+  </p:timing>
 </p:sld>
 </file>
 
@@ -6039,7 +6248,7 @@
           <a:p>
             <a:r>
               <a:rPr lang="en-US" dirty="0" smtClean="0"/>
-              <a:t>Other Nonfunctional Requirements continued</a:t>
+              <a:t>System requirements continued</a:t>
             </a:r>
             <a:endParaRPr lang="en-US" dirty="0"/>
           </a:p>
@@ -6062,94 +6271,97 @@
           <a:p>
             <a:r>
               <a:rPr lang="en-US" b="1" u="sng" dirty="0" smtClean="0"/>
-              <a:t>5.5 Business Rules </a:t>
-            </a:r>
-            <a:endParaRPr lang="en-US" b="1" u="sng" dirty="0" smtClean="0"/>
-          </a:p>
-          <a:p>
-            <a:pPr marL="914400" lvl="2" indent="0">
-              <a:buNone/>
-            </a:pPr>
+              <a:t>4.2 General System </a:t>
+            </a:r>
+            <a:r>
+              <a:rPr lang="en-US" b="1" u="sng" dirty="0" smtClean="0"/>
+              <a:t>features</a:t>
+            </a:r>
+          </a:p>
+          <a:p>
+            <a:pPr lvl="1"/>
+            <a:r>
+              <a:rPr lang="en-US" dirty="0" smtClean="0"/>
+              <a:t>4.2.1 Admin Account Setup</a:t>
+            </a:r>
+          </a:p>
+          <a:p>
+            <a:pPr lvl="1"/>
+            <a:r>
+              <a:rPr lang="en-US" dirty="0" smtClean="0"/>
+              <a:t>4.2.2 Graphical User Interface </a:t>
+            </a:r>
+          </a:p>
+          <a:p>
+            <a:pPr lvl="1"/>
+            <a:r>
+              <a:rPr lang="en-US" dirty="0" smtClean="0"/>
+              <a:t>4.2.3 </a:t>
+            </a:r>
+            <a:r>
+              <a:rPr lang="en-US" dirty="0" smtClean="0"/>
+              <a:t>Help </a:t>
+            </a:r>
+            <a:r>
+              <a:rPr lang="en-US" dirty="0" smtClean="0"/>
+              <a:t>System</a:t>
+            </a:r>
+          </a:p>
+          <a:p>
+            <a:pPr lvl="1"/>
+            <a:r>
+              <a:rPr lang="en-US" dirty="0" smtClean="0"/>
+              <a:t>4.2.4 </a:t>
+            </a:r>
+            <a:r>
+              <a:rPr lang="en-US" dirty="0" smtClean="0"/>
+              <a:t>Tutorial </a:t>
+            </a:r>
+            <a:r>
+              <a:rPr lang="en-US" dirty="0" smtClean="0"/>
+              <a:t>content</a:t>
+            </a:r>
+          </a:p>
+          <a:p>
+            <a:pPr lvl="1"/>
+            <a:r>
+              <a:rPr lang="en-US" dirty="0" smtClean="0"/>
+              <a:t>Random </a:t>
+            </a:r>
+            <a:r>
+              <a:rPr lang="en-US" dirty="0" smtClean="0"/>
+              <a:t>Exercise Generation </a:t>
+            </a:r>
             <a:endParaRPr lang="en-US" dirty="0" smtClean="0"/>
           </a:p>
           <a:p>
-            <a:pPr marL="0" indent="0">
-              <a:buNone/>
-            </a:pPr>
-            <a:r>
-              <a:rPr lang="en-US" dirty="0"/>
-              <a:t> </a:t>
-            </a:r>
-            <a:r>
-              <a:rPr lang="en-US" dirty="0" smtClean="0"/>
-              <a:t>	- Do not allow students to register </a:t>
+            <a:pPr lvl="1"/>
+            <a:r>
+              <a:rPr lang="en-US" dirty="0" smtClean="0"/>
+              <a:t>Worksheet </a:t>
+            </a:r>
+            <a:r>
+              <a:rPr lang="en-US" dirty="0" smtClean="0"/>
+              <a:t>Instructions </a:t>
             </a:r>
             <a:endParaRPr lang="en-US" dirty="0" smtClean="0"/>
           </a:p>
           <a:p>
-            <a:pPr marL="0" indent="0">
-              <a:buNone/>
-            </a:pPr>
-            <a:r>
-              <a:rPr lang="en-US" dirty="0"/>
-              <a:t>	</a:t>
-            </a:r>
-            <a:r>
-              <a:rPr lang="en-US" dirty="0" smtClean="0"/>
-              <a:t>- Allow teachers to register student accounts</a:t>
-            </a:r>
-          </a:p>
-          <a:p>
-            <a:pPr marL="0" indent="0">
-              <a:buNone/>
-            </a:pPr>
-            <a:r>
-              <a:rPr lang="en-US" dirty="0"/>
-              <a:t>	</a:t>
-            </a:r>
-            <a:r>
-              <a:rPr lang="en-US" dirty="0" smtClean="0"/>
-              <a:t>- Allow the administrator to register teacher accounts</a:t>
-            </a:r>
-            <a:endParaRPr lang="en-US" dirty="0" smtClean="0"/>
-          </a:p>
-          <a:p>
-            <a:pPr marL="0" indent="0">
-              <a:buNone/>
-            </a:pPr>
-            <a:r>
-              <a:rPr lang="en-US" dirty="0"/>
-              <a:t>	</a:t>
-            </a:r>
-            <a:r>
-              <a:rPr lang="en-US" dirty="0" smtClean="0"/>
-              <a:t>- Allow students to generate worksheets </a:t>
-            </a:r>
-          </a:p>
-          <a:p>
-            <a:pPr marL="0" indent="0">
-              <a:buNone/>
-            </a:pPr>
-            <a:r>
-              <a:rPr lang="en-US" dirty="0"/>
-              <a:t>	</a:t>
-            </a:r>
-            <a:r>
-              <a:rPr lang="en-US" dirty="0" smtClean="0"/>
-              <a:t>- Allow teachers to view answer sheets </a:t>
-            </a:r>
-          </a:p>
-          <a:p>
-            <a:pPr marL="0" indent="0">
-              <a:buNone/>
-            </a:pPr>
-            <a:r>
-              <a:rPr lang="en-US" dirty="0"/>
-              <a:t>	</a:t>
-            </a:r>
-            <a:r>
-              <a:rPr lang="en-US" dirty="0" smtClean="0"/>
-              <a:t>- Access previously created worksheets </a:t>
+            <a:pPr lvl="1"/>
+            <a:r>
+              <a:rPr lang="en-US" dirty="0" smtClean="0"/>
+              <a:t>PDF Options</a:t>
+            </a:r>
+          </a:p>
+          <a:p>
+            <a:pPr lvl="1"/>
+            <a:r>
+              <a:rPr lang="en-US" dirty="0" smtClean="0"/>
+              <a:t>Search </a:t>
+            </a:r>
+            <a:r>
+              <a:rPr lang="en-US" dirty="0" smtClean="0"/>
+              <a:t>Features </a:t>
             </a:r>
             <a:endParaRPr lang="en-US" dirty="0"/>
           </a:p>
@@ -6158,13 +6370,32 @@
     </p:spTree>
     <p:extLst>
       <p:ext uri="{BB962C8B-B14F-4D97-AF65-F5344CB8AC3E}">
-        <p14:creationId xmlns:p14="http://schemas.microsoft.com/office/powerpoint/2010/main" val="290194206"/>
+        <p14:creationId xmlns:p14="http://schemas.microsoft.com/office/powerpoint/2010/main" val="1882224459"/>
       </p:ext>
     </p:extLst>
   </p:cSld>
   <p:clrMapOvr>
     <a:masterClrMapping/>
   </p:clrMapOvr>
+  <mc:AlternateContent xmlns:mc="http://schemas.openxmlformats.org/markup-compatibility/2006">
+    <mc:Choice xmlns:p14="http://schemas.microsoft.com/office/powerpoint/2010/main" Requires="p14">
+      <p:transition spd="slow">
+        <p14:reveal/>
+      </p:transition>
+    </mc:Choice>
+    <mc:Fallback>
+      <p:transition spd="slow">
+        <p:fade/>
+      </p:transition>
+    </mc:Fallback>
+  </mc:AlternateContent>
+  <p:timing>
+    <p:tnLst>
+      <p:par>
+        <p:cTn id="1" dur="indefinite" restart="never" nodeType="tmRoot"/>
+      </p:par>
+    </p:tnLst>
+  </p:timing>
 </p:sld>
 </file>
 
@@ -6195,6 +6426,644 @@
             <p:ph type="title"/>
           </p:nvPr>
         </p:nvSpPr>
+        <p:spPr/>
+        <p:txBody>
+          <a:bodyPr/>
+          <a:lstStyle/>
+          <a:p>
+            <a:r>
+              <a:rPr lang="en-US" dirty="0" smtClean="0"/>
+              <a:t>System Requirements Continued </a:t>
+            </a:r>
+            <a:endParaRPr lang="en-US" dirty="0"/>
+          </a:p>
+        </p:txBody>
+      </p:sp>
+      <p:sp>
+        <p:nvSpPr>
+          <p:cNvPr id="3" name="Content Placeholder 2"/>
+          <p:cNvSpPr>
+            <a:spLocks noGrp="1"/>
+          </p:cNvSpPr>
+          <p:nvPr>
+            <p:ph idx="1"/>
+          </p:nvPr>
+        </p:nvSpPr>
+        <p:spPr/>
+        <p:txBody>
+          <a:bodyPr>
+            <a:normAutofit fontScale="92500" lnSpcReduction="10000"/>
+          </a:bodyPr>
+          <a:lstStyle/>
+          <a:p>
+            <a:r>
+              <a:rPr lang="en-US" b="1" u="sng" dirty="0" smtClean="0"/>
+              <a:t>4.3 Teacher System </a:t>
+            </a:r>
+            <a:r>
+              <a:rPr lang="en-US" b="1" u="sng" dirty="0" smtClean="0"/>
+              <a:t>Features</a:t>
+            </a:r>
+            <a:endParaRPr lang="en-US" b="1" u="sng" dirty="0" smtClean="0"/>
+          </a:p>
+          <a:p>
+            <a:pPr lvl="1">
+              <a:lnSpc>
+                <a:spcPct val="120000"/>
+              </a:lnSpc>
+            </a:pPr>
+            <a:r>
+              <a:rPr lang="en-US" dirty="0" smtClean="0"/>
+              <a:t>4.3.1 </a:t>
+            </a:r>
+            <a:r>
+              <a:rPr lang="en-US" dirty="0" smtClean="0"/>
+              <a:t>Teacher System Access</a:t>
+            </a:r>
+          </a:p>
+          <a:p>
+            <a:pPr lvl="1">
+              <a:lnSpc>
+                <a:spcPct val="120000"/>
+              </a:lnSpc>
+            </a:pPr>
+            <a:r>
+              <a:rPr lang="en-US" dirty="0" smtClean="0"/>
+              <a:t>4.3.2 </a:t>
+            </a:r>
+            <a:r>
+              <a:rPr lang="en-US" dirty="0" smtClean="0"/>
+              <a:t>Teacher Password Reset</a:t>
+            </a:r>
+          </a:p>
+          <a:p>
+            <a:pPr lvl="1">
+              <a:lnSpc>
+                <a:spcPct val="120000"/>
+              </a:lnSpc>
+            </a:pPr>
+            <a:r>
+              <a:rPr lang="en-US" dirty="0" smtClean="0"/>
+              <a:t>4.3.3 </a:t>
+            </a:r>
+            <a:r>
+              <a:rPr lang="en-US" dirty="0" smtClean="0"/>
+              <a:t>Teacher Worksheet Selection</a:t>
+            </a:r>
+          </a:p>
+          <a:p>
+            <a:pPr lvl="1">
+              <a:lnSpc>
+                <a:spcPct val="120000"/>
+              </a:lnSpc>
+            </a:pPr>
+            <a:r>
+              <a:rPr lang="en-US" dirty="0" smtClean="0"/>
+              <a:t>4.3.4 </a:t>
+            </a:r>
+            <a:r>
+              <a:rPr lang="en-US" dirty="0" smtClean="0"/>
+              <a:t>Worksheet Parameter Option</a:t>
+            </a:r>
+          </a:p>
+          <a:p>
+            <a:pPr lvl="1">
+              <a:lnSpc>
+                <a:spcPct val="120000"/>
+              </a:lnSpc>
+            </a:pPr>
+            <a:r>
+              <a:rPr lang="en-US" dirty="0" smtClean="0"/>
+              <a:t>4.3.5 </a:t>
+            </a:r>
+            <a:r>
+              <a:rPr lang="en-US" dirty="0" smtClean="0"/>
+              <a:t>Student Worksheet Review </a:t>
+            </a:r>
+          </a:p>
+          <a:p>
+            <a:pPr lvl="1">
+              <a:lnSpc>
+                <a:spcPct val="120000"/>
+              </a:lnSpc>
+            </a:pPr>
+            <a:r>
+              <a:rPr lang="en-US" dirty="0" smtClean="0"/>
+              <a:t>4.3.6 </a:t>
+            </a:r>
+            <a:r>
+              <a:rPr lang="en-US" dirty="0" smtClean="0"/>
+              <a:t>Student Worksheet Deletion</a:t>
+            </a:r>
+          </a:p>
+          <a:p>
+            <a:pPr lvl="1">
+              <a:lnSpc>
+                <a:spcPct val="120000"/>
+              </a:lnSpc>
+            </a:pPr>
+            <a:r>
+              <a:rPr lang="en-US" dirty="0" smtClean="0"/>
+              <a:t>4.3.7 </a:t>
+            </a:r>
+            <a:r>
+              <a:rPr lang="en-US" dirty="0" smtClean="0"/>
+              <a:t>Class Roster Creation</a:t>
+            </a:r>
+          </a:p>
+          <a:p>
+            <a:pPr lvl="1">
+              <a:lnSpc>
+                <a:spcPct val="120000"/>
+              </a:lnSpc>
+            </a:pPr>
+            <a:r>
+              <a:rPr lang="en-US" dirty="0" smtClean="0"/>
+              <a:t>4.3.8 </a:t>
+            </a:r>
+            <a:r>
+              <a:rPr lang="en-US" dirty="0" smtClean="0"/>
+              <a:t>Student Login Management</a:t>
+            </a:r>
+          </a:p>
+          <a:p>
+            <a:pPr lvl="1">
+              <a:lnSpc>
+                <a:spcPct val="120000"/>
+              </a:lnSpc>
+            </a:pPr>
+            <a:r>
+              <a:rPr lang="en-US" dirty="0" smtClean="0"/>
+              <a:t>4.3.9 </a:t>
+            </a:r>
+            <a:r>
+              <a:rPr lang="en-US" dirty="0" smtClean="0"/>
+              <a:t>Student </a:t>
+            </a:r>
+            <a:r>
+              <a:rPr lang="en-US" dirty="0" smtClean="0"/>
+              <a:t>Difficulty Level Management</a:t>
+            </a:r>
+            <a:endParaRPr lang="en-US" dirty="0"/>
+          </a:p>
+        </p:txBody>
+      </p:sp>
+    </p:spTree>
+    <p:extLst>
+      <p:ext uri="{BB962C8B-B14F-4D97-AF65-F5344CB8AC3E}">
+        <p14:creationId xmlns:p14="http://schemas.microsoft.com/office/powerpoint/2010/main" val="1361008139"/>
+      </p:ext>
+    </p:extLst>
+  </p:cSld>
+  <p:clrMapOvr>
+    <a:masterClrMapping/>
+  </p:clrMapOvr>
+  <mc:AlternateContent xmlns:mc="http://schemas.openxmlformats.org/markup-compatibility/2006">
+    <mc:Choice xmlns:p14="http://schemas.microsoft.com/office/powerpoint/2010/main" Requires="p14">
+      <p:transition spd="slow">
+        <p14:reveal/>
+      </p:transition>
+    </mc:Choice>
+    <mc:Fallback>
+      <p:transition spd="slow">
+        <p:fade/>
+      </p:transition>
+    </mc:Fallback>
+  </mc:AlternateContent>
+  <p:timing>
+    <p:tnLst>
+      <p:par>
+        <p:cTn id="1" dur="indefinite" restart="never" nodeType="tmRoot"/>
+      </p:par>
+    </p:tnLst>
+  </p:timing>
+</p:sld>
+</file>
+
+<file path=ppt/slides/slide13.xml><?xml version="1.0" encoding="utf-8"?>
+<p:sld xmlns:a="http://schemas.openxmlformats.org/drawingml/2006/main" xmlns:r="http://schemas.openxmlformats.org/officeDocument/2006/relationships" xmlns:p="http://schemas.openxmlformats.org/presentationml/2006/main">
+  <p:cSld>
+    <p:spTree>
+      <p:nvGrpSpPr>
+        <p:cNvPr id="1" name=""/>
+        <p:cNvGrpSpPr/>
+        <p:nvPr/>
+      </p:nvGrpSpPr>
+      <p:grpSpPr>
+        <a:xfrm>
+          <a:off x="0" y="0"/>
+          <a:ext cx="0" cy="0"/>
+          <a:chOff x="0" y="0"/>
+          <a:chExt cx="0" cy="0"/>
+        </a:xfrm>
+      </p:grpSpPr>
+      <p:sp>
+        <p:nvSpPr>
+          <p:cNvPr id="2" name="Title 1"/>
+          <p:cNvSpPr>
+            <a:spLocks noGrp="1"/>
+          </p:cNvSpPr>
+          <p:nvPr>
+            <p:ph type="title"/>
+          </p:nvPr>
+        </p:nvSpPr>
+        <p:spPr>
+          <a:xfrm>
+            <a:off x="2895600" y="117859"/>
+            <a:ext cx="8610600" cy="1293028"/>
+          </a:xfrm>
+        </p:spPr>
+        <p:txBody>
+          <a:bodyPr/>
+          <a:lstStyle/>
+          <a:p>
+            <a:r>
+              <a:rPr lang="en-US" dirty="0" smtClean="0"/>
+              <a:t>Other nonfunctional Requirements </a:t>
+            </a:r>
+            <a:endParaRPr lang="en-US" dirty="0"/>
+          </a:p>
+        </p:txBody>
+      </p:sp>
+      <p:sp>
+        <p:nvSpPr>
+          <p:cNvPr id="3" name="Content Placeholder 2"/>
+          <p:cNvSpPr>
+            <a:spLocks noGrp="1"/>
+          </p:cNvSpPr>
+          <p:nvPr>
+            <p:ph idx="1"/>
+          </p:nvPr>
+        </p:nvSpPr>
+        <p:spPr>
+          <a:xfrm>
+            <a:off x="685800" y="1445209"/>
+            <a:ext cx="10820400" cy="4784266"/>
+          </a:xfrm>
+        </p:spPr>
+        <p:txBody>
+          <a:bodyPr>
+            <a:normAutofit/>
+          </a:bodyPr>
+          <a:lstStyle/>
+          <a:p>
+            <a:r>
+              <a:rPr lang="en-US" b="1" u="sng" dirty="0" smtClean="0"/>
+              <a:t>5.1 Performance Requirements </a:t>
+            </a:r>
+            <a:endParaRPr lang="en-US" b="1" u="sng" dirty="0" smtClean="0"/>
+          </a:p>
+          <a:p>
+            <a:pPr lvl="1"/>
+            <a:r>
+              <a:rPr lang="en-US" dirty="0" smtClean="0"/>
+              <a:t>Number </a:t>
+            </a:r>
+            <a:r>
+              <a:rPr lang="en-US" dirty="0" smtClean="0"/>
+              <a:t>of </a:t>
+            </a:r>
+            <a:r>
+              <a:rPr lang="en-US" dirty="0" smtClean="0"/>
+              <a:t>Users </a:t>
+            </a:r>
+            <a:r>
+              <a:rPr lang="en-US" dirty="0" smtClean="0"/>
+              <a:t>shall not be limited</a:t>
+            </a:r>
+          </a:p>
+          <a:p>
+            <a:r>
+              <a:rPr lang="en-US" b="1" u="sng" dirty="0" smtClean="0"/>
+              <a:t>5.2 Safety Requirements </a:t>
+            </a:r>
+          </a:p>
+          <a:p>
+            <a:pPr lvl="1"/>
+            <a:r>
+              <a:rPr lang="en-US" dirty="0" smtClean="0"/>
+              <a:t>None </a:t>
+            </a:r>
+            <a:r>
+              <a:rPr lang="en-US" dirty="0" smtClean="0"/>
+              <a:t>have been identified </a:t>
+            </a:r>
+          </a:p>
+          <a:p>
+            <a:r>
+              <a:rPr lang="en-US" b="1" u="sng" dirty="0" smtClean="0"/>
+              <a:t>5.3 Security </a:t>
+            </a:r>
+            <a:r>
+              <a:rPr lang="en-US" b="1" u="sng" dirty="0" smtClean="0"/>
+              <a:t>Requirements</a:t>
+            </a:r>
+          </a:p>
+          <a:p>
+            <a:pPr lvl="1"/>
+            <a:r>
+              <a:rPr lang="en-US" dirty="0" smtClean="0"/>
+              <a:t>Only </a:t>
+            </a:r>
+            <a:r>
+              <a:rPr lang="en-US" dirty="0" smtClean="0"/>
+              <a:t>allow authorized </a:t>
+            </a:r>
+            <a:r>
+              <a:rPr lang="en-US" dirty="0" smtClean="0"/>
+              <a:t>users</a:t>
+            </a:r>
+          </a:p>
+          <a:p>
+            <a:pPr lvl="1"/>
+            <a:r>
+              <a:rPr lang="en-US" dirty="0" smtClean="0"/>
+              <a:t>Require </a:t>
+            </a:r>
+            <a:r>
+              <a:rPr lang="en-US" dirty="0" smtClean="0"/>
+              <a:t>username and </a:t>
+            </a:r>
+            <a:r>
+              <a:rPr lang="en-US" dirty="0" smtClean="0"/>
+              <a:t>password</a:t>
+            </a:r>
+          </a:p>
+          <a:p>
+            <a:pPr lvl="1"/>
+            <a:r>
+              <a:rPr lang="en-US" dirty="0" smtClean="0"/>
+              <a:t>Securely </a:t>
+            </a:r>
+            <a:r>
+              <a:rPr lang="en-US" dirty="0" smtClean="0"/>
+              <a:t>Store password in a database</a:t>
+            </a:r>
+            <a:endParaRPr lang="en-US" dirty="0"/>
+          </a:p>
+          <a:p>
+            <a:r>
+              <a:rPr lang="en-US" b="1" u="sng" dirty="0" smtClean="0"/>
+              <a:t>5.4 Software Quality Attributes </a:t>
+            </a:r>
+          </a:p>
+          <a:p>
+            <a:pPr lvl="1"/>
+            <a:r>
+              <a:rPr lang="en-US" dirty="0" smtClean="0"/>
+              <a:t>Correctness </a:t>
+            </a:r>
+            <a:endParaRPr lang="en-US" dirty="0" smtClean="0"/>
+          </a:p>
+          <a:p>
+            <a:pPr lvl="1"/>
+            <a:r>
+              <a:rPr lang="en-US" dirty="0" smtClean="0"/>
+              <a:t>Interoperability</a:t>
+            </a:r>
+            <a:endParaRPr lang="en-US" dirty="0" smtClean="0"/>
+          </a:p>
+          <a:p>
+            <a:pPr lvl="1"/>
+            <a:r>
+              <a:rPr lang="en-US" dirty="0" smtClean="0"/>
+              <a:t>Usability</a:t>
+            </a:r>
+            <a:endParaRPr lang="en-US" dirty="0" smtClean="0"/>
+          </a:p>
+        </p:txBody>
+      </p:sp>
+    </p:spTree>
+    <p:extLst>
+      <p:ext uri="{BB962C8B-B14F-4D97-AF65-F5344CB8AC3E}">
+        <p14:creationId xmlns:p14="http://schemas.microsoft.com/office/powerpoint/2010/main" val="1418613171"/>
+      </p:ext>
+    </p:extLst>
+  </p:cSld>
+  <p:clrMapOvr>
+    <a:masterClrMapping/>
+  </p:clrMapOvr>
+  <mc:AlternateContent xmlns:mc="http://schemas.openxmlformats.org/markup-compatibility/2006">
+    <mc:Choice xmlns:p14="http://schemas.microsoft.com/office/powerpoint/2010/main" Requires="p14">
+      <p:transition spd="slow">
+        <p14:reveal/>
+      </p:transition>
+    </mc:Choice>
+    <mc:Fallback>
+      <p:transition spd="slow">
+        <p:fade/>
+      </p:transition>
+    </mc:Fallback>
+  </mc:AlternateContent>
+  <p:timing>
+    <p:tnLst>
+      <p:par>
+        <p:cTn id="1" dur="indefinite" restart="never" nodeType="tmRoot"/>
+      </p:par>
+    </p:tnLst>
+  </p:timing>
+</p:sld>
+</file>
+
+<file path=ppt/slides/slide14.xml><?xml version="1.0" encoding="utf-8"?>
+<p:sld xmlns:a="http://schemas.openxmlformats.org/drawingml/2006/main" xmlns:r="http://schemas.openxmlformats.org/officeDocument/2006/relationships" xmlns:p="http://schemas.openxmlformats.org/presentationml/2006/main">
+  <p:cSld>
+    <p:spTree>
+      <p:nvGrpSpPr>
+        <p:cNvPr id="1" name=""/>
+        <p:cNvGrpSpPr/>
+        <p:nvPr/>
+      </p:nvGrpSpPr>
+      <p:grpSpPr>
+        <a:xfrm>
+          <a:off x="0" y="0"/>
+          <a:ext cx="0" cy="0"/>
+          <a:chOff x="0" y="0"/>
+          <a:chExt cx="0" cy="0"/>
+        </a:xfrm>
+      </p:grpSpPr>
+      <p:sp>
+        <p:nvSpPr>
+          <p:cNvPr id="2" name="Title 1"/>
+          <p:cNvSpPr>
+            <a:spLocks noGrp="1"/>
+          </p:cNvSpPr>
+          <p:nvPr>
+            <p:ph type="title"/>
+          </p:nvPr>
+        </p:nvSpPr>
+        <p:spPr/>
+        <p:txBody>
+          <a:bodyPr/>
+          <a:lstStyle/>
+          <a:p>
+            <a:r>
+              <a:rPr lang="en-US" dirty="0" smtClean="0"/>
+              <a:t>Other Nonfunctional Requirements continued</a:t>
+            </a:r>
+            <a:endParaRPr lang="en-US" dirty="0"/>
+          </a:p>
+        </p:txBody>
+      </p:sp>
+      <p:sp>
+        <p:nvSpPr>
+          <p:cNvPr id="3" name="Content Placeholder 2"/>
+          <p:cNvSpPr>
+            <a:spLocks noGrp="1"/>
+          </p:cNvSpPr>
+          <p:nvPr>
+            <p:ph idx="1"/>
+          </p:nvPr>
+        </p:nvSpPr>
+        <p:spPr/>
+        <p:txBody>
+          <a:bodyPr/>
+          <a:lstStyle/>
+          <a:p>
+            <a:r>
+              <a:rPr lang="en-US" b="1" u="sng" dirty="0" smtClean="0"/>
+              <a:t>5.5 Business Rules </a:t>
+            </a:r>
+          </a:p>
+          <a:p>
+            <a:pPr marL="914400" lvl="2" indent="0">
+              <a:buNone/>
+            </a:pPr>
+            <a:endParaRPr lang="en-US" dirty="0" smtClean="0"/>
+          </a:p>
+          <a:p>
+            <a:pPr lvl="1"/>
+            <a:r>
+              <a:rPr lang="en-US" dirty="0" smtClean="0"/>
+              <a:t>Do </a:t>
+            </a:r>
+            <a:r>
+              <a:rPr lang="en-US" dirty="0" smtClean="0"/>
+              <a:t>not allow students to register </a:t>
+            </a:r>
+          </a:p>
+          <a:p>
+            <a:pPr lvl="1"/>
+            <a:r>
+              <a:rPr lang="en-US" dirty="0" smtClean="0"/>
+              <a:t>Allow </a:t>
+            </a:r>
+            <a:r>
+              <a:rPr lang="en-US" dirty="0" smtClean="0"/>
+              <a:t>teachers to register student accounts</a:t>
+            </a:r>
+          </a:p>
+          <a:p>
+            <a:pPr lvl="1"/>
+            <a:r>
+              <a:rPr lang="en-US" dirty="0" smtClean="0"/>
+              <a:t>Allow </a:t>
+            </a:r>
+            <a:r>
+              <a:rPr lang="en-US" dirty="0" smtClean="0"/>
+              <a:t>the administrator to register teacher accounts</a:t>
+            </a:r>
+          </a:p>
+          <a:p>
+            <a:pPr lvl="1"/>
+            <a:r>
+              <a:rPr lang="en-US" dirty="0" smtClean="0"/>
+              <a:t>Allow </a:t>
+            </a:r>
+            <a:r>
+              <a:rPr lang="en-US" dirty="0" smtClean="0"/>
+              <a:t>students to generate </a:t>
+            </a:r>
+            <a:r>
+              <a:rPr lang="en-US" dirty="0" smtClean="0"/>
+              <a:t>worksheets</a:t>
+            </a:r>
+            <a:endParaRPr lang="en-US" dirty="0" smtClean="0"/>
+          </a:p>
+          <a:p>
+            <a:pPr lvl="1"/>
+            <a:r>
+              <a:rPr lang="en-US" dirty="0" smtClean="0"/>
+              <a:t>Allow </a:t>
+            </a:r>
+            <a:r>
+              <a:rPr lang="en-US" dirty="0" smtClean="0"/>
+              <a:t>teachers to view answer sheets </a:t>
+            </a:r>
+          </a:p>
+          <a:p>
+            <a:pPr lvl="1"/>
+            <a:r>
+              <a:rPr lang="en-US" dirty="0" smtClean="0"/>
+              <a:t>Access </a:t>
+            </a:r>
+            <a:r>
+              <a:rPr lang="en-US" dirty="0" smtClean="0"/>
+              <a:t>previously created worksheets </a:t>
+            </a:r>
+            <a:endParaRPr lang="en-US" dirty="0"/>
+          </a:p>
+        </p:txBody>
+      </p:sp>
+    </p:spTree>
+    <p:extLst>
+      <p:ext uri="{BB962C8B-B14F-4D97-AF65-F5344CB8AC3E}">
+        <p14:creationId xmlns:p14="http://schemas.microsoft.com/office/powerpoint/2010/main" val="290194206"/>
+      </p:ext>
+    </p:extLst>
+  </p:cSld>
+  <p:clrMapOvr>
+    <a:masterClrMapping/>
+  </p:clrMapOvr>
+  <mc:AlternateContent xmlns:mc="http://schemas.openxmlformats.org/markup-compatibility/2006">
+    <mc:Choice xmlns:p14="http://schemas.microsoft.com/office/powerpoint/2010/main" Requires="p14">
+      <p:transition spd="slow">
+        <p14:reveal/>
+      </p:transition>
+    </mc:Choice>
+    <mc:Fallback>
+      <p:transition spd="slow">
+        <p:fade/>
+      </p:transition>
+    </mc:Fallback>
+  </mc:AlternateContent>
+  <p:timing>
+    <p:tnLst>
+      <p:par>
+        <p:cTn id="1" dur="indefinite" restart="never" nodeType="tmRoot"/>
+      </p:par>
+    </p:tnLst>
+  </p:timing>
+</p:sld>
+</file>
+
+<file path=ppt/slides/slide15.xml><?xml version="1.0" encoding="utf-8"?>
+<p:sld xmlns:a="http://schemas.openxmlformats.org/drawingml/2006/main" xmlns:r="http://schemas.openxmlformats.org/officeDocument/2006/relationships" xmlns:p="http://schemas.openxmlformats.org/presentationml/2006/main">
+  <p:cSld>
+    <p:spTree>
+      <p:nvGrpSpPr>
+        <p:cNvPr id="1" name=""/>
+        <p:cNvGrpSpPr/>
+        <p:nvPr/>
+      </p:nvGrpSpPr>
+      <p:grpSpPr>
+        <a:xfrm>
+          <a:off x="0" y="0"/>
+          <a:ext cx="0" cy="0"/>
+          <a:chOff x="0" y="0"/>
+          <a:chExt cx="0" cy="0"/>
+        </a:xfrm>
+      </p:grpSpPr>
+      <p:sp>
+        <p:nvSpPr>
+          <p:cNvPr id="2" name="Title 1"/>
+          <p:cNvSpPr>
+            <a:spLocks noGrp="1"/>
+          </p:cNvSpPr>
+          <p:nvPr>
+            <p:ph type="title"/>
+          </p:nvPr>
+        </p:nvSpPr>
         <p:spPr>
           <a:xfrm>
             <a:off x="2895600" y="117859"/>
@@ -6260,8 +7129,8 @@
         </p:blipFill>
         <p:spPr>
           <a:xfrm>
-            <a:off x="497720" y="1887720"/>
-            <a:ext cx="11008480" cy="4633494"/>
+            <a:off x="685800" y="1887720"/>
+            <a:ext cx="10820400" cy="4633494"/>
           </a:xfrm>
           <a:prstGeom prst="rect">
             <a:avLst/>
@@ -6291,10 +7160,9 @@
           <a:lstStyle/>
           <a:p>
             <a:r>
-              <a:rPr lang="en-US" sz="2000" dirty="0"/>
+              <a:rPr lang="en-US" sz="2000" b="1" u="sng" dirty="0"/>
               <a:t>6.1 Database Schema</a:t>
             </a:r>
-            <a:endParaRPr lang="en-US" sz="2000" dirty="0"/>
           </a:p>
         </p:txBody>
       </p:sp>
@@ -6308,6 +7176,126 @@
   <p:clrMapOvr>
     <a:masterClrMapping/>
   </p:clrMapOvr>
+  <mc:AlternateContent xmlns:mc="http://schemas.openxmlformats.org/markup-compatibility/2006">
+    <mc:Choice xmlns:p14="http://schemas.microsoft.com/office/powerpoint/2010/main" Requires="p14">
+      <p:transition spd="slow">
+        <p14:reveal/>
+      </p:transition>
+    </mc:Choice>
+    <mc:Fallback>
+      <p:transition spd="slow">
+        <p:fade/>
+      </p:transition>
+    </mc:Fallback>
+  </mc:AlternateContent>
+  <p:timing>
+    <p:tnLst>
+      <p:par>
+        <p:cTn id="1" dur="indefinite" restart="never" nodeType="tmRoot"/>
+      </p:par>
+    </p:tnLst>
+  </p:timing>
+</p:sld>
+</file>
+
+<file path=ppt/slides/slide16.xml><?xml version="1.0" encoding="utf-8"?>
+<p:sld xmlns:a="http://schemas.openxmlformats.org/drawingml/2006/main" xmlns:r="http://schemas.openxmlformats.org/officeDocument/2006/relationships" xmlns:p="http://schemas.openxmlformats.org/presentationml/2006/main">
+  <p:cSld>
+    <p:spTree>
+      <p:nvGrpSpPr>
+        <p:cNvPr id="1" name=""/>
+        <p:cNvGrpSpPr/>
+        <p:nvPr/>
+      </p:nvGrpSpPr>
+      <p:grpSpPr>
+        <a:xfrm>
+          <a:off x="0" y="0"/>
+          <a:ext cx="0" cy="0"/>
+          <a:chOff x="0" y="0"/>
+          <a:chExt cx="0" cy="0"/>
+        </a:xfrm>
+      </p:grpSpPr>
+      <p:sp>
+        <p:nvSpPr>
+          <p:cNvPr id="2" name="Title 1"/>
+          <p:cNvSpPr>
+            <a:spLocks noGrp="1"/>
+          </p:cNvSpPr>
+          <p:nvPr>
+            <p:ph type="title"/>
+          </p:nvPr>
+        </p:nvSpPr>
+        <p:spPr/>
+        <p:txBody>
+          <a:bodyPr/>
+          <a:lstStyle/>
+          <a:p>
+            <a:r>
+              <a:rPr lang="en-US" dirty="0" smtClean="0"/>
+              <a:t>User Interface Mock-Up</a:t>
+            </a:r>
+            <a:endParaRPr lang="en-US" dirty="0"/>
+          </a:p>
+        </p:txBody>
+      </p:sp>
+      <p:pic>
+        <p:nvPicPr>
+          <p:cNvPr id="4" name="Content Placeholder 3"/>
+          <p:cNvPicPr>
+            <a:picLocks noGrp="1" noChangeAspect="1"/>
+          </p:cNvPicPr>
+          <p:nvPr>
+            <p:ph idx="1"/>
+          </p:nvPr>
+        </p:nvPicPr>
+        <p:blipFill>
+          <a:blip r:embed="rId2">
+            <a:extLst>
+              <a:ext uri="{28A0092B-C50C-407E-A947-70E740481C1C}">
+                <a14:useLocalDpi xmlns:a14="http://schemas.microsoft.com/office/drawing/2010/main" val="0"/>
+              </a:ext>
+            </a:extLst>
+          </a:blip>
+          <a:stretch>
+            <a:fillRect/>
+          </a:stretch>
+        </p:blipFill>
+        <p:spPr>
+          <a:xfrm>
+            <a:off x="1820167" y="2193925"/>
+            <a:ext cx="8551665" cy="4024313"/>
+          </a:xfrm>
+        </p:spPr>
+      </p:pic>
+    </p:spTree>
+    <p:extLst>
+      <p:ext uri="{BB962C8B-B14F-4D97-AF65-F5344CB8AC3E}">
+        <p14:creationId xmlns:p14="http://schemas.microsoft.com/office/powerpoint/2010/main" val="695498196"/>
+      </p:ext>
+    </p:extLst>
+  </p:cSld>
+  <p:clrMapOvr>
+    <a:masterClrMapping/>
+  </p:clrMapOvr>
+  <mc:AlternateContent xmlns:mc="http://schemas.openxmlformats.org/markup-compatibility/2006">
+    <mc:Choice xmlns:p14="http://schemas.microsoft.com/office/powerpoint/2010/main" Requires="p14">
+      <p:transition spd="slow">
+        <p14:reveal/>
+      </p:transition>
+    </mc:Choice>
+    <mc:Fallback>
+      <p:transition spd="slow">
+        <p:fade/>
+      </p:transition>
+    </mc:Fallback>
+  </mc:AlternateContent>
+  <p:timing>
+    <p:tnLst>
+      <p:par>
+        <p:cTn id="1" dur="indefinite" restart="never" nodeType="tmRoot"/>
+      </p:par>
+    </p:tnLst>
+  </p:timing>
 </p:sld>
 </file>
 
@@ -6474,6 +7462,25 @@
   <p:clrMapOvr>
     <a:masterClrMapping/>
   </p:clrMapOvr>
+  <mc:AlternateContent xmlns:mc="http://schemas.openxmlformats.org/markup-compatibility/2006">
+    <mc:Choice xmlns:p14="http://schemas.microsoft.com/office/powerpoint/2010/main" Requires="p14">
+      <p:transition spd="slow">
+        <p14:reveal/>
+      </p:transition>
+    </mc:Choice>
+    <mc:Fallback>
+      <p:transition spd="slow">
+        <p:fade/>
+      </p:transition>
+    </mc:Fallback>
+  </mc:AlternateContent>
+  <p:timing>
+    <p:tnLst>
+      <p:par>
+        <p:cTn id="1" dur="indefinite" restart="never" nodeType="tmRoot"/>
+      </p:par>
+    </p:tnLst>
+  </p:timing>
 </p:sld>
 </file>
 
@@ -6588,6 +7595,25 @@
   <p:clrMapOvr>
     <a:masterClrMapping/>
   </p:clrMapOvr>
+  <mc:AlternateContent xmlns:mc="http://schemas.openxmlformats.org/markup-compatibility/2006">
+    <mc:Choice xmlns:p14="http://schemas.microsoft.com/office/powerpoint/2010/main" Requires="p14">
+      <p:transition spd="slow">
+        <p14:reveal/>
+      </p:transition>
+    </mc:Choice>
+    <mc:Fallback>
+      <p:transition spd="slow">
+        <p:fade/>
+      </p:transition>
+    </mc:Fallback>
+  </mc:AlternateContent>
+  <p:timing>
+    <p:tnLst>
+      <p:par>
+        <p:cTn id="1" dur="indefinite" restart="never" nodeType="tmRoot"/>
+      </p:par>
+    </p:tnLst>
+  </p:timing>
 </p:sld>
 </file>
 
@@ -6618,21 +7644,14 @@
             <p:ph type="title"/>
           </p:nvPr>
         </p:nvSpPr>
-        <p:spPr>
-          <a:xfrm>
-            <a:off x="2895600" y="208741"/>
-            <a:ext cx="8610600" cy="521851"/>
-          </a:xfrm>
-        </p:spPr>
-        <p:txBody>
-          <a:bodyPr>
-            <a:normAutofit fontScale="90000"/>
-          </a:bodyPr>
-          <a:lstStyle/>
-          <a:p>
-            <a:r>
-              <a:rPr lang="en-US" dirty="0" smtClean="0"/>
-              <a:t>Description </a:t>
+        <p:spPr/>
+        <p:txBody>
+          <a:bodyPr/>
+          <a:lstStyle/>
+          <a:p>
+            <a:r>
+              <a:rPr lang="en-US" dirty="0" smtClean="0"/>
+              <a:t>Description</a:t>
             </a:r>
             <a:endParaRPr lang="en-US" dirty="0"/>
           </a:p>
@@ -6648,92 +7667,77 @@
             <p:ph idx="1"/>
           </p:nvPr>
         </p:nvSpPr>
-        <p:spPr>
-          <a:xfrm>
-            <a:off x="546612" y="1011696"/>
-            <a:ext cx="10820400" cy="1284451"/>
-          </a:xfrm>
-        </p:spPr>
+        <p:spPr/>
         <p:txBody>
           <a:bodyPr/>
           <a:lstStyle/>
           <a:p>
             <a:r>
-              <a:rPr lang="en-US" dirty="0" smtClean="0"/>
+              <a:rPr lang="en-US" b="1" u="sng" dirty="0"/>
               <a:t>2.1 Product Perspective </a:t>
             </a:r>
-            <a:endParaRPr lang="en-US" dirty="0"/>
-          </a:p>
-        </p:txBody>
-      </p:sp>
-      <p:pic>
-        <p:nvPicPr>
-          <p:cNvPr id="5" name="Picture 4"/>
-          <p:cNvPicPr/>
-          <p:nvPr/>
-        </p:nvPicPr>
-        <p:blipFill>
-          <a:blip r:embed="rId2">
-            <a:extLst>
-              <a:ext uri="{28A0092B-C50C-407E-A947-70E740481C1C}">
-                <a14:useLocalDpi xmlns:a14="http://schemas.microsoft.com/office/drawing/2010/main" val="0"/>
-              </a:ext>
-            </a:extLst>
-          </a:blip>
-          <a:stretch>
-            <a:fillRect/>
-          </a:stretch>
-        </p:blipFill>
-        <p:spPr>
-          <a:xfrm>
-            <a:off x="1531067" y="1588016"/>
-            <a:ext cx="8925431" cy="4644479"/>
-          </a:xfrm>
-          <a:prstGeom prst="rect">
-            <a:avLst/>
-          </a:prstGeom>
-        </p:spPr>
-      </p:pic>
-      <p:sp>
-        <p:nvSpPr>
-          <p:cNvPr id="7" name="Rectangle 6"/>
-          <p:cNvSpPr/>
-          <p:nvPr/>
-        </p:nvSpPr>
-        <p:spPr>
-          <a:xfrm>
-            <a:off x="1531067" y="6211347"/>
-            <a:ext cx="8925432" cy="369332"/>
-          </a:xfrm>
-          <a:prstGeom prst="rect">
-            <a:avLst/>
-          </a:prstGeom>
-        </p:spPr>
-        <p:txBody>
-          <a:bodyPr wrap="square">
-            <a:spAutoFit/>
-          </a:bodyPr>
-          <a:lstStyle/>
-          <a:p>
-            <a:r>
-              <a:rPr lang="en-US" b="1" dirty="0"/>
-              <a:t>Figure 1 </a:t>
-            </a:r>
-            <a:r>
-              <a:rPr lang="en-US" i="1" dirty="0"/>
-              <a:t>–</a:t>
-            </a:r>
-            <a:r>
-              <a:rPr lang="en-US" b="1" dirty="0"/>
-              <a:t> </a:t>
-            </a:r>
-            <a:r>
-              <a:rPr lang="en-US" i="1" dirty="0"/>
-              <a:t>Context diagram for release 1.0 of the Fraction Worksheet Creator</a:t>
+            <a:endParaRPr lang="en-US" b="1" u="sng" dirty="0" smtClean="0"/>
+          </a:p>
+          <a:p>
+            <a:pPr marL="0" indent="0">
+              <a:buNone/>
+            </a:pPr>
+            <a:r>
+              <a:rPr lang="en-US" dirty="0" smtClean="0"/>
+              <a:t>The </a:t>
             </a:r>
             <a:r>
               <a:rPr lang="en-US" dirty="0"/>
-              <a:t> </a:t>
+              <a:t>Fraction Worksheet Creator (FWC) is a new stand-alone product that allows teachers and students to create random exercise worksheets to practice operations with </a:t>
+            </a:r>
+            <a:r>
+              <a:rPr lang="en-US" dirty="0" smtClean="0"/>
+              <a:t>fractions.</a:t>
+            </a:r>
+          </a:p>
+          <a:p>
+            <a:pPr marL="0" indent="0">
+              <a:buNone/>
+            </a:pPr>
+            <a:endParaRPr lang="en-US" dirty="0" smtClean="0"/>
+          </a:p>
+          <a:p>
+            <a:pPr marL="0" indent="0">
+              <a:buNone/>
+            </a:pPr>
+            <a:r>
+              <a:rPr lang="en-US" dirty="0" smtClean="0"/>
+              <a:t>It is:</a:t>
+            </a:r>
+          </a:p>
+          <a:p>
+            <a:pPr lvl="1"/>
+            <a:r>
+              <a:rPr lang="en-US" dirty="0" smtClean="0"/>
+              <a:t>accessible offline</a:t>
+            </a:r>
+          </a:p>
+          <a:p>
+            <a:pPr lvl="1"/>
+            <a:r>
+              <a:rPr lang="en-US" dirty="0" smtClean="0"/>
+              <a:t>stores </a:t>
+            </a:r>
+            <a:r>
+              <a:rPr lang="en-US" dirty="0"/>
+              <a:t>worksheets and user </a:t>
+            </a:r>
+            <a:r>
+              <a:rPr lang="en-US" dirty="0" smtClean="0"/>
+              <a:t>information</a:t>
+            </a:r>
+            <a:endParaRPr lang="en-US" dirty="0"/>
+          </a:p>
+          <a:p>
+            <a:pPr lvl="1"/>
+            <a:r>
+              <a:rPr lang="en-US" dirty="0" smtClean="0"/>
+              <a:t>shared on a workstation</a:t>
             </a:r>
           </a:p>
         </p:txBody>
@@ -6741,13 +7745,32 @@
     </p:spTree>
     <p:extLst>
       <p:ext uri="{BB962C8B-B14F-4D97-AF65-F5344CB8AC3E}">
-        <p14:creationId xmlns:p14="http://schemas.microsoft.com/office/powerpoint/2010/main" val="883840056"/>
+        <p14:creationId xmlns:p14="http://schemas.microsoft.com/office/powerpoint/2010/main" val="982319779"/>
       </p:ext>
     </p:extLst>
   </p:cSld>
   <p:clrMapOvr>
     <a:masterClrMapping/>
   </p:clrMapOvr>
+  <mc:AlternateContent xmlns:mc="http://schemas.openxmlformats.org/markup-compatibility/2006">
+    <mc:Choice xmlns:p14="http://schemas.microsoft.com/office/powerpoint/2010/main" Requires="p14">
+      <p:transition spd="slow">
+        <p14:reveal/>
+      </p:transition>
+    </mc:Choice>
+    <mc:Fallback>
+      <p:transition spd="slow">
+        <p:fade/>
+      </p:transition>
+    </mc:Fallback>
+  </mc:AlternateContent>
+  <p:timing>
+    <p:tnLst>
+      <p:par>
+        <p:cTn id="1" dur="indefinite" restart="never" nodeType="tmRoot"/>
+      </p:par>
+    </p:tnLst>
+  </p:timing>
 </p:sld>
 </file>
 
@@ -6778,117 +7801,125 @@
             <p:ph type="title"/>
           </p:nvPr>
         </p:nvSpPr>
-        <p:spPr/>
+        <p:spPr>
+          <a:xfrm>
+            <a:off x="2895600" y="208741"/>
+            <a:ext cx="8610600" cy="521851"/>
+          </a:xfrm>
+        </p:spPr>
+        <p:txBody>
+          <a:bodyPr>
+            <a:normAutofit fontScale="90000"/>
+          </a:bodyPr>
+          <a:lstStyle/>
+          <a:p>
+            <a:r>
+              <a:rPr lang="en-US" dirty="0" smtClean="0"/>
+              <a:t>Description </a:t>
+            </a:r>
+            <a:endParaRPr lang="en-US" dirty="0"/>
+          </a:p>
+        </p:txBody>
+      </p:sp>
+      <p:sp>
+        <p:nvSpPr>
+          <p:cNvPr id="3" name="Content Placeholder 2"/>
+          <p:cNvSpPr>
+            <a:spLocks noGrp="1"/>
+          </p:cNvSpPr>
+          <p:nvPr>
+            <p:ph idx="1"/>
+          </p:nvPr>
+        </p:nvSpPr>
+        <p:spPr>
+          <a:xfrm>
+            <a:off x="546612" y="1011696"/>
+            <a:ext cx="10820400" cy="1284451"/>
+          </a:xfrm>
+        </p:spPr>
         <p:txBody>
           <a:bodyPr/>
           <a:lstStyle/>
           <a:p>
-            <a:r>
-              <a:rPr lang="en-US" dirty="0" smtClean="0"/>
-              <a:t>User Requirements</a:t>
-            </a:r>
-            <a:endParaRPr lang="en-US" dirty="0"/>
-          </a:p>
-        </p:txBody>
-      </p:sp>
-      <p:sp>
-        <p:nvSpPr>
-          <p:cNvPr id="3" name="Content Placeholder 2"/>
-          <p:cNvSpPr>
-            <a:spLocks noGrp="1"/>
-          </p:cNvSpPr>
-          <p:nvPr>
-            <p:ph idx="1"/>
-          </p:nvPr>
-        </p:nvSpPr>
-        <p:spPr/>
-        <p:txBody>
-          <a:bodyPr/>
-          <a:lstStyle/>
-          <a:p>
-            <a:r>
-              <a:rPr lang="en-US" dirty="0" smtClean="0"/>
-              <a:t>3.1 Functional Requirements </a:t>
-            </a:r>
-          </a:p>
-          <a:p>
             <a:pPr marL="0" indent="0">
               <a:buNone/>
             </a:pPr>
             <a:r>
-              <a:rPr lang="en-US" dirty="0" smtClean="0"/>
-              <a:t>	- Requirement for the Admin </a:t>
-            </a:r>
-          </a:p>
-          <a:p>
-            <a:pPr marL="0" indent="0">
-              <a:buNone/>
-            </a:pPr>
+              <a:rPr lang="en-US" b="1" u="sng" dirty="0" smtClean="0"/>
+              <a:t>2.1 Product Perspective </a:t>
+            </a:r>
+            <a:endParaRPr lang="en-US" b="1" u="sng" dirty="0"/>
+          </a:p>
+        </p:txBody>
+      </p:sp>
+      <p:pic>
+        <p:nvPicPr>
+          <p:cNvPr id="5" name="Picture 4"/>
+          <p:cNvPicPr/>
+          <p:nvPr/>
+        </p:nvPicPr>
+        <p:blipFill>
+          <a:blip r:embed="rId2">
+            <a:extLst>
+              <a:ext uri="{28A0092B-C50C-407E-A947-70E740481C1C}">
+                <a14:useLocalDpi xmlns:a14="http://schemas.microsoft.com/office/drawing/2010/main" val="0"/>
+              </a:ext>
+            </a:extLst>
+          </a:blip>
+          <a:stretch>
+            <a:fillRect/>
+          </a:stretch>
+        </p:blipFill>
+        <p:spPr>
+          <a:xfrm>
+            <a:off x="1531067" y="1493020"/>
+            <a:ext cx="8733810" cy="4718327"/>
+          </a:xfrm>
+          <a:prstGeom prst="rect">
+            <a:avLst/>
+          </a:prstGeom>
+        </p:spPr>
+      </p:pic>
+      <p:sp>
+        <p:nvSpPr>
+          <p:cNvPr id="7" name="Rectangle 6"/>
+          <p:cNvSpPr/>
+          <p:nvPr/>
+        </p:nvSpPr>
+        <p:spPr>
+          <a:xfrm>
+            <a:off x="1531067" y="6211347"/>
+            <a:ext cx="8925432" cy="369332"/>
+          </a:xfrm>
+          <a:prstGeom prst="rect">
+            <a:avLst/>
+          </a:prstGeom>
+        </p:spPr>
+        <p:txBody>
+          <a:bodyPr wrap="square">
+            <a:spAutoFit/>
+          </a:bodyPr>
+          <a:lstStyle/>
+          <a:p>
+            <a:r>
+              <a:rPr lang="en-US" b="1" dirty="0"/>
+              <a:t>Figure 1 </a:t>
+            </a:r>
+            <a:r>
+              <a:rPr lang="en-US" i="1" dirty="0"/>
+              <a:t>–</a:t>
+            </a:r>
+            <a:r>
+              <a:rPr lang="en-US" b="1" dirty="0"/>
+              <a:t> </a:t>
+            </a:r>
+            <a:r>
+              <a:rPr lang="en-US" i="1" dirty="0"/>
+              <a:t>Context diagram for release 1.0 of the Fraction Worksheet Creator</a:t>
+            </a:r>
             <a:r>
               <a:rPr lang="en-US" dirty="0"/>
-              <a:t>	</a:t>
-            </a:r>
-            <a:r>
-              <a:rPr lang="en-US" dirty="0" smtClean="0"/>
-              <a:t>- General System Features </a:t>
-            </a:r>
-          </a:p>
-          <a:p>
-            <a:pPr marL="0" indent="0">
-              <a:buNone/>
-            </a:pPr>
-            <a:r>
-              <a:rPr lang="en-US" dirty="0"/>
-              <a:t>	</a:t>
-            </a:r>
-            <a:r>
-              <a:rPr lang="en-US" dirty="0" smtClean="0"/>
-              <a:t>- Teacher System Features</a:t>
-            </a:r>
-          </a:p>
-          <a:p>
-            <a:pPr marL="0" indent="0">
-              <a:buNone/>
-            </a:pPr>
-            <a:r>
-              <a:rPr lang="en-US" dirty="0"/>
-              <a:t>	</a:t>
-            </a:r>
-            <a:r>
-              <a:rPr lang="en-US" dirty="0" smtClean="0"/>
-              <a:t>- Student System Features </a:t>
-            </a:r>
-          </a:p>
-          <a:p>
-            <a:r>
-              <a:rPr lang="en-US" dirty="0" smtClean="0"/>
-              <a:t>3.2 Non-Functional Requirements </a:t>
-            </a:r>
-          </a:p>
-          <a:p>
-            <a:pPr marL="0" indent="0">
-              <a:buNone/>
-            </a:pPr>
-            <a:r>
-              <a:rPr lang="en-US" dirty="0"/>
-              <a:t>	</a:t>
-            </a:r>
-            <a:r>
-              <a:rPr lang="en-US" dirty="0" smtClean="0"/>
-              <a:t>-OS systems it should run on </a:t>
-            </a:r>
-          </a:p>
-          <a:p>
-            <a:pPr marL="0" indent="0">
-              <a:buNone/>
-            </a:pPr>
-            <a:r>
-              <a:rPr lang="en-US" dirty="0"/>
-              <a:t>	</a:t>
-            </a:r>
-            <a:r>
-              <a:rPr lang="en-US" dirty="0" smtClean="0"/>
-              <a:t>- System should have access to a printer</a:t>
+              <a:t> </a:t>
             </a:r>
           </a:p>
         </p:txBody>
@@ -6896,13 +7927,32 @@
     </p:spTree>
     <p:extLst>
       <p:ext uri="{BB962C8B-B14F-4D97-AF65-F5344CB8AC3E}">
-        <p14:creationId xmlns:p14="http://schemas.microsoft.com/office/powerpoint/2010/main" val="1237032422"/>
+        <p14:creationId xmlns:p14="http://schemas.microsoft.com/office/powerpoint/2010/main" val="883840056"/>
       </p:ext>
     </p:extLst>
   </p:cSld>
   <p:clrMapOvr>
     <a:masterClrMapping/>
   </p:clrMapOvr>
+  <mc:AlternateContent xmlns:mc="http://schemas.openxmlformats.org/markup-compatibility/2006">
+    <mc:Choice xmlns:p14="http://schemas.microsoft.com/office/powerpoint/2010/main" Requires="p14">
+      <p:transition spd="slow">
+        <p14:reveal/>
+      </p:transition>
+    </mc:Choice>
+    <mc:Fallback>
+      <p:transition spd="slow">
+        <p:fade/>
+      </p:transition>
+    </mc:Fallback>
+  </mc:AlternateContent>
+  <p:timing>
+    <p:tnLst>
+      <p:par>
+        <p:cTn id="1" dur="indefinite" restart="never" nodeType="tmRoot"/>
+      </p:par>
+    </p:tnLst>
+  </p:timing>
 </p:sld>
 </file>
 
@@ -6940,7 +7990,7 @@
           <a:p>
             <a:r>
               <a:rPr lang="en-US" dirty="0" smtClean="0"/>
-              <a:t>User Requirements continued </a:t>
+              <a:t>Description Continued</a:t>
             </a:r>
             <a:endParaRPr lang="en-US" dirty="0"/>
           </a:p>
@@ -6958,66 +8008,133 @@
         </p:nvSpPr>
         <p:spPr/>
         <p:txBody>
-          <a:bodyPr/>
-          <a:lstStyle/>
-          <a:p>
-            <a:r>
-              <a:rPr lang="en-US" dirty="0" smtClean="0"/>
-              <a:t>3.3 Software Interfaces </a:t>
-            </a:r>
-          </a:p>
-          <a:p>
-            <a:pPr marL="457200" lvl="1" indent="0">
-              <a:buNone/>
-            </a:pPr>
+          <a:bodyPr>
+            <a:normAutofit/>
+          </a:bodyPr>
+          <a:lstStyle/>
+          <a:p>
+            <a:r>
+              <a:rPr lang="en-US" b="1" u="sng" dirty="0" smtClean="0"/>
+              <a:t>2.2 User Classes and Characteristics</a:t>
+            </a:r>
+          </a:p>
+          <a:p>
+            <a:pPr lvl="1"/>
+            <a:r>
+              <a:rPr lang="en-US" dirty="0" smtClean="0"/>
+              <a:t>Administrator</a:t>
+            </a:r>
+          </a:p>
+          <a:p>
+            <a:pPr lvl="1"/>
+            <a:r>
+              <a:rPr lang="en-US" dirty="0" smtClean="0"/>
+              <a:t>Teacher </a:t>
+            </a:r>
             <a:r>
               <a:rPr lang="en-US" dirty="0"/>
-              <a:t>	</a:t>
-            </a:r>
-            <a:r>
-              <a:rPr lang="en-US" dirty="0" smtClean="0"/>
-              <a:t>- will interface with a database</a:t>
-            </a:r>
-          </a:p>
-          <a:p>
-            <a:pPr marL="457200" lvl="1" indent="0">
-              <a:buNone/>
-            </a:pPr>
+              <a:t>(</a:t>
+            </a:r>
+            <a:r>
+              <a:rPr lang="en-US" dirty="0" smtClean="0"/>
+              <a:t>favored)</a:t>
+            </a:r>
+          </a:p>
+          <a:p>
+            <a:pPr lvl="1"/>
+            <a:r>
+              <a:rPr lang="en-US" dirty="0" smtClean="0"/>
+              <a:t>Student</a:t>
+            </a:r>
+          </a:p>
+          <a:p>
+            <a:pPr lvl="1"/>
+            <a:endParaRPr lang="en-US" dirty="0" smtClean="0"/>
+          </a:p>
+          <a:p>
+            <a:r>
+              <a:rPr lang="en-US" b="1" u="sng" dirty="0" smtClean="0"/>
+              <a:t>2.3 Operating Environment</a:t>
+            </a:r>
+          </a:p>
+          <a:p>
+            <a:pPr lvl="1"/>
+            <a:r>
+              <a:rPr lang="en-US" dirty="0" smtClean="0"/>
+              <a:t>any </a:t>
+            </a:r>
             <a:r>
               <a:rPr lang="en-US" dirty="0"/>
-              <a:t>	</a:t>
-            </a:r>
-            <a:r>
-              <a:rPr lang="en-US" dirty="0" smtClean="0"/>
-              <a:t>- interface with a API</a:t>
-            </a:r>
-          </a:p>
-          <a:p>
-            <a:pPr marL="457200" lvl="1" indent="0">
-              <a:buNone/>
-            </a:pPr>
+              <a:t>Operating System </a:t>
+            </a:r>
+            <a:r>
+              <a:rPr lang="en-US" dirty="0" smtClean="0"/>
+              <a:t>with Java installed</a:t>
+            </a:r>
+            <a:endParaRPr lang="en-US" sz="2600" dirty="0"/>
+          </a:p>
+          <a:p>
+            <a:pPr lvl="1"/>
+            <a:r>
+              <a:rPr lang="en-US" dirty="0" smtClean="0"/>
+              <a:t>interface </a:t>
+            </a:r>
             <a:r>
               <a:rPr lang="en-US" dirty="0"/>
-              <a:t>	</a:t>
-            </a:r>
-            <a:r>
-              <a:rPr lang="en-US" dirty="0" smtClean="0"/>
-              <a:t>- interface with Adobe Reader</a:t>
-            </a:r>
-            <a:endParaRPr lang="en-US" dirty="0"/>
+              <a:t>with Adobe Reader </a:t>
+            </a:r>
+            <a:r>
+              <a:rPr lang="en-US" dirty="0" smtClean="0"/>
+              <a:t>open worksheets</a:t>
+            </a:r>
+          </a:p>
+          <a:p>
+            <a:pPr lvl="1"/>
+            <a:r>
+              <a:rPr lang="en-US" dirty="0" smtClean="0"/>
+              <a:t>operate </a:t>
+            </a:r>
+            <a:r>
+              <a:rPr lang="en-US" dirty="0"/>
+              <a:t>with any system that has a printer </a:t>
+            </a:r>
+            <a:r>
+              <a:rPr lang="en-US" dirty="0" smtClean="0"/>
+              <a:t>installed</a:t>
+            </a:r>
+            <a:endParaRPr lang="en-US" sz="2600" dirty="0"/>
           </a:p>
         </p:txBody>
       </p:sp>
     </p:spTree>
     <p:extLst>
       <p:ext uri="{BB962C8B-B14F-4D97-AF65-F5344CB8AC3E}">
-        <p14:creationId xmlns:p14="http://schemas.microsoft.com/office/powerpoint/2010/main" val="2021458727"/>
+        <p14:creationId xmlns:p14="http://schemas.microsoft.com/office/powerpoint/2010/main" val="1964313792"/>
       </p:ext>
     </p:extLst>
   </p:cSld>
   <p:clrMapOvr>
     <a:masterClrMapping/>
   </p:clrMapOvr>
+  <mc:AlternateContent xmlns:mc="http://schemas.openxmlformats.org/markup-compatibility/2006">
+    <mc:Choice xmlns:p14="http://schemas.microsoft.com/office/powerpoint/2010/main" Requires="p14">
+      <p:transition spd="slow">
+        <p14:reveal/>
+      </p:transition>
+    </mc:Choice>
+    <mc:Fallback>
+      <p:transition spd="slow">
+        <p:fade/>
+      </p:transition>
+    </mc:Fallback>
+  </mc:AlternateContent>
+  <p:timing>
+    <p:tnLst>
+      <p:par>
+        <p:cTn id="1" dur="indefinite" restart="never" nodeType="tmRoot"/>
+      </p:par>
+    </p:tnLst>
+  </p:timing>
 </p:sld>
 </file>
 
@@ -7055,9 +8172,12 @@
           <a:p>
             <a:r>
               <a:rPr lang="en-US" dirty="0" smtClean="0"/>
-              <a:t>System Requirements </a:t>
-            </a:r>
-            <a:endParaRPr lang="en-US" dirty="0"/>
+              <a:t>Description</a:t>
+            </a:r>
+            <a:r>
+              <a:rPr lang="en-US" dirty="0"/>
+              <a:t> Continued</a:t>
+            </a:r>
           </a:p>
         </p:txBody>
       </p:sp>
@@ -7071,83 +8191,230 @@
             <p:ph idx="1"/>
           </p:nvPr>
         </p:nvSpPr>
-        <p:spPr/>
-        <p:txBody>
-          <a:bodyPr/>
-          <a:lstStyle/>
-          <a:p>
-            <a:r>
-              <a:rPr lang="en-US" dirty="0" smtClean="0"/>
-              <a:t>4.1 Admin System Features</a:t>
+        <p:spPr>
+          <a:xfrm>
+            <a:off x="685800" y="2194560"/>
+            <a:ext cx="10820400" cy="4127582"/>
+          </a:xfrm>
+        </p:spPr>
+        <p:txBody>
+          <a:bodyPr>
+            <a:normAutofit fontScale="92500" lnSpcReduction="20000"/>
+          </a:bodyPr>
+          <a:lstStyle/>
+          <a:p>
+            <a:r>
+              <a:rPr lang="en-US" b="1" u="sng" dirty="0" smtClean="0"/>
+              <a:t>2.4 Design and Implementation Constraints</a:t>
             </a:r>
           </a:p>
           <a:p>
             <a:pPr lvl="1"/>
             <a:r>
-              <a:rPr lang="en-US" dirty="0" smtClean="0"/>
-              <a:t>4.1.1 Teacher Registration </a:t>
-            </a:r>
-          </a:p>
-          <a:p>
-            <a:pPr marL="457200" lvl="1" indent="0">
-              <a:buNone/>
-            </a:pPr>
-            <a:r>
               <a:rPr lang="en-US" dirty="0"/>
-              <a:t>	</a:t>
-            </a:r>
-            <a:r>
-              <a:rPr lang="en-US" dirty="0" smtClean="0"/>
-              <a:t>- Register Teachers Accounts</a:t>
-            </a:r>
-            <a:endParaRPr lang="en-US" dirty="0"/>
+              <a:t>A</a:t>
+            </a:r>
+            <a:r>
+              <a:rPr lang="en-US" dirty="0" smtClean="0"/>
+              <a:t>ny </a:t>
+            </a:r>
+            <a:r>
+              <a:rPr lang="en-US" dirty="0"/>
+              <a:t>version of Adobe </a:t>
+            </a:r>
+            <a:r>
+              <a:rPr lang="en-US" dirty="0" smtClean="0"/>
+              <a:t>Reader</a:t>
+            </a:r>
           </a:p>
           <a:p>
             <a:pPr lvl="1"/>
             <a:r>
               <a:rPr lang="en-US" dirty="0" smtClean="0"/>
-              <a:t>4.1.2 Teacher Password Reset</a:t>
-            </a:r>
-          </a:p>
-          <a:p>
-            <a:pPr marL="457200" lvl="1" indent="0">
-              <a:buNone/>
-            </a:pPr>
+              <a:t>Secure passwords </a:t>
+            </a:r>
             <a:r>
               <a:rPr lang="en-US" dirty="0"/>
-              <a:t>	</a:t>
-            </a:r>
-            <a:r>
-              <a:rPr lang="en-US" dirty="0" smtClean="0"/>
-              <a:t>- Admin shall reset teachers account passwords</a:t>
-            </a:r>
-          </a:p>
-          <a:p>
-            <a:pPr marL="457200" lvl="1" indent="0">
-              <a:buNone/>
-            </a:pPr>
+              <a:t>of all user </a:t>
+            </a:r>
+            <a:r>
+              <a:rPr lang="en-US" dirty="0" smtClean="0"/>
+              <a:t>accounts</a:t>
+            </a:r>
+            <a:endParaRPr lang="en-US" sz="2600" dirty="0"/>
+          </a:p>
+          <a:p>
+            <a:pPr lvl="1"/>
             <a:r>
               <a:rPr lang="en-US" dirty="0"/>
-              <a:t>	</a:t>
-            </a:r>
-            <a:r>
-              <a:rPr lang="en-US" dirty="0" smtClean="0"/>
-              <a:t>- Generates a randomly generated password</a:t>
-            </a:r>
-            <a:endParaRPr lang="en-US" dirty="0"/>
+              <a:t>M</a:t>
+            </a:r>
+            <a:r>
+              <a:rPr lang="en-US" dirty="0" smtClean="0"/>
+              <a:t>aintenance </a:t>
+            </a:r>
+            <a:r>
+              <a:rPr lang="en-US" dirty="0"/>
+              <a:t>of </a:t>
+            </a:r>
+            <a:r>
+              <a:rPr lang="en-US" dirty="0"/>
+              <a:t>T</a:t>
+            </a:r>
+            <a:r>
+              <a:rPr lang="en-US" dirty="0" smtClean="0"/>
+              <a:t>eacher </a:t>
+            </a:r>
+            <a:r>
+              <a:rPr lang="en-US" dirty="0"/>
+              <a:t>accounts will be </a:t>
+            </a:r>
+            <a:r>
+              <a:rPr lang="en-US" dirty="0" smtClean="0"/>
+              <a:t>responsibility </a:t>
+            </a:r>
+            <a:r>
+              <a:rPr lang="en-US" dirty="0"/>
+              <a:t>of </a:t>
+            </a:r>
+            <a:r>
+              <a:rPr lang="en-US" dirty="0" smtClean="0"/>
+              <a:t>Admin</a:t>
+            </a:r>
+          </a:p>
+          <a:p>
+            <a:pPr lvl="1"/>
+            <a:r>
+              <a:rPr lang="en-US" dirty="0" smtClean="0"/>
+              <a:t>Re-install when Admin </a:t>
+            </a:r>
+            <a:r>
+              <a:rPr lang="en-US" dirty="0"/>
+              <a:t>forgets </a:t>
+            </a:r>
+            <a:r>
+              <a:rPr lang="en-US" dirty="0" smtClean="0"/>
+              <a:t>master password</a:t>
+            </a:r>
+          </a:p>
+          <a:p>
+            <a:endParaRPr lang="en-US" b="1" u="sng" dirty="0"/>
+          </a:p>
+          <a:p>
+            <a:r>
+              <a:rPr lang="en-US" b="1" u="sng" dirty="0" smtClean="0"/>
+              <a:t>2.5 User Documentation</a:t>
+            </a:r>
+          </a:p>
+          <a:p>
+            <a:pPr lvl="1"/>
+            <a:r>
+              <a:rPr lang="en-US" dirty="0"/>
+              <a:t>H</a:t>
+            </a:r>
+            <a:r>
+              <a:rPr lang="en-US" dirty="0" smtClean="0"/>
+              <a:t>elp utility</a:t>
+            </a:r>
+          </a:p>
+          <a:p>
+            <a:pPr lvl="1"/>
+            <a:r>
+              <a:rPr lang="en-US" dirty="0"/>
+              <a:t>V</a:t>
+            </a:r>
+            <a:r>
+              <a:rPr lang="en-US" dirty="0" smtClean="0"/>
+              <a:t>ideo tutorials</a:t>
+            </a:r>
+          </a:p>
+          <a:p>
+            <a:pPr lvl="1"/>
+            <a:endParaRPr lang="en-US" b="1" u="sng" dirty="0"/>
+          </a:p>
+          <a:p>
+            <a:r>
+              <a:rPr lang="en-US" b="1" u="sng" dirty="0" smtClean="0"/>
+              <a:t>2.6 Assumptions and Dependencies</a:t>
+            </a:r>
+          </a:p>
+          <a:p>
+            <a:pPr lvl="1"/>
+            <a:r>
+              <a:rPr lang="en-US" dirty="0" smtClean="0"/>
+              <a:t>System also </a:t>
+            </a:r>
+            <a:r>
+              <a:rPr lang="en-US" dirty="0"/>
+              <a:t>has </a:t>
+            </a:r>
+            <a:r>
+              <a:rPr lang="en-US" dirty="0" smtClean="0"/>
+              <a:t>Java and Adobe Reader installed</a:t>
+            </a:r>
+          </a:p>
+          <a:p>
+            <a:pPr lvl="1"/>
+            <a:r>
+              <a:rPr lang="en-US" dirty="0" smtClean="0"/>
+              <a:t>Teachers </a:t>
+            </a:r>
+            <a:r>
+              <a:rPr lang="en-US" dirty="0"/>
+              <a:t>and Students </a:t>
+            </a:r>
+            <a:r>
+              <a:rPr lang="en-US" dirty="0" smtClean="0"/>
+              <a:t>allowed to </a:t>
+            </a:r>
+            <a:r>
+              <a:rPr lang="en-US" dirty="0"/>
+              <a:t>save files to </a:t>
+            </a:r>
+            <a:r>
+              <a:rPr lang="en-US" dirty="0" smtClean="0"/>
+              <a:t>local system</a:t>
+            </a:r>
+          </a:p>
+          <a:p>
+            <a:pPr lvl="1"/>
+            <a:r>
+              <a:rPr lang="en-US" dirty="0" smtClean="0"/>
+              <a:t>Data only need to be accessed on the local system</a:t>
+            </a:r>
+            <a:endParaRPr lang="en-US" sz="2600" dirty="0"/>
           </a:p>
         </p:txBody>
       </p:sp>
     </p:spTree>
     <p:extLst>
       <p:ext uri="{BB962C8B-B14F-4D97-AF65-F5344CB8AC3E}">
-        <p14:creationId xmlns:p14="http://schemas.microsoft.com/office/powerpoint/2010/main" val="1193365723"/>
+        <p14:creationId xmlns:p14="http://schemas.microsoft.com/office/powerpoint/2010/main" val="427615778"/>
       </p:ext>
     </p:extLst>
   </p:cSld>
   <p:clrMapOvr>
     <a:masterClrMapping/>
   </p:clrMapOvr>
+  <mc:AlternateContent xmlns:mc="http://schemas.openxmlformats.org/markup-compatibility/2006">
+    <mc:Choice xmlns:p14="http://schemas.microsoft.com/office/powerpoint/2010/main" Requires="p14">
+      <p:transition spd="slow">
+        <p14:reveal/>
+      </p:transition>
+    </mc:Choice>
+    <mc:Fallback>
+      <p:transition spd="slow">
+        <p:fade/>
+      </p:transition>
+    </mc:Fallback>
+  </mc:AlternateContent>
+  <p:timing>
+    <p:tnLst>
+      <p:par>
+        <p:cTn id="1" dur="indefinite" restart="never" nodeType="tmRoot"/>
+      </p:par>
+    </p:tnLst>
+  </p:timing>
 </p:sld>
 </file>
 
@@ -7185,7 +8452,7 @@
           <a:p>
             <a:r>
               <a:rPr lang="en-US" dirty="0" smtClean="0"/>
-              <a:t>System requirements continued</a:t>
+              <a:t>User Requirements</a:t>
             </a:r>
             <a:endParaRPr lang="en-US" dirty="0"/>
           </a:p>
@@ -7207,103 +8474,121 @@
           <a:lstStyle/>
           <a:p>
             <a:r>
-              <a:rPr lang="en-US" dirty="0" smtClean="0"/>
-              <a:t>4.2 General System features </a:t>
-            </a:r>
-          </a:p>
-          <a:p>
-            <a:pPr lvl="1">
-              <a:buFontTx/>
-              <a:buChar char="-"/>
-            </a:pPr>
-            <a:r>
-              <a:rPr lang="en-US" dirty="0" smtClean="0"/>
-              <a:t>4.2.1 Admin Account Setup</a:t>
-            </a:r>
-          </a:p>
-          <a:p>
-            <a:pPr lvl="1">
-              <a:buFontTx/>
-              <a:buChar char="-"/>
-            </a:pPr>
-            <a:r>
-              <a:rPr lang="en-US" dirty="0" smtClean="0"/>
-              <a:t>4.2.2 Graphical User Interface </a:t>
-            </a:r>
-          </a:p>
-          <a:p>
-            <a:pPr lvl="1">
-              <a:buFontTx/>
-              <a:buChar char="-"/>
-            </a:pPr>
-            <a:r>
-              <a:rPr lang="en-US" dirty="0" smtClean="0"/>
-              <a:t>4.2.3 Help System</a:t>
-            </a:r>
-          </a:p>
-          <a:p>
-            <a:pPr lvl="1">
-              <a:buFontTx/>
-              <a:buChar char="-"/>
-            </a:pPr>
-            <a:r>
-              <a:rPr lang="en-US" dirty="0" smtClean="0"/>
-              <a:t>4.2.4 Tutorial content</a:t>
-            </a:r>
-          </a:p>
-          <a:p>
-            <a:pPr lvl="1">
-              <a:buFontTx/>
-              <a:buChar char="-"/>
-            </a:pPr>
-            <a:r>
-              <a:rPr lang="en-US" dirty="0" smtClean="0"/>
-              <a:t>Random Exercise Generation </a:t>
-            </a:r>
-          </a:p>
-          <a:p>
-            <a:pPr lvl="1">
-              <a:buFontTx/>
-              <a:buChar char="-"/>
-            </a:pPr>
-            <a:r>
-              <a:rPr lang="en-US" dirty="0" smtClean="0"/>
-              <a:t>Worksheet Instructions </a:t>
-            </a:r>
-          </a:p>
-          <a:p>
-            <a:pPr lvl="1">
-              <a:buFontTx/>
-              <a:buChar char="-"/>
-            </a:pPr>
-            <a:r>
-              <a:rPr lang="en-US" dirty="0" smtClean="0"/>
-              <a:t>PDF Options</a:t>
-            </a:r>
-          </a:p>
-          <a:p>
-            <a:pPr lvl="1">
-              <a:buFontTx/>
-              <a:buChar char="-"/>
-            </a:pPr>
-            <a:r>
-              <a:rPr lang="en-US" dirty="0" smtClean="0"/>
-              <a:t>Search Features </a:t>
-            </a:r>
-            <a:endParaRPr lang="en-US" dirty="0"/>
+              <a:rPr lang="en-US" b="1" u="sng" dirty="0" smtClean="0"/>
+              <a:t>3.1 Functional Requirements </a:t>
+            </a:r>
+          </a:p>
+          <a:p>
+            <a:pPr lvl="1"/>
+            <a:r>
+              <a:rPr lang="en-US" dirty="0" smtClean="0"/>
+              <a:t>Requirements </a:t>
+            </a:r>
+            <a:r>
+              <a:rPr lang="en-US" dirty="0" smtClean="0"/>
+              <a:t>for the Admin </a:t>
+            </a:r>
+          </a:p>
+          <a:p>
+            <a:pPr lvl="1"/>
+            <a:r>
+              <a:rPr lang="en-US" dirty="0" smtClean="0"/>
+              <a:t>General </a:t>
+            </a:r>
+            <a:r>
+              <a:rPr lang="en-US" dirty="0" smtClean="0"/>
+              <a:t>System Features </a:t>
+            </a:r>
+          </a:p>
+          <a:p>
+            <a:pPr lvl="1"/>
+            <a:r>
+              <a:rPr lang="en-US" dirty="0" smtClean="0"/>
+              <a:t>Teacher </a:t>
+            </a:r>
+            <a:r>
+              <a:rPr lang="en-US" dirty="0" smtClean="0"/>
+              <a:t>System Features</a:t>
+            </a:r>
+          </a:p>
+          <a:p>
+            <a:pPr lvl="1"/>
+            <a:r>
+              <a:rPr lang="en-US" dirty="0" smtClean="0"/>
+              <a:t>Student </a:t>
+            </a:r>
+            <a:r>
+              <a:rPr lang="en-US" dirty="0" smtClean="0"/>
+              <a:t>System </a:t>
+            </a:r>
+            <a:r>
+              <a:rPr lang="en-US" dirty="0" smtClean="0"/>
+              <a:t>Features</a:t>
+            </a:r>
+          </a:p>
+          <a:p>
+            <a:pPr lvl="1"/>
+            <a:endParaRPr lang="en-US" dirty="0" smtClean="0"/>
+          </a:p>
+          <a:p>
+            <a:r>
+              <a:rPr lang="en-US" b="1" u="sng" dirty="0" smtClean="0"/>
+              <a:t>3.2 Non-Functional Requirements </a:t>
+            </a:r>
+          </a:p>
+          <a:p>
+            <a:pPr lvl="1"/>
+            <a:r>
+              <a:rPr lang="en-US" dirty="0" smtClean="0"/>
+              <a:t>OS </a:t>
+            </a:r>
+            <a:r>
+              <a:rPr lang="en-US" dirty="0" smtClean="0"/>
+              <a:t>systems it should run on </a:t>
+            </a:r>
+          </a:p>
+          <a:p>
+            <a:pPr lvl="1"/>
+            <a:r>
+              <a:rPr lang="en-US" dirty="0" smtClean="0"/>
+              <a:t>System </a:t>
+            </a:r>
+            <a:r>
+              <a:rPr lang="en-US" dirty="0" smtClean="0"/>
+              <a:t>should have access to a printer</a:t>
+            </a:r>
           </a:p>
         </p:txBody>
       </p:sp>
     </p:spTree>
     <p:extLst>
       <p:ext uri="{BB962C8B-B14F-4D97-AF65-F5344CB8AC3E}">
-        <p14:creationId xmlns:p14="http://schemas.microsoft.com/office/powerpoint/2010/main" val="1882224459"/>
+        <p14:creationId xmlns:p14="http://schemas.microsoft.com/office/powerpoint/2010/main" val="1237032422"/>
       </p:ext>
     </p:extLst>
   </p:cSld>
   <p:clrMapOvr>
     <a:masterClrMapping/>
   </p:clrMapOvr>
+  <mc:AlternateContent xmlns:mc="http://schemas.openxmlformats.org/markup-compatibility/2006">
+    <mc:Choice xmlns:p14="http://schemas.microsoft.com/office/powerpoint/2010/main" Requires="p14">
+      <p:transition spd="slow">
+        <p14:reveal/>
+      </p:transition>
+    </mc:Choice>
+    <mc:Fallback>
+      <p:transition spd="slow">
+        <p:fade/>
+      </p:transition>
+    </mc:Fallback>
+  </mc:AlternateContent>
+  <p:timing>
+    <p:tnLst>
+      <p:par>
+        <p:cTn id="1" dur="indefinite" restart="never" nodeType="tmRoot"/>
+      </p:par>
+    </p:tnLst>
+  </p:timing>
 </p:sld>
 </file>
 
@@ -7341,7 +8626,7 @@
           <a:p>
             <a:r>
               <a:rPr lang="en-US" dirty="0" smtClean="0"/>
-              <a:t>System Requirements Continued </a:t>
+              <a:t>User Requirements continued </a:t>
             </a:r>
             <a:endParaRPr lang="en-US" dirty="0"/>
           </a:p>
@@ -7359,131 +8644,58 @@
         </p:nvSpPr>
         <p:spPr/>
         <p:txBody>
-          <a:bodyPr>
-            <a:normAutofit lnSpcReduction="10000"/>
-          </a:bodyPr>
-          <a:lstStyle/>
-          <a:p>
-            <a:r>
-              <a:rPr lang="en-US" dirty="0" smtClean="0"/>
-              <a:t>4.3 Teacher System Features </a:t>
-            </a:r>
-          </a:p>
-          <a:p>
-            <a:pPr marL="0" indent="0">
-              <a:buNone/>
-            </a:pPr>
-            <a:r>
-              <a:rPr lang="en-US" dirty="0"/>
-              <a:t>	</a:t>
-            </a:r>
-            <a:r>
-              <a:rPr lang="en-US" dirty="0" smtClean="0"/>
-              <a:t>- 4.3.1 Teacher System Access</a:t>
-            </a:r>
-          </a:p>
-          <a:p>
-            <a:pPr marL="0" indent="0">
-              <a:buNone/>
-            </a:pPr>
-            <a:r>
-              <a:rPr lang="en-US" dirty="0"/>
-              <a:t>	</a:t>
-            </a:r>
-            <a:r>
-              <a:rPr lang="en-US" dirty="0" smtClean="0"/>
-              <a:t>- 4.3.2 Teacher Password Reset</a:t>
-            </a:r>
-          </a:p>
-          <a:p>
-            <a:pPr marL="0" indent="0">
-              <a:buNone/>
-            </a:pPr>
-            <a:r>
-              <a:rPr lang="en-US" dirty="0"/>
-              <a:t>	</a:t>
-            </a:r>
-            <a:r>
-              <a:rPr lang="en-US" dirty="0" smtClean="0"/>
-              <a:t>- 4.3.3 Teacher Worksheet Selection</a:t>
-            </a:r>
-          </a:p>
-          <a:p>
-            <a:pPr marL="0" indent="0">
-              <a:buNone/>
-            </a:pPr>
-            <a:r>
-              <a:rPr lang="en-US" dirty="0"/>
-              <a:t>	</a:t>
-            </a:r>
-            <a:r>
-              <a:rPr lang="en-US" dirty="0" smtClean="0"/>
-              <a:t>- 4.3.4 Worksheet Parameter Option</a:t>
-            </a:r>
-          </a:p>
-          <a:p>
-            <a:pPr marL="0" indent="0">
-              <a:buNone/>
-            </a:pPr>
-            <a:r>
-              <a:rPr lang="en-US" dirty="0"/>
-              <a:t>	</a:t>
-            </a:r>
-            <a:r>
-              <a:rPr lang="en-US" dirty="0" smtClean="0"/>
-              <a:t>- 4.3.5 Student Worksheet Review </a:t>
-            </a:r>
-          </a:p>
-          <a:p>
-            <a:pPr marL="0" indent="0">
-              <a:buNone/>
-            </a:pPr>
-            <a:r>
-              <a:rPr lang="en-US" dirty="0" smtClean="0"/>
-              <a:t>	- 4.3.6 Student Worksheet Deletion</a:t>
-            </a:r>
-          </a:p>
-          <a:p>
-            <a:pPr marL="0" indent="0">
-              <a:buNone/>
-            </a:pPr>
-            <a:r>
-              <a:rPr lang="en-US" dirty="0"/>
-              <a:t>	</a:t>
-            </a:r>
-            <a:r>
-              <a:rPr lang="en-US" dirty="0" smtClean="0"/>
-              <a:t>- 4.3.7 Class Roster Creation</a:t>
-            </a:r>
-          </a:p>
-          <a:p>
-            <a:pPr marL="0" indent="0">
-              <a:buNone/>
-            </a:pPr>
-            <a:r>
-              <a:rPr lang="en-US" dirty="0"/>
-              <a:t>	</a:t>
-            </a:r>
-            <a:r>
-              <a:rPr lang="en-US" dirty="0" smtClean="0"/>
-              <a:t>- 4.3.8 Student Login Management</a:t>
-            </a:r>
-          </a:p>
-          <a:p>
-            <a:pPr marL="0" indent="0">
-              <a:buNone/>
-            </a:pPr>
-            <a:r>
-              <a:rPr lang="en-US" dirty="0"/>
-              <a:t>	</a:t>
-            </a:r>
-            <a:r>
-              <a:rPr lang="en-US" dirty="0" smtClean="0"/>
-              <a:t>- 4.3.9 Student Difficulty </a:t>
-            </a:r>
-            <a:r>
-              <a:rPr lang="en-US" dirty="0" err="1" smtClean="0"/>
-              <a:t>Managament</a:t>
+          <a:bodyPr/>
+          <a:lstStyle/>
+          <a:p>
+            <a:r>
+              <a:rPr lang="en-US" b="1" u="sng" dirty="0" smtClean="0"/>
+              <a:t>3.3 Software </a:t>
+            </a:r>
+            <a:r>
+              <a:rPr lang="en-US" b="1" u="sng" dirty="0" smtClean="0"/>
+              <a:t>Interfaces</a:t>
+            </a:r>
+            <a:endParaRPr lang="en-US" b="1" u="sng" dirty="0"/>
+          </a:p>
+          <a:p>
+            <a:pPr lvl="1"/>
+            <a:r>
+              <a:rPr lang="en-US" dirty="0" smtClean="0"/>
+              <a:t>will </a:t>
+            </a:r>
+            <a:r>
+              <a:rPr lang="en-US" dirty="0" smtClean="0"/>
+              <a:t>interface with a </a:t>
+            </a:r>
+            <a:r>
+              <a:rPr lang="en-US" dirty="0" smtClean="0"/>
+              <a:t>database</a:t>
+            </a:r>
+          </a:p>
+          <a:p>
+            <a:pPr lvl="1"/>
+            <a:r>
+              <a:rPr lang="en-US" dirty="0" smtClean="0"/>
+              <a:t>interface </a:t>
+            </a:r>
+            <a:r>
+              <a:rPr lang="en-US" dirty="0" smtClean="0"/>
+              <a:t>with </a:t>
+            </a:r>
+            <a:r>
+              <a:rPr lang="en-US" dirty="0" smtClean="0"/>
+              <a:t>an API for the creation of PDFs</a:t>
+            </a:r>
+          </a:p>
+          <a:p>
+            <a:pPr lvl="1"/>
+            <a:r>
+              <a:rPr lang="en-US" dirty="0" smtClean="0"/>
+              <a:t>interface </a:t>
+            </a:r>
+            <a:r>
+              <a:rPr lang="en-US" dirty="0" smtClean="0"/>
+              <a:t>with Adobe Reader</a:t>
             </a:r>
             <a:endParaRPr lang="en-US" dirty="0"/>
           </a:p>
@@ -7492,13 +8704,32 @@
     </p:spTree>
     <p:extLst>
       <p:ext uri="{BB962C8B-B14F-4D97-AF65-F5344CB8AC3E}">
-        <p14:creationId xmlns:p14="http://schemas.microsoft.com/office/powerpoint/2010/main" val="1361008139"/>
+        <p14:creationId xmlns:p14="http://schemas.microsoft.com/office/powerpoint/2010/main" val="2021458727"/>
       </p:ext>
     </p:extLst>
   </p:cSld>
   <p:clrMapOvr>
     <a:masterClrMapping/>
   </p:clrMapOvr>
+  <mc:AlternateContent xmlns:mc="http://schemas.openxmlformats.org/markup-compatibility/2006">
+    <mc:Choice xmlns:p14="http://schemas.microsoft.com/office/powerpoint/2010/main" Requires="p14">
+      <p:transition spd="slow">
+        <p14:reveal/>
+      </p:transition>
+    </mc:Choice>
+    <mc:Fallback>
+      <p:transition spd="slow">
+        <p:fade/>
+      </p:transition>
+    </mc:Fallback>
+  </mc:AlternateContent>
+  <p:timing>
+    <p:tnLst>
+      <p:par>
+        <p:cTn id="1" dur="indefinite" restart="never" nodeType="tmRoot"/>
+      </p:par>
+    </p:tnLst>
+  </p:timing>
 </p:sld>
 </file>
 
@@ -7766,7 +8997,7 @@
   <a:extraClrSchemeLst/>
   <a:extLst>
     <a:ext uri="{05A4C25C-085E-4340-85A3-A5531E510DB2}">
-      <thm15:themeFamily xmlns="" xmlns:thm15="http://schemas.microsoft.com/office/thememl/2012/main" name="Vapor Trail" id="{4FDF2955-7D9C-493C-B9F9-C205151B46CD}" vid="{8F31A783-2159-4870-BC29-2BA7D038EA44}"/>
+      <thm15:themeFamily xmlns:thm15="http://schemas.microsoft.com/office/thememl/2012/main" name="Vapor Trail" id="{4FDF2955-7D9C-493C-B9F9-C205151B46CD}" vid="{8F31A783-2159-4870-BC29-2BA7D038EA44}"/>
     </a:ext>
   </a:extLst>
 </a:theme>

</xml_diff>

<commit_message>
Updated the Introduction part
1. Added more info to product scope
2. Added the screenshot of the SRS document to Overview.
</commit_message>
<xml_diff>
--- a/Presentation Elementary Engineers .pptx
+++ b/Presentation Elementary Engineers .pptx
@@ -121,7 +121,7 @@
   </p:defaultTextStyle>
   <p:extLst>
     <p:ext uri="{EFAFB233-063F-42B5-8137-9DF3F51BA10A}">
-      <p15:sldGuideLst xmlns:p15="http://schemas.microsoft.com/office/powerpoint/2012/main">
+      <p15:sldGuideLst xmlns:p15="http://schemas.microsoft.com/office/powerpoint/2012/main" xmlns="">
         <p15:guide id="1" orient="horz" pos="2160">
           <p15:clr>
             <a:srgbClr val="A4A3A4"/>
@@ -371,13 +371,13 @@
   <p:clrMapOvr>
     <a:masterClrMapping/>
   </p:clrMapOvr>
-  <mc:AlternateContent xmlns:mc="http://schemas.openxmlformats.org/markup-compatibility/2006">
-    <mc:Choice xmlns:p14="http://schemas.microsoft.com/office/powerpoint/2010/main" Requires="p14">
+  <mc:AlternateContent xmlns:mc="http://schemas.openxmlformats.org/markup-compatibility/2006" xmlns:p14="http://schemas.microsoft.com/office/powerpoint/2010/main">
+    <mc:Choice Requires="p14">
       <p:transition spd="slow">
         <p14:reveal/>
       </p:transition>
     </mc:Choice>
-    <mc:Fallback>
+    <mc:Fallback xmlns="">
       <p:transition spd="slow">
         <p:fade/>
       </p:transition>
@@ -635,13 +635,13 @@
   <p:clrMapOvr>
     <a:masterClrMapping/>
   </p:clrMapOvr>
-  <mc:AlternateContent xmlns:mc="http://schemas.openxmlformats.org/markup-compatibility/2006">
-    <mc:Choice xmlns:p14="http://schemas.microsoft.com/office/powerpoint/2010/main" Requires="p14">
+  <mc:AlternateContent xmlns:mc="http://schemas.openxmlformats.org/markup-compatibility/2006" xmlns:p14="http://schemas.microsoft.com/office/powerpoint/2010/main">
+    <mc:Choice Requires="p14">
       <p:transition spd="slow">
         <p14:reveal/>
       </p:transition>
     </mc:Choice>
-    <mc:Fallback>
+    <mc:Fallback xmlns="">
       <p:transition spd="slow">
         <p:fade/>
       </p:transition>
@@ -884,13 +884,13 @@
   <p:clrMapOvr>
     <a:masterClrMapping/>
   </p:clrMapOvr>
-  <mc:AlternateContent xmlns:mc="http://schemas.openxmlformats.org/markup-compatibility/2006">
-    <mc:Choice xmlns:p14="http://schemas.microsoft.com/office/powerpoint/2010/main" Requires="p14">
+  <mc:AlternateContent xmlns:mc="http://schemas.openxmlformats.org/markup-compatibility/2006" xmlns:p14="http://schemas.microsoft.com/office/powerpoint/2010/main">
+    <mc:Choice Requires="p14">
       <p:transition spd="slow">
         <p14:reveal/>
       </p:transition>
     </mc:Choice>
-    <mc:Fallback>
+    <mc:Fallback xmlns="">
       <p:transition spd="slow">
         <p:fade/>
       </p:transition>
@@ -1434,13 +1434,13 @@
   <p:clrMapOvr>
     <a:masterClrMapping/>
   </p:clrMapOvr>
-  <mc:AlternateContent xmlns:mc="http://schemas.openxmlformats.org/markup-compatibility/2006">
-    <mc:Choice xmlns:p14="http://schemas.microsoft.com/office/powerpoint/2010/main" Requires="p14">
+  <mc:AlternateContent xmlns:mc="http://schemas.openxmlformats.org/markup-compatibility/2006" xmlns:p14="http://schemas.microsoft.com/office/powerpoint/2010/main">
+    <mc:Choice Requires="p14">
       <p:transition spd="slow">
         <p14:reveal/>
       </p:transition>
     </mc:Choice>
-    <mc:Fallback>
+    <mc:Fallback xmlns="">
       <p:transition spd="slow">
         <p:fade/>
       </p:transition>
@@ -1683,13 +1683,13 @@
   <p:clrMapOvr>
     <a:masterClrMapping/>
   </p:clrMapOvr>
-  <mc:AlternateContent xmlns:mc="http://schemas.openxmlformats.org/markup-compatibility/2006">
-    <mc:Choice xmlns:p14="http://schemas.microsoft.com/office/powerpoint/2010/main" Requires="p14">
+  <mc:AlternateContent xmlns:mc="http://schemas.openxmlformats.org/markup-compatibility/2006" xmlns:p14="http://schemas.microsoft.com/office/powerpoint/2010/main">
+    <mc:Choice Requires="p14">
       <p:transition spd="slow">
         <p14:reveal/>
       </p:transition>
     </mc:Choice>
-    <mc:Fallback>
+    <mc:Fallback xmlns="">
       <p:transition spd="slow">
         <p:fade/>
       </p:transition>
@@ -2227,13 +2227,13 @@
   <p:clrMapOvr>
     <a:masterClrMapping/>
   </p:clrMapOvr>
-  <mc:AlternateContent xmlns:mc="http://schemas.openxmlformats.org/markup-compatibility/2006">
-    <mc:Choice xmlns:p14="http://schemas.microsoft.com/office/powerpoint/2010/main" Requires="p14">
+  <mc:AlternateContent xmlns:mc="http://schemas.openxmlformats.org/markup-compatibility/2006" xmlns:p14="http://schemas.microsoft.com/office/powerpoint/2010/main">
+    <mc:Choice Requires="p14">
       <p:transition spd="slow">
         <p14:reveal/>
       </p:transition>
     </mc:Choice>
-    <mc:Fallback>
+    <mc:Fallback xmlns="">
       <p:transition spd="slow">
         <p:fade/>
       </p:transition>
@@ -3008,13 +3008,13 @@
   <p:clrMapOvr>
     <a:masterClrMapping/>
   </p:clrMapOvr>
-  <mc:AlternateContent xmlns:mc="http://schemas.openxmlformats.org/markup-compatibility/2006">
-    <mc:Choice xmlns:p14="http://schemas.microsoft.com/office/powerpoint/2010/main" Requires="p14">
+  <mc:AlternateContent xmlns:mc="http://schemas.openxmlformats.org/markup-compatibility/2006" xmlns:p14="http://schemas.microsoft.com/office/powerpoint/2010/main">
+    <mc:Choice Requires="p14">
       <p:transition spd="slow">
         <p14:reveal/>
       </p:transition>
     </mc:Choice>
-    <mc:Fallback>
+    <mc:Fallback xmlns="">
       <p:transition spd="slow">
         <p:fade/>
       </p:transition>
@@ -3190,13 +3190,13 @@
   <p:clrMapOvr>
     <a:masterClrMapping/>
   </p:clrMapOvr>
-  <mc:AlternateContent xmlns:mc="http://schemas.openxmlformats.org/markup-compatibility/2006">
-    <mc:Choice xmlns:p14="http://schemas.microsoft.com/office/powerpoint/2010/main" Requires="p14">
+  <mc:AlternateContent xmlns:mc="http://schemas.openxmlformats.org/markup-compatibility/2006" xmlns:p14="http://schemas.microsoft.com/office/powerpoint/2010/main">
+    <mc:Choice Requires="p14">
       <p:transition spd="slow">
         <p14:reveal/>
       </p:transition>
     </mc:Choice>
-    <mc:Fallback>
+    <mc:Fallback xmlns="">
       <p:transition spd="slow">
         <p:fade/>
       </p:transition>
@@ -3431,13 +3431,13 @@
   <p:clrMapOvr>
     <a:masterClrMapping/>
   </p:clrMapOvr>
-  <mc:AlternateContent xmlns:mc="http://schemas.openxmlformats.org/markup-compatibility/2006">
-    <mc:Choice xmlns:p14="http://schemas.microsoft.com/office/powerpoint/2010/main" Requires="p14">
+  <mc:AlternateContent xmlns:mc="http://schemas.openxmlformats.org/markup-compatibility/2006" xmlns:p14="http://schemas.microsoft.com/office/powerpoint/2010/main">
+    <mc:Choice Requires="p14">
       <p:transition spd="slow">
         <p14:reveal/>
       </p:transition>
     </mc:Choice>
-    <mc:Fallback>
+    <mc:Fallback xmlns="">
       <p:transition spd="slow">
         <p:fade/>
       </p:transition>
@@ -3608,13 +3608,13 @@
   <p:clrMapOvr>
     <a:masterClrMapping/>
   </p:clrMapOvr>
-  <mc:AlternateContent xmlns:mc="http://schemas.openxmlformats.org/markup-compatibility/2006">
-    <mc:Choice xmlns:p14="http://schemas.microsoft.com/office/powerpoint/2010/main" Requires="p14">
+  <mc:AlternateContent xmlns:mc="http://schemas.openxmlformats.org/markup-compatibility/2006" xmlns:p14="http://schemas.microsoft.com/office/powerpoint/2010/main">
+    <mc:Choice Requires="p14">
       <p:transition spd="slow">
         <p14:reveal/>
       </p:transition>
     </mc:Choice>
-    <mc:Fallback>
+    <mc:Fallback xmlns="">
       <p:transition spd="slow">
         <p:fade/>
       </p:transition>
@@ -3915,13 +3915,13 @@
   <p:clrMapOvr>
     <a:masterClrMapping/>
   </p:clrMapOvr>
-  <mc:AlternateContent xmlns:mc="http://schemas.openxmlformats.org/markup-compatibility/2006">
-    <mc:Choice xmlns:p14="http://schemas.microsoft.com/office/powerpoint/2010/main" Requires="p14">
+  <mc:AlternateContent xmlns:mc="http://schemas.openxmlformats.org/markup-compatibility/2006" xmlns:p14="http://schemas.microsoft.com/office/powerpoint/2010/main">
+    <mc:Choice Requires="p14">
       <p:transition spd="slow">
         <p14:reveal/>
       </p:transition>
     </mc:Choice>
-    <mc:Fallback>
+    <mc:Fallback xmlns="">
       <p:transition spd="slow">
         <p:fade/>
       </p:transition>
@@ -4154,13 +4154,13 @@
   <p:clrMapOvr>
     <a:masterClrMapping/>
   </p:clrMapOvr>
-  <mc:AlternateContent xmlns:mc="http://schemas.openxmlformats.org/markup-compatibility/2006">
-    <mc:Choice xmlns:p14="http://schemas.microsoft.com/office/powerpoint/2010/main" Requires="p14">
+  <mc:AlternateContent xmlns:mc="http://schemas.openxmlformats.org/markup-compatibility/2006" xmlns:p14="http://schemas.microsoft.com/office/powerpoint/2010/main">
+    <mc:Choice Requires="p14">
       <p:transition spd="slow">
         <p14:reveal/>
       </p:transition>
     </mc:Choice>
-    <mc:Fallback>
+    <mc:Fallback xmlns="">
       <p:transition spd="slow">
         <p:fade/>
       </p:transition>
@@ -4540,13 +4540,13 @@
   <p:clrMapOvr>
     <a:masterClrMapping/>
   </p:clrMapOvr>
-  <mc:AlternateContent xmlns:mc="http://schemas.openxmlformats.org/markup-compatibility/2006">
-    <mc:Choice xmlns:p14="http://schemas.microsoft.com/office/powerpoint/2010/main" Requires="p14">
+  <mc:AlternateContent xmlns:mc="http://schemas.openxmlformats.org/markup-compatibility/2006" xmlns:p14="http://schemas.microsoft.com/office/powerpoint/2010/main">
+    <mc:Choice Requires="p14">
       <p:transition spd="slow">
         <p14:reveal/>
       </p:transition>
     </mc:Choice>
-    <mc:Fallback>
+    <mc:Fallback xmlns="">
       <p:transition spd="slow">
         <p:fade/>
       </p:transition>
@@ -4665,13 +4665,13 @@
   <p:clrMapOvr>
     <a:masterClrMapping/>
   </p:clrMapOvr>
-  <mc:AlternateContent xmlns:mc="http://schemas.openxmlformats.org/markup-compatibility/2006">
-    <mc:Choice xmlns:p14="http://schemas.microsoft.com/office/powerpoint/2010/main" Requires="p14">
+  <mc:AlternateContent xmlns:mc="http://schemas.openxmlformats.org/markup-compatibility/2006" xmlns:p14="http://schemas.microsoft.com/office/powerpoint/2010/main">
+    <mc:Choice Requires="p14">
       <p:transition spd="slow">
         <p14:reveal/>
       </p:transition>
     </mc:Choice>
-    <mc:Fallback>
+    <mc:Fallback xmlns="">
       <p:transition spd="slow">
         <p:fade/>
       </p:transition>
@@ -4767,13 +4767,13 @@
   <p:clrMapOvr>
     <a:masterClrMapping/>
   </p:clrMapOvr>
-  <mc:AlternateContent xmlns:mc="http://schemas.openxmlformats.org/markup-compatibility/2006">
-    <mc:Choice xmlns:p14="http://schemas.microsoft.com/office/powerpoint/2010/main" Requires="p14">
+  <mc:AlternateContent xmlns:mc="http://schemas.openxmlformats.org/markup-compatibility/2006" xmlns:p14="http://schemas.microsoft.com/office/powerpoint/2010/main">
+    <mc:Choice Requires="p14">
       <p:transition spd="slow">
         <p14:reveal/>
       </p:transition>
     </mc:Choice>
-    <mc:Fallback>
+    <mc:Fallback xmlns="">
       <p:transition spd="slow">
         <p:fade/>
       </p:transition>
@@ -5023,13 +5023,13 @@
   <p:clrMapOvr>
     <a:masterClrMapping/>
   </p:clrMapOvr>
-  <mc:AlternateContent xmlns:mc="http://schemas.openxmlformats.org/markup-compatibility/2006">
-    <mc:Choice xmlns:p14="http://schemas.microsoft.com/office/powerpoint/2010/main" Requires="p14">
+  <mc:AlternateContent xmlns:mc="http://schemas.openxmlformats.org/markup-compatibility/2006" xmlns:p14="http://schemas.microsoft.com/office/powerpoint/2010/main">
+    <mc:Choice Requires="p14">
       <p:transition spd="slow">
         <p14:reveal/>
       </p:transition>
     </mc:Choice>
-    <mc:Fallback>
+    <mc:Fallback xmlns="">
       <p:transition spd="slow">
         <p:fade/>
       </p:transition>
@@ -5287,13 +5287,13 @@
   <p:clrMapOvr>
     <a:masterClrMapping/>
   </p:clrMapOvr>
-  <mc:AlternateContent xmlns:mc="http://schemas.openxmlformats.org/markup-compatibility/2006">
-    <mc:Choice xmlns:p14="http://schemas.microsoft.com/office/powerpoint/2010/main" Requires="p14">
+  <mc:AlternateContent xmlns:mc="http://schemas.openxmlformats.org/markup-compatibility/2006" xmlns:p14="http://schemas.microsoft.com/office/powerpoint/2010/main">
+    <mc:Choice Requires="p14">
       <p:transition spd="slow">
         <p14:reveal/>
       </p:transition>
     </mc:Choice>
-    <mc:Fallback>
+    <mc:Fallback xmlns="">
       <p:transition spd="slow">
         <p:fade/>
       </p:transition>
@@ -5592,13 +5592,13 @@
     <p:sldLayoutId id="2147483658" r:id="rId16"/>
     <p:sldLayoutId id="2147483659" r:id="rId17"/>
   </p:sldLayoutIdLst>
-  <mc:AlternateContent xmlns:mc="http://schemas.openxmlformats.org/markup-compatibility/2006">
-    <mc:Choice xmlns:p14="http://schemas.microsoft.com/office/powerpoint/2010/main" Requires="p14">
+  <mc:AlternateContent xmlns:mc="http://schemas.openxmlformats.org/markup-compatibility/2006" xmlns:p14="http://schemas.microsoft.com/office/powerpoint/2010/main">
+    <mc:Choice Requires="p14">
       <p:transition spd="slow">
         <p14:reveal/>
       </p:transition>
     </mc:Choice>
-    <mc:Fallback>
+    <mc:Fallback xmlns="">
       <p:transition spd="slow">
         <p:fade/>
       </p:transition>
@@ -5936,7 +5936,15 @@
             </a:br>
             <a:r>
               <a:rPr lang="en-US" sz="4800" dirty="0" smtClean="0"/>
-              <a:t>for </a:t>
+              <a:t>for</a:t>
+            </a:r>
+            <a:r>
+              <a:rPr lang="en-US" sz="4800" dirty="0" smtClean="0"/>
+              <a:t> </a:t>
+            </a:r>
+            <a:r>
+              <a:rPr lang="en-US" sz="4800" dirty="0" smtClean="0"/>
+              <a:t/>
             </a:r>
             <a:br>
               <a:rPr lang="en-US" sz="4800" dirty="0" smtClean="0"/>
@@ -6027,13 +6035,13 @@
   <p:clrMapOvr>
     <a:masterClrMapping/>
   </p:clrMapOvr>
-  <mc:AlternateContent xmlns:mc="http://schemas.openxmlformats.org/markup-compatibility/2006">
-    <mc:Choice xmlns:p14="http://schemas.microsoft.com/office/powerpoint/2010/main" Requires="p14">
+  <mc:AlternateContent xmlns:mc="http://schemas.openxmlformats.org/markup-compatibility/2006" xmlns:p14="http://schemas.microsoft.com/office/powerpoint/2010/main">
+    <mc:Choice Requires="p14">
       <p:transition spd="slow">
         <p14:reveal/>
       </p:transition>
     </mc:Choice>
-    <mc:Fallback>
+    <mc:Fallback xmlns="">
       <p:transition spd="slow">
         <p:fade/>
       </p:transition>
@@ -6042,7 +6050,7 @@
   <p:timing>
     <p:tnLst>
       <p:par>
-        <p:cTn id="1" dur="indefinite" restart="never" nodeType="tmRoot"/>
+        <p:cTn xmlns:p14="http://schemas.microsoft.com/office/powerpoint/2010/main" id="1" dur="indefinite" restart="never" nodeType="tmRoot"/>
       </p:par>
     </p:tnLst>
   </p:timing>
@@ -6126,15 +6134,7 @@
             </a:r>
             <a:r>
               <a:rPr lang="en-US" dirty="0" smtClean="0"/>
-              <a:t>- Register </a:t>
-            </a:r>
-            <a:r>
-              <a:rPr lang="en-US" dirty="0" smtClean="0"/>
-              <a:t>Teacher </a:t>
-            </a:r>
-            <a:r>
-              <a:rPr lang="en-US" dirty="0" smtClean="0"/>
-              <a:t>Accounts</a:t>
+              <a:t>- Register Teacher Accounts</a:t>
             </a:r>
             <a:endParaRPr lang="en-US" dirty="0"/>
           </a:p>
@@ -6155,15 +6155,7 @@
             </a:r>
             <a:r>
               <a:rPr lang="en-US" dirty="0" smtClean="0"/>
-              <a:t>- Admin shall reset </a:t>
-            </a:r>
-            <a:r>
-              <a:rPr lang="en-US" dirty="0" smtClean="0"/>
-              <a:t>teachers’ </a:t>
-            </a:r>
-            <a:r>
-              <a:rPr lang="en-US" dirty="0" smtClean="0"/>
-              <a:t>account passwords</a:t>
+              <a:t>- Admin shall reset teachers’ account passwords</a:t>
             </a:r>
           </a:p>
           <a:p>
@@ -6192,13 +6184,13 @@
   <p:clrMapOvr>
     <a:masterClrMapping/>
   </p:clrMapOvr>
-  <mc:AlternateContent xmlns:mc="http://schemas.openxmlformats.org/markup-compatibility/2006">
-    <mc:Choice xmlns:p14="http://schemas.microsoft.com/office/powerpoint/2010/main" Requires="p14">
+  <mc:AlternateContent xmlns:mc="http://schemas.openxmlformats.org/markup-compatibility/2006" xmlns:p14="http://schemas.microsoft.com/office/powerpoint/2010/main">
+    <mc:Choice Requires="p14">
       <p:transition spd="slow">
         <p14:reveal/>
       </p:transition>
     </mc:Choice>
-    <mc:Fallback>
+    <mc:Fallback xmlns="">
       <p:transition spd="slow">
         <p:fade/>
       </p:transition>
@@ -6207,7 +6199,7 @@
   <p:timing>
     <p:tnLst>
       <p:par>
-        <p:cTn id="1" dur="indefinite" restart="never" nodeType="tmRoot"/>
+        <p:cTn xmlns:p14="http://schemas.microsoft.com/office/powerpoint/2010/main" id="1" dur="indefinite" restart="never" nodeType="tmRoot"/>
       </p:par>
     </p:tnLst>
   </p:timing>
@@ -6271,11 +6263,7 @@
           <a:p>
             <a:r>
               <a:rPr lang="en-US" b="1" u="sng" dirty="0" smtClean="0"/>
-              <a:t>4.2 General System </a:t>
-            </a:r>
-            <a:r>
-              <a:rPr lang="en-US" b="1" u="sng" dirty="0" smtClean="0"/>
-              <a:t>features</a:t>
+              <a:t>4.2 General System features</a:t>
             </a:r>
           </a:p>
           <a:p>
@@ -6296,55 +6284,29 @@
             <a:pPr lvl="1"/>
             <a:r>
               <a:rPr lang="en-US" dirty="0" smtClean="0"/>
-              <a:t>4.2.3 </a:t>
-            </a:r>
-            <a:r>
-              <a:rPr lang="en-US" dirty="0" smtClean="0"/>
-              <a:t>Help </a:t>
-            </a:r>
-            <a:r>
-              <a:rPr lang="en-US" dirty="0" smtClean="0"/>
-              <a:t>System</a:t>
+              <a:t>4.2.3 Help System</a:t>
             </a:r>
           </a:p>
           <a:p>
             <a:pPr lvl="1"/>
             <a:r>
               <a:rPr lang="en-US" dirty="0" smtClean="0"/>
-              <a:t>4.2.4 </a:t>
-            </a:r>
-            <a:r>
-              <a:rPr lang="en-US" dirty="0" smtClean="0"/>
-              <a:t>Tutorial </a:t>
-            </a:r>
-            <a:r>
-              <a:rPr lang="en-US" dirty="0" smtClean="0"/>
-              <a:t>content</a:t>
+              <a:t>4.2.4 Tutorial content</a:t>
             </a:r>
           </a:p>
           <a:p>
             <a:pPr lvl="1"/>
             <a:r>
               <a:rPr lang="en-US" dirty="0" smtClean="0"/>
-              <a:t>Random </a:t>
-            </a:r>
-            <a:r>
-              <a:rPr lang="en-US" dirty="0" smtClean="0"/>
-              <a:t>Exercise Generation </a:t>
-            </a:r>
-            <a:endParaRPr lang="en-US" dirty="0" smtClean="0"/>
+              <a:t>Random Exercise Generation </a:t>
+            </a:r>
           </a:p>
           <a:p>
             <a:pPr lvl="1"/>
             <a:r>
               <a:rPr lang="en-US" dirty="0" smtClean="0"/>
-              <a:t>Worksheet </a:t>
-            </a:r>
-            <a:r>
-              <a:rPr lang="en-US" dirty="0" smtClean="0"/>
-              <a:t>Instructions </a:t>
-            </a:r>
-            <a:endParaRPr lang="en-US" dirty="0" smtClean="0"/>
+              <a:t>Worksheet Instructions </a:t>
+            </a:r>
           </a:p>
           <a:p>
             <a:pPr lvl="1"/>
@@ -6357,11 +6319,7 @@
             <a:pPr lvl="1"/>
             <a:r>
               <a:rPr lang="en-US" dirty="0" smtClean="0"/>
-              <a:t>Search </a:t>
-            </a:r>
-            <a:r>
-              <a:rPr lang="en-US" dirty="0" smtClean="0"/>
-              <a:t>Features </a:t>
+              <a:t>Search Features </a:t>
             </a:r>
             <a:endParaRPr lang="en-US" dirty="0"/>
           </a:p>
@@ -6377,13 +6335,13 @@
   <p:clrMapOvr>
     <a:masterClrMapping/>
   </p:clrMapOvr>
-  <mc:AlternateContent xmlns:mc="http://schemas.openxmlformats.org/markup-compatibility/2006">
-    <mc:Choice xmlns:p14="http://schemas.microsoft.com/office/powerpoint/2010/main" Requires="p14">
+  <mc:AlternateContent xmlns:mc="http://schemas.openxmlformats.org/markup-compatibility/2006" xmlns:p14="http://schemas.microsoft.com/office/powerpoint/2010/main">
+    <mc:Choice Requires="p14">
       <p:transition spd="slow">
         <p14:reveal/>
       </p:transition>
     </mc:Choice>
-    <mc:Fallback>
+    <mc:Fallback xmlns="">
       <p:transition spd="slow">
         <p:fade/>
       </p:transition>
@@ -6392,7 +6350,7 @@
   <p:timing>
     <p:tnLst>
       <p:par>
-        <p:cTn id="1" dur="indefinite" restart="never" nodeType="tmRoot"/>
+        <p:cTn xmlns:p14="http://schemas.microsoft.com/office/powerpoint/2010/main" id="1" dur="indefinite" restart="never" nodeType="tmRoot"/>
       </p:par>
     </p:tnLst>
   </p:timing>
@@ -6458,13 +6416,8 @@
           <a:p>
             <a:r>
               <a:rPr lang="en-US" b="1" u="sng" dirty="0" smtClean="0"/>
-              <a:t>4.3 Teacher System </a:t>
-            </a:r>
-            <a:r>
-              <a:rPr lang="en-US" b="1" u="sng" dirty="0" smtClean="0"/>
-              <a:t>Features</a:t>
-            </a:r>
-            <a:endParaRPr lang="en-US" b="1" u="sng" dirty="0" smtClean="0"/>
+              <a:t>4.3 Teacher System Features</a:t>
+            </a:r>
           </a:p>
           <a:p>
             <a:pPr lvl="1">
@@ -6474,11 +6427,7 @@
             </a:pPr>
             <a:r>
               <a:rPr lang="en-US" dirty="0" smtClean="0"/>
-              <a:t>4.3.1 </a:t>
-            </a:r>
-            <a:r>
-              <a:rPr lang="en-US" dirty="0" smtClean="0"/>
-              <a:t>Teacher System Access</a:t>
+              <a:t>4.3.1 Teacher System Access</a:t>
             </a:r>
           </a:p>
           <a:p>
@@ -6489,11 +6438,7 @@
             </a:pPr>
             <a:r>
               <a:rPr lang="en-US" dirty="0" smtClean="0"/>
-              <a:t>4.3.2 </a:t>
-            </a:r>
-            <a:r>
-              <a:rPr lang="en-US" dirty="0" smtClean="0"/>
-              <a:t>Teacher Password Reset</a:t>
+              <a:t>4.3.2 Teacher Password Reset</a:t>
             </a:r>
           </a:p>
           <a:p>
@@ -6504,11 +6449,7 @@
             </a:pPr>
             <a:r>
               <a:rPr lang="en-US" dirty="0" smtClean="0"/>
-              <a:t>4.3.3 </a:t>
-            </a:r>
-            <a:r>
-              <a:rPr lang="en-US" dirty="0" smtClean="0"/>
-              <a:t>Teacher Worksheet Selection</a:t>
+              <a:t>4.3.3 Teacher Worksheet Selection</a:t>
             </a:r>
           </a:p>
           <a:p>
@@ -6519,11 +6460,7 @@
             </a:pPr>
             <a:r>
               <a:rPr lang="en-US" dirty="0" smtClean="0"/>
-              <a:t>4.3.4 </a:t>
-            </a:r>
-            <a:r>
-              <a:rPr lang="en-US" dirty="0" smtClean="0"/>
-              <a:t>Worksheet Parameter Option</a:t>
+              <a:t>4.3.4 Worksheet Parameter Option</a:t>
             </a:r>
           </a:p>
           <a:p>
@@ -6534,11 +6471,7 @@
             </a:pPr>
             <a:r>
               <a:rPr lang="en-US" dirty="0" smtClean="0"/>
-              <a:t>4.3.5 </a:t>
-            </a:r>
-            <a:r>
-              <a:rPr lang="en-US" dirty="0" smtClean="0"/>
-              <a:t>Student Worksheet Review </a:t>
+              <a:t>4.3.5 Student Worksheet Review </a:t>
             </a:r>
           </a:p>
           <a:p>
@@ -6549,11 +6482,7 @@
             </a:pPr>
             <a:r>
               <a:rPr lang="en-US" dirty="0" smtClean="0"/>
-              <a:t>4.3.6 </a:t>
-            </a:r>
-            <a:r>
-              <a:rPr lang="en-US" dirty="0" smtClean="0"/>
-              <a:t>Student Worksheet Deletion</a:t>
+              <a:t>4.3.6 Student Worksheet Deletion</a:t>
             </a:r>
           </a:p>
           <a:p>
@@ -6564,11 +6493,7 @@
             </a:pPr>
             <a:r>
               <a:rPr lang="en-US" dirty="0" smtClean="0"/>
-              <a:t>4.3.7 </a:t>
-            </a:r>
-            <a:r>
-              <a:rPr lang="en-US" dirty="0" smtClean="0"/>
-              <a:t>Class Roster Creation</a:t>
+              <a:t>4.3.7 Class Roster Creation</a:t>
             </a:r>
           </a:p>
           <a:p>
@@ -6579,11 +6504,7 @@
             </a:pPr>
             <a:r>
               <a:rPr lang="en-US" dirty="0" smtClean="0"/>
-              <a:t>4.3.8 </a:t>
-            </a:r>
-            <a:r>
-              <a:rPr lang="en-US" dirty="0" smtClean="0"/>
-              <a:t>Student Login Management</a:t>
+              <a:t>4.3.8 Student Login Management</a:t>
             </a:r>
           </a:p>
           <a:p>
@@ -6594,15 +6515,7 @@
             </a:pPr>
             <a:r>
               <a:rPr lang="en-US" dirty="0" smtClean="0"/>
-              <a:t>4.3.9 </a:t>
-            </a:r>
-            <a:r>
-              <a:rPr lang="en-US" dirty="0" smtClean="0"/>
-              <a:t>Student </a:t>
-            </a:r>
-            <a:r>
-              <a:rPr lang="en-US" dirty="0" smtClean="0"/>
-              <a:t>Difficulty Level Management</a:t>
+              <a:t>4.3.9 Student Difficulty Level Management</a:t>
             </a:r>
             <a:endParaRPr lang="en-US" dirty="0"/>
           </a:p>
@@ -6618,13 +6531,13 @@
   <p:clrMapOvr>
     <a:masterClrMapping/>
   </p:clrMapOvr>
-  <mc:AlternateContent xmlns:mc="http://schemas.openxmlformats.org/markup-compatibility/2006">
-    <mc:Choice xmlns:p14="http://schemas.microsoft.com/office/powerpoint/2010/main" Requires="p14">
+  <mc:AlternateContent xmlns:mc="http://schemas.openxmlformats.org/markup-compatibility/2006" xmlns:p14="http://schemas.microsoft.com/office/powerpoint/2010/main">
+    <mc:Choice Requires="p14">
       <p:transition spd="slow">
         <p14:reveal/>
       </p:transition>
     </mc:Choice>
-    <mc:Fallback>
+    <mc:Fallback xmlns="">
       <p:transition spd="slow">
         <p:fade/>
       </p:transition>
@@ -6633,7 +6546,7 @@
   <p:timing>
     <p:tnLst>
       <p:par>
-        <p:cTn id="1" dur="indefinite" restart="never" nodeType="tmRoot"/>
+        <p:cTn xmlns:p14="http://schemas.microsoft.com/office/powerpoint/2010/main" id="1" dur="indefinite" restart="never" nodeType="tmRoot"/>
       </p:par>
     </p:tnLst>
   </p:timing>
@@ -6711,25 +6624,12 @@
               <a:rPr lang="en-US" b="1" u="sng" dirty="0" smtClean="0"/>
               <a:t>5.1 Performance Requirements </a:t>
             </a:r>
-            <a:endParaRPr lang="en-US" b="1" u="sng" dirty="0" smtClean="0"/>
           </a:p>
           <a:p>
             <a:pPr lvl="1"/>
             <a:r>
               <a:rPr lang="en-US" dirty="0" smtClean="0"/>
-              <a:t>Number </a:t>
-            </a:r>
-            <a:r>
-              <a:rPr lang="en-US" dirty="0" smtClean="0"/>
-              <a:t>of </a:t>
-            </a:r>
-            <a:r>
-              <a:rPr lang="en-US" dirty="0" smtClean="0"/>
-              <a:t>Users </a:t>
-            </a:r>
-            <a:r>
-              <a:rPr lang="en-US" dirty="0" smtClean="0"/>
-              <a:t>shall not be limited</a:t>
+              <a:t>Number of Users shall not be limited</a:t>
             </a:r>
           </a:p>
           <a:p>
@@ -6742,62 +6642,34 @@
             <a:pPr lvl="1"/>
             <a:r>
               <a:rPr lang="en-US" dirty="0" smtClean="0"/>
-              <a:t>None </a:t>
-            </a:r>
-            <a:r>
-              <a:rPr lang="en-US" dirty="0" smtClean="0"/>
-              <a:t>have been identified </a:t>
+              <a:t>None have been identified </a:t>
             </a:r>
           </a:p>
           <a:p>
             <a:r>
               <a:rPr lang="en-US" b="1" u="sng" dirty="0" smtClean="0"/>
-              <a:t>5.3 Security </a:t>
-            </a:r>
-            <a:r>
-              <a:rPr lang="en-US" b="1" u="sng" dirty="0" smtClean="0"/>
-              <a:t>Requirements</a:t>
+              <a:t>5.3 Security Requirements</a:t>
             </a:r>
           </a:p>
           <a:p>
             <a:pPr lvl="1"/>
             <a:r>
               <a:rPr lang="en-US" dirty="0" smtClean="0"/>
-              <a:t>Only </a:t>
-            </a:r>
-            <a:r>
-              <a:rPr lang="en-US" dirty="0" smtClean="0"/>
-              <a:t>allow authorized </a:t>
-            </a:r>
-            <a:r>
-              <a:rPr lang="en-US" dirty="0" smtClean="0"/>
-              <a:t>users</a:t>
+              <a:t>Only allow authorized users</a:t>
             </a:r>
           </a:p>
           <a:p>
             <a:pPr lvl="1"/>
             <a:r>
               <a:rPr lang="en-US" dirty="0" smtClean="0"/>
-              <a:t>Require </a:t>
-            </a:r>
-            <a:r>
-              <a:rPr lang="en-US" dirty="0" smtClean="0"/>
-              <a:t>username and </a:t>
-            </a:r>
-            <a:r>
-              <a:rPr lang="en-US" dirty="0" smtClean="0"/>
-              <a:t>password</a:t>
+              <a:t>Require username and password</a:t>
             </a:r>
           </a:p>
           <a:p>
             <a:pPr lvl="1"/>
             <a:r>
               <a:rPr lang="en-US" dirty="0" smtClean="0"/>
-              <a:t>Securely </a:t>
-            </a:r>
-            <a:r>
-              <a:rPr lang="en-US" dirty="0" smtClean="0"/>
-              <a:t>Store password in a database</a:t>
+              <a:t>Securely Store password in a database</a:t>
             </a:r>
             <a:endParaRPr lang="en-US" dirty="0"/>
           </a:p>
@@ -6813,7 +6685,6 @@
               <a:rPr lang="en-US" dirty="0" smtClean="0"/>
               <a:t>Correctness </a:t>
             </a:r>
-            <a:endParaRPr lang="en-US" dirty="0" smtClean="0"/>
           </a:p>
           <a:p>
             <a:pPr lvl="1"/>
@@ -6821,7 +6692,6 @@
               <a:rPr lang="en-US" dirty="0" smtClean="0"/>
               <a:t>Interoperability</a:t>
             </a:r>
-            <a:endParaRPr lang="en-US" dirty="0" smtClean="0"/>
           </a:p>
           <a:p>
             <a:pPr lvl="1"/>
@@ -6829,7 +6699,6 @@
               <a:rPr lang="en-US" dirty="0" smtClean="0"/>
               <a:t>Usability</a:t>
             </a:r>
-            <a:endParaRPr lang="en-US" dirty="0" smtClean="0"/>
           </a:p>
         </p:txBody>
       </p:sp>
@@ -6843,13 +6712,13 @@
   <p:clrMapOvr>
     <a:masterClrMapping/>
   </p:clrMapOvr>
-  <mc:AlternateContent xmlns:mc="http://schemas.openxmlformats.org/markup-compatibility/2006">
-    <mc:Choice xmlns:p14="http://schemas.microsoft.com/office/powerpoint/2010/main" Requires="p14">
+  <mc:AlternateContent xmlns:mc="http://schemas.openxmlformats.org/markup-compatibility/2006" xmlns:p14="http://schemas.microsoft.com/office/powerpoint/2010/main">
+    <mc:Choice Requires="p14">
       <p:transition spd="slow">
         <p14:reveal/>
       </p:transition>
     </mc:Choice>
-    <mc:Fallback>
+    <mc:Fallback xmlns="">
       <p:transition spd="slow">
         <p:fade/>
       </p:transition>
@@ -6858,7 +6727,7 @@
   <p:timing>
     <p:tnLst>
       <p:par>
-        <p:cTn id="1" dur="indefinite" restart="never" nodeType="tmRoot"/>
+        <p:cTn xmlns:p14="http://schemas.microsoft.com/office/powerpoint/2010/main" id="1" dur="indefinite" restart="never" nodeType="tmRoot"/>
       </p:par>
     </p:tnLst>
   </p:timing>
@@ -6935,71 +6804,42 @@
             <a:pPr lvl="1"/>
             <a:r>
               <a:rPr lang="en-US" dirty="0" smtClean="0"/>
-              <a:t>Do </a:t>
-            </a:r>
-            <a:r>
-              <a:rPr lang="en-US" dirty="0" smtClean="0"/>
-              <a:t>not allow students to register </a:t>
+              <a:t>Do not allow students to register </a:t>
             </a:r>
           </a:p>
           <a:p>
             <a:pPr lvl="1"/>
             <a:r>
               <a:rPr lang="en-US" dirty="0" smtClean="0"/>
-              <a:t>Allow </a:t>
-            </a:r>
-            <a:r>
-              <a:rPr lang="en-US" dirty="0" smtClean="0"/>
-              <a:t>teachers to register student accounts</a:t>
+              <a:t>Allow teachers to register student accounts</a:t>
             </a:r>
           </a:p>
           <a:p>
             <a:pPr lvl="1"/>
             <a:r>
               <a:rPr lang="en-US" dirty="0" smtClean="0"/>
-              <a:t>Allow </a:t>
-            </a:r>
-            <a:r>
-              <a:rPr lang="en-US" dirty="0" smtClean="0"/>
-              <a:t>the administrator to register teacher accounts</a:t>
+              <a:t>Allow the administrator to register teacher accounts</a:t>
             </a:r>
           </a:p>
           <a:p>
             <a:pPr lvl="1"/>
             <a:r>
               <a:rPr lang="en-US" dirty="0" smtClean="0"/>
-              <a:t>Allow </a:t>
-            </a:r>
-            <a:r>
-              <a:rPr lang="en-US" dirty="0" smtClean="0"/>
-              <a:t>students to generate </a:t>
-            </a:r>
-            <a:r>
-              <a:rPr lang="en-US" dirty="0" smtClean="0"/>
-              <a:t>worksheets</a:t>
-            </a:r>
-            <a:endParaRPr lang="en-US" dirty="0" smtClean="0"/>
+              <a:t>Allow students to generate worksheets</a:t>
+            </a:r>
           </a:p>
           <a:p>
             <a:pPr lvl="1"/>
             <a:r>
               <a:rPr lang="en-US" dirty="0" smtClean="0"/>
-              <a:t>Allow </a:t>
-            </a:r>
-            <a:r>
-              <a:rPr lang="en-US" dirty="0" smtClean="0"/>
-              <a:t>teachers to view answer sheets </a:t>
+              <a:t>Allow teachers to view answer sheets </a:t>
             </a:r>
           </a:p>
           <a:p>
             <a:pPr lvl="1"/>
             <a:r>
               <a:rPr lang="en-US" dirty="0" smtClean="0"/>
-              <a:t>Access </a:t>
-            </a:r>
-            <a:r>
-              <a:rPr lang="en-US" dirty="0" smtClean="0"/>
-              <a:t>previously created worksheets </a:t>
+              <a:t>Access previously created worksheets </a:t>
             </a:r>
             <a:endParaRPr lang="en-US" dirty="0"/>
           </a:p>
@@ -7015,13 +6855,13 @@
   <p:clrMapOvr>
     <a:masterClrMapping/>
   </p:clrMapOvr>
-  <mc:AlternateContent xmlns:mc="http://schemas.openxmlformats.org/markup-compatibility/2006">
-    <mc:Choice xmlns:p14="http://schemas.microsoft.com/office/powerpoint/2010/main" Requires="p14">
+  <mc:AlternateContent xmlns:mc="http://schemas.openxmlformats.org/markup-compatibility/2006" xmlns:p14="http://schemas.microsoft.com/office/powerpoint/2010/main">
+    <mc:Choice Requires="p14">
       <p:transition spd="slow">
         <p14:reveal/>
       </p:transition>
     </mc:Choice>
-    <mc:Fallback>
+    <mc:Fallback xmlns="">
       <p:transition spd="slow">
         <p:fade/>
       </p:transition>
@@ -7030,7 +6870,7 @@
   <p:timing>
     <p:tnLst>
       <p:par>
-        <p:cTn id="1" dur="indefinite" restart="never" nodeType="tmRoot"/>
+        <p:cTn xmlns:p14="http://schemas.microsoft.com/office/powerpoint/2010/main" id="1" dur="indefinite" restart="never" nodeType="tmRoot"/>
       </p:par>
     </p:tnLst>
   </p:timing>
@@ -7176,13 +7016,13 @@
   <p:clrMapOvr>
     <a:masterClrMapping/>
   </p:clrMapOvr>
-  <mc:AlternateContent xmlns:mc="http://schemas.openxmlformats.org/markup-compatibility/2006">
-    <mc:Choice xmlns:p14="http://schemas.microsoft.com/office/powerpoint/2010/main" Requires="p14">
+  <mc:AlternateContent xmlns:mc="http://schemas.openxmlformats.org/markup-compatibility/2006" xmlns:p14="http://schemas.microsoft.com/office/powerpoint/2010/main">
+    <mc:Choice Requires="p14">
       <p:transition spd="slow">
         <p14:reveal/>
       </p:transition>
     </mc:Choice>
-    <mc:Fallback>
+    <mc:Fallback xmlns="">
       <p:transition spd="slow">
         <p:fade/>
       </p:transition>
@@ -7191,7 +7031,7 @@
   <p:timing>
     <p:tnLst>
       <p:par>
-        <p:cTn id="1" dur="indefinite" restart="never" nodeType="tmRoot"/>
+        <p:cTn xmlns:p14="http://schemas.microsoft.com/office/powerpoint/2010/main" id="1" dur="indefinite" restart="never" nodeType="tmRoot"/>
       </p:par>
     </p:tnLst>
   </p:timing>
@@ -7277,13 +7117,13 @@
   <p:clrMapOvr>
     <a:masterClrMapping/>
   </p:clrMapOvr>
-  <mc:AlternateContent xmlns:mc="http://schemas.openxmlformats.org/markup-compatibility/2006">
-    <mc:Choice xmlns:p14="http://schemas.microsoft.com/office/powerpoint/2010/main" Requires="p14">
+  <mc:AlternateContent xmlns:mc="http://schemas.openxmlformats.org/markup-compatibility/2006" xmlns:p14="http://schemas.microsoft.com/office/powerpoint/2010/main">
+    <mc:Choice Requires="p14">
       <p:transition spd="slow">
         <p14:reveal/>
       </p:transition>
     </mc:Choice>
-    <mc:Fallback>
+    <mc:Fallback xmlns="">
       <p:transition spd="slow">
         <p:fade/>
       </p:transition>
@@ -7292,7 +7132,7 @@
   <p:timing>
     <p:tnLst>
       <p:par>
-        <p:cTn id="1" dur="indefinite" restart="never" nodeType="tmRoot"/>
+        <p:cTn xmlns:p14="http://schemas.microsoft.com/office/powerpoint/2010/main" id="1" dur="indefinite" restart="never" nodeType="tmRoot"/>
       </p:par>
     </p:tnLst>
   </p:timing>
@@ -7362,7 +7202,7 @@
         </p:spPr>
         <p:txBody>
           <a:bodyPr>
-            <a:normAutofit lnSpcReduction="10000"/>
+            <a:normAutofit/>
           </a:bodyPr>
           <a:lstStyle/>
           <a:p>
@@ -7427,23 +7267,28 @@
             <a:endParaRPr lang="en-US" dirty="0" smtClean="0"/>
           </a:p>
           <a:p>
-            <a:r>
-              <a:rPr lang="en-US" b="1" u="sng" dirty="0" smtClean="0"/>
-              <a:t>1.3 Intender Audience</a:t>
-            </a:r>
-          </a:p>
-          <a:p>
-            <a:endParaRPr lang="en-US" b="1" u="sng" dirty="0" smtClean="0"/>
-          </a:p>
-          <a:p>
             <a:pPr lvl="1"/>
             <a:r>
               <a:rPr lang="en-US" dirty="0" smtClean="0"/>
-              <a:t>To be read by the </a:t>
-            </a:r>
-            <a:r>
-              <a:rPr lang="en-US" dirty="0"/>
-              <a:t>customer, development team, the project managers, testers, documentation writers and end users. </a:t>
+              <a:t>Worksheets are randomly created, never repeated</a:t>
+            </a:r>
+          </a:p>
+          <a:p>
+            <a:pPr lvl="1"/>
+            <a:r>
+              <a:rPr lang="en-US" dirty="0" smtClean="0"/>
+              <a:t>Worksheets can contain fraction problems of various difficulty levels</a:t>
+            </a:r>
+          </a:p>
+          <a:p>
+            <a:pPr lvl="1"/>
+            <a:r>
+              <a:rPr lang="en-US" dirty="0" smtClean="0"/>
+              <a:t>Worksheets are free to print, easy to use, </a:t>
+            </a:r>
+            <a:r>
+              <a:rPr lang="en-US" smtClean="0"/>
+              <a:t>very flexible</a:t>
             </a:r>
             <a:endParaRPr lang="en-US" dirty="0" smtClean="0"/>
           </a:p>
@@ -7462,13 +7307,13 @@
   <p:clrMapOvr>
     <a:masterClrMapping/>
   </p:clrMapOvr>
-  <mc:AlternateContent xmlns:mc="http://schemas.openxmlformats.org/markup-compatibility/2006">
-    <mc:Choice xmlns:p14="http://schemas.microsoft.com/office/powerpoint/2010/main" Requires="p14">
+  <mc:AlternateContent xmlns:mc="http://schemas.openxmlformats.org/markup-compatibility/2006" xmlns:p14="http://schemas.microsoft.com/office/powerpoint/2010/main">
+    <mc:Choice Requires="p14">
       <p:transition spd="slow">
         <p14:reveal/>
       </p:transition>
     </mc:Choice>
-    <mc:Fallback>
+    <mc:Fallback xmlns="">
       <p:transition spd="slow">
         <p:fade/>
       </p:transition>
@@ -7477,7 +7322,7 @@
   <p:timing>
     <p:tnLst>
       <p:par>
-        <p:cTn id="1" dur="indefinite" restart="never" nodeType="tmRoot"/>
+        <p:cTn xmlns:p14="http://schemas.microsoft.com/office/powerpoint/2010/main" id="1" dur="indefinite" restart="never" nodeType="tmRoot"/>
       </p:par>
     </p:tnLst>
   </p:timing>
@@ -7513,8 +7358,8 @@
         </p:nvSpPr>
         <p:spPr>
           <a:xfrm>
-            <a:off x="7405081" y="188773"/>
-            <a:ext cx="4101118" cy="812982"/>
+            <a:off x="6707500" y="188773"/>
+            <a:ext cx="4798699" cy="812982"/>
           </a:xfrm>
         </p:spPr>
         <p:txBody>
@@ -7525,7 +7370,7 @@
           <a:p>
             <a:r>
               <a:rPr lang="en-US" dirty="0" smtClean="0"/>
-              <a:t>INTRODUCTION</a:t>
+              <a:t>INTRODUCTION </a:t>
             </a:r>
             <a:endParaRPr lang="en-US" dirty="0"/>
           </a:p>
@@ -7550,38 +7395,117 @@
         </p:blipFill>
         <p:spPr>
           <a:xfrm>
-            <a:off x="-996582" y="331881"/>
+            <a:off x="-2677928" y="233915"/>
             <a:ext cx="12502781" cy="6280957"/>
           </a:xfrm>
         </p:spPr>
       </p:pic>
       <p:sp>
         <p:nvSpPr>
-          <p:cNvPr id="18" name="TextBox 17"/>
-          <p:cNvSpPr txBox="1"/>
+          <p:cNvPr id="3" name="Rectangle 2"/>
+          <p:cNvSpPr/>
           <p:nvPr/>
         </p:nvSpPr>
         <p:spPr>
           <a:xfrm>
-            <a:off x="7905907" y="1216417"/>
-            <a:ext cx="3600292" cy="461665"/>
+            <a:off x="6117240" y="1180640"/>
+            <a:ext cx="5388959" cy="1969770"/>
           </a:xfrm>
           <a:prstGeom prst="rect">
             <a:avLst/>
           </a:prstGeom>
-          <a:noFill/>
-        </p:spPr>
-        <p:txBody>
-          <a:bodyPr wrap="square" rtlCol="0">
+        </p:spPr>
+        <p:txBody>
+          <a:bodyPr wrap="square">
             <a:spAutoFit/>
           </a:bodyPr>
           <a:lstStyle/>
           <a:p>
             <a:r>
-              <a:rPr lang="en-US" sz="2400" dirty="0" smtClean="0"/>
-              <a:t>1.5. Overview</a:t>
-            </a:r>
-            <a:endParaRPr lang="en-US" sz="2400" dirty="0"/>
+              <a:rPr lang="en-US" sz="2400" b="1" u="sng" dirty="0"/>
+              <a:t>1.3 Intender Audience</a:t>
+            </a:r>
+          </a:p>
+          <a:p>
+            <a:endParaRPr lang="en-US" b="1" u="sng" dirty="0"/>
+          </a:p>
+          <a:p>
+            <a:pPr lvl="1"/>
+            <a:r>
+              <a:rPr lang="en-US" sz="2000" dirty="0"/>
+              <a:t>To be read by the customer, development team, the project managers, testers, documentation writers and end users. </a:t>
+            </a:r>
+          </a:p>
+        </p:txBody>
+      </p:sp>
+      <p:sp>
+        <p:nvSpPr>
+          <p:cNvPr id="7" name="Rectangle 6"/>
+          <p:cNvSpPr/>
+          <p:nvPr/>
+        </p:nvSpPr>
+        <p:spPr>
+          <a:xfrm>
+            <a:off x="6117240" y="3171264"/>
+            <a:ext cx="5388959" cy="1969770"/>
+          </a:xfrm>
+          <a:prstGeom prst="rect">
+            <a:avLst/>
+          </a:prstGeom>
+        </p:spPr>
+        <p:txBody>
+          <a:bodyPr wrap="square">
+            <a:spAutoFit/>
+          </a:bodyPr>
+          <a:lstStyle/>
+          <a:p>
+            <a:r>
+              <a:rPr lang="en-US" sz="2400" b="1" u="sng" dirty="0" smtClean="0"/>
+              <a:t>1.4  References</a:t>
+            </a:r>
+            <a:endParaRPr lang="en-US" sz="2400" b="1" u="sng" dirty="0"/>
+          </a:p>
+          <a:p>
+            <a:endParaRPr lang="en-US" b="1" u="sng" dirty="0"/>
+          </a:p>
+          <a:p>
+            <a:pPr lvl="1"/>
+            <a:r>
+              <a:rPr lang="en-US" sz="2000" dirty="0"/>
+              <a:t>To be read by the customer, development team, the project managers, testers, documentation writers and end users. </a:t>
+            </a:r>
+          </a:p>
+        </p:txBody>
+      </p:sp>
+      <p:sp>
+        <p:nvSpPr>
+          <p:cNvPr id="8" name="Rectangle 7"/>
+          <p:cNvSpPr/>
+          <p:nvPr/>
+        </p:nvSpPr>
+        <p:spPr>
+          <a:xfrm>
+            <a:off x="6117241" y="5510365"/>
+            <a:ext cx="4226324" cy="738664"/>
+          </a:xfrm>
+          <a:prstGeom prst="rect">
+            <a:avLst/>
+          </a:prstGeom>
+        </p:spPr>
+        <p:txBody>
+          <a:bodyPr wrap="square">
+            <a:spAutoFit/>
+          </a:bodyPr>
+          <a:lstStyle/>
+          <a:p>
+            <a:r>
+              <a:rPr lang="en-US" sz="2400" b="1" u="sng" dirty="0" smtClean="0"/>
+              <a:t>1.5 Overview</a:t>
+            </a:r>
+            <a:endParaRPr lang="en-US" sz="2400" b="1" u="sng" dirty="0"/>
+          </a:p>
+          <a:p>
+            <a:endParaRPr lang="en-US" b="1" u="sng" dirty="0"/>
           </a:p>
         </p:txBody>
       </p:sp>
@@ -7595,13 +7519,13 @@
   <p:clrMapOvr>
     <a:masterClrMapping/>
   </p:clrMapOvr>
-  <mc:AlternateContent xmlns:mc="http://schemas.openxmlformats.org/markup-compatibility/2006">
-    <mc:Choice xmlns:p14="http://schemas.microsoft.com/office/powerpoint/2010/main" Requires="p14">
+  <mc:AlternateContent xmlns:mc="http://schemas.openxmlformats.org/markup-compatibility/2006" xmlns:p14="http://schemas.microsoft.com/office/powerpoint/2010/main">
+    <mc:Choice Requires="p14">
       <p:transition spd="slow">
         <p14:reveal/>
       </p:transition>
     </mc:Choice>
-    <mc:Fallback>
+    <mc:Fallback xmlns="">
       <p:transition spd="slow">
         <p:fade/>
       </p:transition>
@@ -7610,7 +7534,7 @@
   <p:timing>
     <p:tnLst>
       <p:par>
-        <p:cTn id="1" dur="indefinite" restart="never" nodeType="tmRoot"/>
+        <p:cTn xmlns:p14="http://schemas.microsoft.com/office/powerpoint/2010/main" id="1" dur="indefinite" restart="never" nodeType="tmRoot"/>
       </p:par>
     </p:tnLst>
   </p:timing>
@@ -7752,13 +7676,13 @@
   <p:clrMapOvr>
     <a:masterClrMapping/>
   </p:clrMapOvr>
-  <mc:AlternateContent xmlns:mc="http://schemas.openxmlformats.org/markup-compatibility/2006">
-    <mc:Choice xmlns:p14="http://schemas.microsoft.com/office/powerpoint/2010/main" Requires="p14">
+  <mc:AlternateContent xmlns:mc="http://schemas.openxmlformats.org/markup-compatibility/2006" xmlns:p14="http://schemas.microsoft.com/office/powerpoint/2010/main">
+    <mc:Choice Requires="p14">
       <p:transition spd="slow">
         <p14:reveal/>
       </p:transition>
     </mc:Choice>
-    <mc:Fallback>
+    <mc:Fallback xmlns="">
       <p:transition spd="slow">
         <p:fade/>
       </p:transition>
@@ -7767,7 +7691,7 @@
   <p:timing>
     <p:tnLst>
       <p:par>
-        <p:cTn id="1" dur="indefinite" restart="never" nodeType="tmRoot"/>
+        <p:cTn xmlns:p14="http://schemas.microsoft.com/office/powerpoint/2010/main" id="1" dur="indefinite" restart="never" nodeType="tmRoot"/>
       </p:par>
     </p:tnLst>
   </p:timing>
@@ -7934,13 +7858,13 @@
   <p:clrMapOvr>
     <a:masterClrMapping/>
   </p:clrMapOvr>
-  <mc:AlternateContent xmlns:mc="http://schemas.openxmlformats.org/markup-compatibility/2006">
-    <mc:Choice xmlns:p14="http://schemas.microsoft.com/office/powerpoint/2010/main" Requires="p14">
+  <mc:AlternateContent xmlns:mc="http://schemas.openxmlformats.org/markup-compatibility/2006" xmlns:p14="http://schemas.microsoft.com/office/powerpoint/2010/main">
+    <mc:Choice Requires="p14">
       <p:transition spd="slow">
         <p14:reveal/>
       </p:transition>
     </mc:Choice>
-    <mc:Fallback>
+    <mc:Fallback xmlns="">
       <p:transition spd="slow">
         <p:fade/>
       </p:transition>
@@ -7949,7 +7873,7 @@
   <p:timing>
     <p:tnLst>
       <p:par>
-        <p:cTn id="1" dur="indefinite" restart="never" nodeType="tmRoot"/>
+        <p:cTn xmlns:p14="http://schemas.microsoft.com/office/powerpoint/2010/main" id="1" dur="indefinite" restart="never" nodeType="tmRoot"/>
       </p:par>
     </p:tnLst>
   </p:timing>
@@ -8116,13 +8040,13 @@
   <p:clrMapOvr>
     <a:masterClrMapping/>
   </p:clrMapOvr>
-  <mc:AlternateContent xmlns:mc="http://schemas.openxmlformats.org/markup-compatibility/2006">
-    <mc:Choice xmlns:p14="http://schemas.microsoft.com/office/powerpoint/2010/main" Requires="p14">
+  <mc:AlternateContent xmlns:mc="http://schemas.openxmlformats.org/markup-compatibility/2006" xmlns:p14="http://schemas.microsoft.com/office/powerpoint/2010/main">
+    <mc:Choice Requires="p14">
       <p:transition spd="slow">
         <p14:reveal/>
       </p:transition>
     </mc:Choice>
-    <mc:Fallback>
+    <mc:Fallback xmlns="">
       <p:transition spd="slow">
         <p:fade/>
       </p:transition>
@@ -8131,7 +8055,7 @@
   <p:timing>
     <p:tnLst>
       <p:par>
-        <p:cTn id="1" dur="indefinite" restart="never" nodeType="tmRoot"/>
+        <p:cTn xmlns:p14="http://schemas.microsoft.com/office/powerpoint/2010/main" id="1" dur="indefinite" restart="never" nodeType="tmRoot"/>
       </p:par>
     </p:tnLst>
   </p:timing>
@@ -8255,11 +8179,7 @@
             </a:r>
             <a:r>
               <a:rPr lang="en-US" dirty="0"/>
-              <a:t>of </a:t>
-            </a:r>
-            <a:r>
-              <a:rPr lang="en-US" dirty="0"/>
-              <a:t>T</a:t>
+              <a:t>of T</a:t>
             </a:r>
             <a:r>
               <a:rPr lang="en-US" dirty="0" smtClean="0"/>
@@ -8396,13 +8316,13 @@
   <p:clrMapOvr>
     <a:masterClrMapping/>
   </p:clrMapOvr>
-  <mc:AlternateContent xmlns:mc="http://schemas.openxmlformats.org/markup-compatibility/2006">
-    <mc:Choice xmlns:p14="http://schemas.microsoft.com/office/powerpoint/2010/main" Requires="p14">
+  <mc:AlternateContent xmlns:mc="http://schemas.openxmlformats.org/markup-compatibility/2006" xmlns:p14="http://schemas.microsoft.com/office/powerpoint/2010/main">
+    <mc:Choice Requires="p14">
       <p:transition spd="slow">
         <p14:reveal/>
       </p:transition>
     </mc:Choice>
-    <mc:Fallback>
+    <mc:Fallback xmlns="">
       <p:transition spd="slow">
         <p:fade/>
       </p:transition>
@@ -8411,7 +8331,7 @@
   <p:timing>
     <p:tnLst>
       <p:par>
-        <p:cTn id="1" dur="indefinite" restart="never" nodeType="tmRoot"/>
+        <p:cTn xmlns:p14="http://schemas.microsoft.com/office/powerpoint/2010/main" id="1" dur="indefinite" restart="never" nodeType="tmRoot"/>
       </p:par>
     </p:tnLst>
   </p:timing>
@@ -8482,48 +8402,28 @@
             <a:pPr lvl="1"/>
             <a:r>
               <a:rPr lang="en-US" dirty="0" smtClean="0"/>
-              <a:t>Requirements </a:t>
-            </a:r>
-            <a:r>
-              <a:rPr lang="en-US" dirty="0" smtClean="0"/>
-              <a:t>for the Admin </a:t>
+              <a:t>Requirements for the Admin </a:t>
             </a:r>
           </a:p>
           <a:p>
             <a:pPr lvl="1"/>
             <a:r>
               <a:rPr lang="en-US" dirty="0" smtClean="0"/>
-              <a:t>General </a:t>
-            </a:r>
-            <a:r>
-              <a:rPr lang="en-US" dirty="0" smtClean="0"/>
-              <a:t>System Features </a:t>
+              <a:t>General System Features </a:t>
             </a:r>
           </a:p>
           <a:p>
             <a:pPr lvl="1"/>
             <a:r>
               <a:rPr lang="en-US" dirty="0" smtClean="0"/>
-              <a:t>Teacher </a:t>
-            </a:r>
-            <a:r>
-              <a:rPr lang="en-US" dirty="0" smtClean="0"/>
-              <a:t>System Features</a:t>
+              <a:t>Teacher System Features</a:t>
             </a:r>
           </a:p>
           <a:p>
             <a:pPr lvl="1"/>
             <a:r>
               <a:rPr lang="en-US" dirty="0" smtClean="0"/>
-              <a:t>Student </a:t>
-            </a:r>
-            <a:r>
-              <a:rPr lang="en-US" dirty="0" smtClean="0"/>
-              <a:t>System </a:t>
-            </a:r>
-            <a:r>
-              <a:rPr lang="en-US" dirty="0" smtClean="0"/>
-              <a:t>Features</a:t>
+              <a:t>Student System Features</a:t>
             </a:r>
           </a:p>
           <a:p>
@@ -8540,22 +8440,14 @@
             <a:pPr lvl="1"/>
             <a:r>
               <a:rPr lang="en-US" dirty="0" smtClean="0"/>
-              <a:t>OS </a:t>
-            </a:r>
-            <a:r>
-              <a:rPr lang="en-US" dirty="0" smtClean="0"/>
-              <a:t>systems it should run on </a:t>
+              <a:t>OS systems it should run on </a:t>
             </a:r>
           </a:p>
           <a:p>
             <a:pPr lvl="1"/>
             <a:r>
               <a:rPr lang="en-US" dirty="0" smtClean="0"/>
-              <a:t>System </a:t>
-            </a:r>
-            <a:r>
-              <a:rPr lang="en-US" dirty="0" smtClean="0"/>
-              <a:t>should have access to a printer</a:t>
+              <a:t>System should have access to a printer</a:t>
             </a:r>
           </a:p>
         </p:txBody>
@@ -8570,13 +8462,13 @@
   <p:clrMapOvr>
     <a:masterClrMapping/>
   </p:clrMapOvr>
-  <mc:AlternateContent xmlns:mc="http://schemas.openxmlformats.org/markup-compatibility/2006">
-    <mc:Choice xmlns:p14="http://schemas.microsoft.com/office/powerpoint/2010/main" Requires="p14">
+  <mc:AlternateContent xmlns:mc="http://schemas.openxmlformats.org/markup-compatibility/2006" xmlns:p14="http://schemas.microsoft.com/office/powerpoint/2010/main">
+    <mc:Choice Requires="p14">
       <p:transition spd="slow">
         <p14:reveal/>
       </p:transition>
     </mc:Choice>
-    <mc:Fallback>
+    <mc:Fallback xmlns="">
       <p:transition spd="slow">
         <p:fade/>
       </p:transition>
@@ -8585,7 +8477,7 @@
   <p:timing>
     <p:tnLst>
       <p:par>
-        <p:cTn id="1" dur="indefinite" restart="never" nodeType="tmRoot"/>
+        <p:cTn xmlns:p14="http://schemas.microsoft.com/office/powerpoint/2010/main" id="1" dur="indefinite" restart="never" nodeType="tmRoot"/>
       </p:par>
     </p:tnLst>
   </p:timing>
@@ -8649,11 +8541,7 @@
           <a:p>
             <a:r>
               <a:rPr lang="en-US" b="1" u="sng" dirty="0" smtClean="0"/>
-              <a:t>3.3 Software </a:t>
-            </a:r>
-            <a:r>
-              <a:rPr lang="en-US" b="1" u="sng" dirty="0" smtClean="0"/>
-              <a:t>Interfaces</a:t>
+              <a:t>3.3 Software Interfaces</a:t>
             </a:r>
             <a:endParaRPr lang="en-US" b="1" u="sng" dirty="0"/>
           </a:p>
@@ -8661,41 +8549,21 @@
             <a:pPr lvl="1"/>
             <a:r>
               <a:rPr lang="en-US" dirty="0" smtClean="0"/>
-              <a:t>will </a:t>
-            </a:r>
-            <a:r>
-              <a:rPr lang="en-US" dirty="0" smtClean="0"/>
-              <a:t>interface with a </a:t>
-            </a:r>
-            <a:r>
-              <a:rPr lang="en-US" dirty="0" smtClean="0"/>
-              <a:t>database</a:t>
+              <a:t>will interface with a database</a:t>
             </a:r>
           </a:p>
           <a:p>
             <a:pPr lvl="1"/>
             <a:r>
               <a:rPr lang="en-US" dirty="0" smtClean="0"/>
-              <a:t>interface </a:t>
-            </a:r>
-            <a:r>
-              <a:rPr lang="en-US" dirty="0" smtClean="0"/>
-              <a:t>with </a:t>
-            </a:r>
-            <a:r>
-              <a:rPr lang="en-US" dirty="0" smtClean="0"/>
-              <a:t>an API for the creation of PDFs</a:t>
+              <a:t>interface with an API for the creation of PDFs</a:t>
             </a:r>
           </a:p>
           <a:p>
             <a:pPr lvl="1"/>
             <a:r>
               <a:rPr lang="en-US" dirty="0" smtClean="0"/>
-              <a:t>interface </a:t>
-            </a:r>
-            <a:r>
-              <a:rPr lang="en-US" dirty="0" smtClean="0"/>
-              <a:t>with Adobe Reader</a:t>
+              <a:t>interface with Adobe Reader</a:t>
             </a:r>
             <a:endParaRPr lang="en-US" dirty="0"/>
           </a:p>
@@ -8711,13 +8579,13 @@
   <p:clrMapOvr>
     <a:masterClrMapping/>
   </p:clrMapOvr>
-  <mc:AlternateContent xmlns:mc="http://schemas.openxmlformats.org/markup-compatibility/2006">
-    <mc:Choice xmlns:p14="http://schemas.microsoft.com/office/powerpoint/2010/main" Requires="p14">
+  <mc:AlternateContent xmlns:mc="http://schemas.openxmlformats.org/markup-compatibility/2006" xmlns:p14="http://schemas.microsoft.com/office/powerpoint/2010/main">
+    <mc:Choice Requires="p14">
       <p:transition spd="slow">
         <p14:reveal/>
       </p:transition>
     </mc:Choice>
-    <mc:Fallback>
+    <mc:Fallback xmlns="">
       <p:transition spd="slow">
         <p:fade/>
       </p:transition>
@@ -8726,7 +8594,7 @@
   <p:timing>
     <p:tnLst>
       <p:par>
-        <p:cTn id="1" dur="indefinite" restart="never" nodeType="tmRoot"/>
+        <p:cTn xmlns:p14="http://schemas.microsoft.com/office/powerpoint/2010/main" id="1" dur="indefinite" restart="never" nodeType="tmRoot"/>
       </p:par>
     </p:tnLst>
   </p:timing>
@@ -8997,7 +8865,7 @@
   <a:extraClrSchemeLst/>
   <a:extLst>
     <a:ext uri="{05A4C25C-085E-4340-85A3-A5531E510DB2}">
-      <thm15:themeFamily xmlns:thm15="http://schemas.microsoft.com/office/thememl/2012/main" name="Vapor Trail" id="{4FDF2955-7D9C-493C-B9F9-C205151B46CD}" vid="{8F31A783-2159-4870-BC29-2BA7D038EA44}"/>
+      <thm15:themeFamily xmlns:thm15="http://schemas.microsoft.com/office/thememl/2012/main" xmlns="" name="Vapor Trail" id="{4FDF2955-7D9C-493C-B9F9-C205151B46CD}" vid="{8F31A783-2159-4870-BC29-2BA7D038EA44}"/>
     </a:ext>
   </a:extLst>
 </a:theme>

</xml_diff>

<commit_message>
Update Section 4 of presentation
Updated with most up-to-date requirements
</commit_message>
<xml_diff>
--- a/Presentation Elementary Engineers .pptx
+++ b/Presentation Elementary Engineers .pptx
@@ -17,10 +17,11 @@
     <p:sldId id="261" r:id="rId11"/>
     <p:sldId id="262" r:id="rId12"/>
     <p:sldId id="263" r:id="rId13"/>
-    <p:sldId id="264" r:id="rId14"/>
-    <p:sldId id="265" r:id="rId15"/>
-    <p:sldId id="266" r:id="rId16"/>
-    <p:sldId id="271" r:id="rId17"/>
+    <p:sldId id="272" r:id="rId14"/>
+    <p:sldId id="264" r:id="rId15"/>
+    <p:sldId id="265" r:id="rId16"/>
+    <p:sldId id="266" r:id="rId17"/>
+    <p:sldId id="271" r:id="rId18"/>
   </p:sldIdLst>
   <p:sldSz cx="12192000" cy="6858000"/>
   <p:notesSz cx="6858000" cy="9144000"/>
@@ -121,7 +122,7 @@
   </p:defaultTextStyle>
   <p:extLst>
     <p:ext uri="{EFAFB233-063F-42B5-8137-9DF3F51BA10A}">
-      <p15:sldGuideLst xmlns:p15="http://schemas.microsoft.com/office/powerpoint/2012/main" xmlns="">
+      <p15:sldGuideLst xmlns:p15="http://schemas.microsoft.com/office/powerpoint/2012/main">
         <p15:guide id="1" orient="horz" pos="2160">
           <p15:clr>
             <a:srgbClr val="A4A3A4"/>
@@ -5936,15 +5937,7 @@
             </a:br>
             <a:r>
               <a:rPr lang="en-US" sz="4800" dirty="0" smtClean="0"/>
-              <a:t>for</a:t>
-            </a:r>
-            <a:r>
-              <a:rPr lang="en-US" sz="4800" dirty="0" smtClean="0"/>
-              <a:t> </a:t>
-            </a:r>
-            <a:r>
-              <a:rPr lang="en-US" sz="4800" dirty="0" smtClean="0"/>
-              <a:t/>
+              <a:t>for </a:t>
             </a:r>
             <a:br>
               <a:rPr lang="en-US" sz="4800" dirty="0" smtClean="0"/>
@@ -6050,7 +6043,7 @@
   <p:timing>
     <p:tnLst>
       <p:par>
-        <p:cTn xmlns:p14="http://schemas.microsoft.com/office/powerpoint/2010/main" id="1" dur="indefinite" restart="never" nodeType="tmRoot"/>
+        <p:cTn id="1" dur="indefinite" restart="never" nodeType="tmRoot"/>
       </p:par>
     </p:tnLst>
   </p:timing>
@@ -6199,7 +6192,7 @@
   <p:timing>
     <p:tnLst>
       <p:par>
-        <p:cTn xmlns:p14="http://schemas.microsoft.com/office/powerpoint/2010/main" id="1" dur="indefinite" restart="never" nodeType="tmRoot"/>
+        <p:cTn id="1" dur="indefinite" restart="never" nodeType="tmRoot"/>
       </p:par>
     </p:tnLst>
   </p:timing>
@@ -6263,8 +6256,13 @@
           <a:p>
             <a:r>
               <a:rPr lang="en-US" b="1" u="sng" dirty="0" smtClean="0"/>
-              <a:t>4.2 General System features</a:t>
-            </a:r>
+              <a:t>4.2 General System </a:t>
+            </a:r>
+            <a:r>
+              <a:rPr lang="en-US" b="1" u="sng" dirty="0" smtClean="0"/>
+              <a:t>Features</a:t>
+            </a:r>
+            <a:endParaRPr lang="en-US" b="1" u="sng" dirty="0" smtClean="0"/>
           </a:p>
           <a:p>
             <a:pPr lvl="1"/>
@@ -6291,35 +6289,58 @@
             <a:pPr lvl="1"/>
             <a:r>
               <a:rPr lang="en-US" dirty="0" smtClean="0"/>
-              <a:t>4.2.4 Tutorial content</a:t>
-            </a:r>
+              <a:t>4.2.4 </a:t>
+            </a:r>
+            <a:r>
+              <a:rPr lang="en-US" dirty="0" smtClean="0"/>
+              <a:t>Worksheet Difficult</a:t>
+            </a:r>
+            <a:endParaRPr lang="en-US" dirty="0" smtClean="0"/>
           </a:p>
           <a:p>
             <a:pPr lvl="1"/>
             <a:r>
               <a:rPr lang="en-US" dirty="0" smtClean="0"/>
-              <a:t>Random Exercise Generation </a:t>
+              <a:t>4</a:t>
+            </a:r>
+            <a:r>
+              <a:rPr lang="en-US" dirty="0" smtClean="0"/>
+              <a:t>.2.5 Worksheet Types</a:t>
             </a:r>
           </a:p>
           <a:p>
             <a:pPr lvl="1"/>
             <a:r>
               <a:rPr lang="en-US" dirty="0" smtClean="0"/>
-              <a:t>Worksheet Instructions </a:t>
+              <a:t>4.2.6 Tutorial Content</a:t>
             </a:r>
           </a:p>
           <a:p>
             <a:pPr lvl="1"/>
             <a:r>
               <a:rPr lang="en-US" dirty="0" smtClean="0"/>
-              <a:t>PDF Options</a:t>
+              <a:t>4.2.7 Random Exercise Generation</a:t>
             </a:r>
           </a:p>
           <a:p>
             <a:pPr lvl="1"/>
             <a:r>
               <a:rPr lang="en-US" dirty="0" smtClean="0"/>
-              <a:t>Search Features </a:t>
+              <a:t>4.2.8 Worksheet Instructions</a:t>
+            </a:r>
+          </a:p>
+          <a:p>
+            <a:pPr lvl="1"/>
+            <a:r>
+              <a:rPr lang="en-US" dirty="0" smtClean="0"/>
+              <a:t>4.2.9 Worksheet Output</a:t>
+            </a:r>
+          </a:p>
+          <a:p>
+            <a:pPr lvl="1"/>
+            <a:r>
+              <a:rPr lang="en-US" dirty="0" smtClean="0"/>
+              <a:t>4.2.10 Search Feature</a:t>
             </a:r>
             <a:endParaRPr lang="en-US" dirty="0"/>
           </a:p>
@@ -6350,7 +6371,7 @@
   <p:timing>
     <p:tnLst>
       <p:par>
-        <p:cTn xmlns:p14="http://schemas.microsoft.com/office/powerpoint/2010/main" id="1" dur="indefinite" restart="never" nodeType="tmRoot"/>
+        <p:cTn id="1" dur="indefinite" restart="never" nodeType="tmRoot"/>
       </p:par>
     </p:tnLst>
   </p:timing>
@@ -6460,8 +6481,13 @@
             </a:pPr>
             <a:r>
               <a:rPr lang="en-US" dirty="0" smtClean="0"/>
-              <a:t>4.3.4 Worksheet Parameter Option</a:t>
-            </a:r>
+              <a:t>4.3.4 Worksheet Parameter </a:t>
+            </a:r>
+            <a:r>
+              <a:rPr lang="en-US" dirty="0" smtClean="0"/>
+              <a:t>Options</a:t>
+            </a:r>
+            <a:endParaRPr lang="en-US" dirty="0" smtClean="0"/>
           </a:p>
           <a:p>
             <a:pPr lvl="1">
@@ -6546,7 +6572,7 @@
   <p:timing>
     <p:tnLst>
       <p:par>
-        <p:cTn xmlns:p14="http://schemas.microsoft.com/office/powerpoint/2010/main" id="1" dur="indefinite" restart="never" nodeType="tmRoot"/>
+        <p:cTn id="1" dur="indefinite" restart="never" nodeType="tmRoot"/>
       </p:par>
     </p:tnLst>
   </p:timing>
@@ -6554,6 +6580,114 @@
 </file>
 
 <file path=ppt/slides/slide13.xml><?xml version="1.0" encoding="utf-8"?>
+<p:sld xmlns:a="http://schemas.openxmlformats.org/drawingml/2006/main" xmlns:r="http://schemas.openxmlformats.org/officeDocument/2006/relationships" xmlns:p="http://schemas.openxmlformats.org/presentationml/2006/main">
+  <p:cSld>
+    <p:spTree>
+      <p:nvGrpSpPr>
+        <p:cNvPr id="1" name=""/>
+        <p:cNvGrpSpPr/>
+        <p:nvPr/>
+      </p:nvGrpSpPr>
+      <p:grpSpPr>
+        <a:xfrm>
+          <a:off x="0" y="0"/>
+          <a:ext cx="0" cy="0"/>
+          <a:chOff x="0" y="0"/>
+          <a:chExt cx="0" cy="0"/>
+        </a:xfrm>
+      </p:grpSpPr>
+      <p:sp>
+        <p:nvSpPr>
+          <p:cNvPr id="2" name="Title 1"/>
+          <p:cNvSpPr>
+            <a:spLocks noGrp="1"/>
+          </p:cNvSpPr>
+          <p:nvPr>
+            <p:ph type="title"/>
+          </p:nvPr>
+        </p:nvSpPr>
+        <p:spPr/>
+        <p:txBody>
+          <a:bodyPr/>
+          <a:lstStyle/>
+          <a:p>
+            <a:r>
+              <a:rPr lang="en-US" dirty="0"/>
+              <a:t>System requirements continued</a:t>
+            </a:r>
+          </a:p>
+        </p:txBody>
+      </p:sp>
+      <p:sp>
+        <p:nvSpPr>
+          <p:cNvPr id="3" name="Content Placeholder 2"/>
+          <p:cNvSpPr>
+            <a:spLocks noGrp="1"/>
+          </p:cNvSpPr>
+          <p:nvPr>
+            <p:ph idx="1"/>
+          </p:nvPr>
+        </p:nvSpPr>
+        <p:spPr/>
+        <p:txBody>
+          <a:bodyPr/>
+          <a:lstStyle/>
+          <a:p>
+            <a:r>
+              <a:rPr lang="en-US" b="1" u="sng" dirty="0" smtClean="0"/>
+              <a:t>4.4 Student System Features</a:t>
+            </a:r>
+          </a:p>
+          <a:p>
+            <a:pPr lvl="1"/>
+            <a:r>
+              <a:rPr lang="en-US" dirty="0" smtClean="0"/>
+              <a:t>4.4.1 Student System Access</a:t>
+            </a:r>
+          </a:p>
+          <a:p>
+            <a:pPr lvl="1"/>
+            <a:r>
+              <a:rPr lang="en-US" dirty="0" smtClean="0"/>
+              <a:t>4.4.2 Student Password Reset</a:t>
+            </a:r>
+          </a:p>
+          <a:p>
+            <a:pPr lvl="1"/>
+            <a:r>
+              <a:rPr lang="en-US" dirty="0" smtClean="0"/>
+              <a:t>4.4.3 Student Worksheet Option</a:t>
+            </a:r>
+            <a:endParaRPr lang="en-US" dirty="0"/>
+          </a:p>
+        </p:txBody>
+      </p:sp>
+    </p:spTree>
+    <p:extLst>
+      <p:ext uri="{BB962C8B-B14F-4D97-AF65-F5344CB8AC3E}">
+        <p14:creationId xmlns:p14="http://schemas.microsoft.com/office/powerpoint/2010/main" val="1385868404"/>
+      </p:ext>
+    </p:extLst>
+  </p:cSld>
+  <p:clrMapOvr>
+    <a:masterClrMapping/>
+  </p:clrMapOvr>
+  <mc:AlternateContent xmlns:mc="http://schemas.openxmlformats.org/markup-compatibility/2006" xmlns:p14="http://schemas.microsoft.com/office/powerpoint/2010/main">
+    <mc:Choice Requires="p14">
+      <p:transition spd="slow">
+        <p14:reveal/>
+      </p:transition>
+    </mc:Choice>
+    <mc:Fallback xmlns="">
+      <p:transition spd="slow">
+        <p:fade/>
+      </p:transition>
+    </mc:Fallback>
+  </mc:AlternateContent>
+</p:sld>
+</file>
+
+<file path=ppt/slides/slide14.xml><?xml version="1.0" encoding="utf-8"?>
 <p:sld xmlns:a="http://schemas.openxmlformats.org/drawingml/2006/main" xmlns:r="http://schemas.openxmlformats.org/officeDocument/2006/relationships" xmlns:p="http://schemas.openxmlformats.org/presentationml/2006/main">
   <p:cSld>
     <p:spTree>
@@ -6727,14 +6861,14 @@
   <p:timing>
     <p:tnLst>
       <p:par>
-        <p:cTn xmlns:p14="http://schemas.microsoft.com/office/powerpoint/2010/main" id="1" dur="indefinite" restart="never" nodeType="tmRoot"/>
+        <p:cTn id="1" dur="indefinite" restart="never" nodeType="tmRoot"/>
       </p:par>
     </p:tnLst>
   </p:timing>
 </p:sld>
 </file>
 
-<file path=ppt/slides/slide14.xml><?xml version="1.0" encoding="utf-8"?>
+<file path=ppt/slides/slide15.xml><?xml version="1.0" encoding="utf-8"?>
 <p:sld xmlns:a="http://schemas.openxmlformats.org/drawingml/2006/main" xmlns:r="http://schemas.openxmlformats.org/officeDocument/2006/relationships" xmlns:p="http://schemas.openxmlformats.org/presentationml/2006/main">
   <p:cSld>
     <p:spTree>
@@ -6870,14 +7004,14 @@
   <p:timing>
     <p:tnLst>
       <p:par>
-        <p:cTn xmlns:p14="http://schemas.microsoft.com/office/powerpoint/2010/main" id="1" dur="indefinite" restart="never" nodeType="tmRoot"/>
+        <p:cTn id="1" dur="indefinite" restart="never" nodeType="tmRoot"/>
       </p:par>
     </p:tnLst>
   </p:timing>
 </p:sld>
 </file>
 
-<file path=ppt/slides/slide15.xml><?xml version="1.0" encoding="utf-8"?>
+<file path=ppt/slides/slide16.xml><?xml version="1.0" encoding="utf-8"?>
 <p:sld xmlns:a="http://schemas.openxmlformats.org/drawingml/2006/main" xmlns:r="http://schemas.openxmlformats.org/officeDocument/2006/relationships" xmlns:p="http://schemas.openxmlformats.org/presentationml/2006/main">
   <p:cSld>
     <p:spTree>
@@ -7031,14 +7165,14 @@
   <p:timing>
     <p:tnLst>
       <p:par>
-        <p:cTn xmlns:p14="http://schemas.microsoft.com/office/powerpoint/2010/main" id="1" dur="indefinite" restart="never" nodeType="tmRoot"/>
+        <p:cTn id="1" dur="indefinite" restart="never" nodeType="tmRoot"/>
       </p:par>
     </p:tnLst>
   </p:timing>
 </p:sld>
 </file>
 
-<file path=ppt/slides/slide16.xml><?xml version="1.0" encoding="utf-8"?>
+<file path=ppt/slides/slide17.xml><?xml version="1.0" encoding="utf-8"?>
 <p:sld xmlns:a="http://schemas.openxmlformats.org/drawingml/2006/main" xmlns:r="http://schemas.openxmlformats.org/officeDocument/2006/relationships" xmlns:p="http://schemas.openxmlformats.org/presentationml/2006/main">
   <p:cSld>
     <p:spTree>
@@ -7132,7 +7266,7 @@
   <p:timing>
     <p:tnLst>
       <p:par>
-        <p:cTn xmlns:p14="http://schemas.microsoft.com/office/powerpoint/2010/main" id="1" dur="indefinite" restart="never" nodeType="tmRoot"/>
+        <p:cTn id="1" dur="indefinite" restart="never" nodeType="tmRoot"/>
       </p:par>
     </p:tnLst>
   </p:timing>
@@ -7322,7 +7456,7 @@
   <p:timing>
     <p:tnLst>
       <p:par>
-        <p:cTn xmlns:p14="http://schemas.microsoft.com/office/powerpoint/2010/main" id="1" dur="indefinite" restart="never" nodeType="tmRoot"/>
+        <p:cTn id="1" dur="indefinite" restart="never" nodeType="tmRoot"/>
       </p:par>
     </p:tnLst>
   </p:timing>
@@ -7534,7 +7668,7 @@
   <p:timing>
     <p:tnLst>
       <p:par>
-        <p:cTn xmlns:p14="http://schemas.microsoft.com/office/powerpoint/2010/main" id="1" dur="indefinite" restart="never" nodeType="tmRoot"/>
+        <p:cTn id="1" dur="indefinite" restart="never" nodeType="tmRoot"/>
       </p:par>
     </p:tnLst>
   </p:timing>
@@ -7691,7 +7825,7 @@
   <p:timing>
     <p:tnLst>
       <p:par>
-        <p:cTn xmlns:p14="http://schemas.microsoft.com/office/powerpoint/2010/main" id="1" dur="indefinite" restart="never" nodeType="tmRoot"/>
+        <p:cTn id="1" dur="indefinite" restart="never" nodeType="tmRoot"/>
       </p:par>
     </p:tnLst>
   </p:timing>
@@ -7873,7 +8007,7 @@
   <p:timing>
     <p:tnLst>
       <p:par>
-        <p:cTn xmlns:p14="http://schemas.microsoft.com/office/powerpoint/2010/main" id="1" dur="indefinite" restart="never" nodeType="tmRoot"/>
+        <p:cTn id="1" dur="indefinite" restart="never" nodeType="tmRoot"/>
       </p:par>
     </p:tnLst>
   </p:timing>
@@ -8055,7 +8189,7 @@
   <p:timing>
     <p:tnLst>
       <p:par>
-        <p:cTn xmlns:p14="http://schemas.microsoft.com/office/powerpoint/2010/main" id="1" dur="indefinite" restart="never" nodeType="tmRoot"/>
+        <p:cTn id="1" dur="indefinite" restart="never" nodeType="tmRoot"/>
       </p:par>
     </p:tnLst>
   </p:timing>
@@ -8331,7 +8465,7 @@
   <p:timing>
     <p:tnLst>
       <p:par>
-        <p:cTn xmlns:p14="http://schemas.microsoft.com/office/powerpoint/2010/main" id="1" dur="indefinite" restart="never" nodeType="tmRoot"/>
+        <p:cTn id="1" dur="indefinite" restart="never" nodeType="tmRoot"/>
       </p:par>
     </p:tnLst>
   </p:timing>
@@ -8477,7 +8611,7 @@
   <p:timing>
     <p:tnLst>
       <p:par>
-        <p:cTn xmlns:p14="http://schemas.microsoft.com/office/powerpoint/2010/main" id="1" dur="indefinite" restart="never" nodeType="tmRoot"/>
+        <p:cTn id="1" dur="indefinite" restart="never" nodeType="tmRoot"/>
       </p:par>
     </p:tnLst>
   </p:timing>
@@ -8594,7 +8728,7 @@
   <p:timing>
     <p:tnLst>
       <p:par>
-        <p:cTn xmlns:p14="http://schemas.microsoft.com/office/powerpoint/2010/main" id="1" dur="indefinite" restart="never" nodeType="tmRoot"/>
+        <p:cTn id="1" dur="indefinite" restart="never" nodeType="tmRoot"/>
       </p:par>
     </p:tnLst>
   </p:timing>
@@ -8865,7 +8999,7 @@
   <a:extraClrSchemeLst/>
   <a:extLst>
     <a:ext uri="{05A4C25C-085E-4340-85A3-A5531E510DB2}">
-      <thm15:themeFamily xmlns:thm15="http://schemas.microsoft.com/office/thememl/2012/main" xmlns="" name="Vapor Trail" id="{4FDF2955-7D9C-493C-B9F9-C205151B46CD}" vid="{8F31A783-2159-4870-BC29-2BA7D038EA44}"/>
+      <thm15:themeFamily xmlns:thm15="http://schemas.microsoft.com/office/thememl/2012/main" name="Vapor Trail" id="{4FDF2955-7D9C-493C-B9F9-C205151B46CD}" vid="{8F31A783-2159-4870-BC29-2BA7D038EA44}"/>
     </a:ext>
   </a:extLst>
 </a:theme>

</xml_diff>

<commit_message>
Added some references to Introduction
</commit_message>
<xml_diff>
--- a/Presentation Elementary Engineers .pptx
+++ b/Presentation Elementary Engineers .pptx
@@ -122,7 +122,7 @@
   </p:defaultTextStyle>
   <p:extLst>
     <p:ext uri="{EFAFB233-063F-42B5-8137-9DF3F51BA10A}">
-      <p15:sldGuideLst xmlns:p15="http://schemas.microsoft.com/office/powerpoint/2012/main">
+      <p15:sldGuideLst xmlns:p15="http://schemas.microsoft.com/office/powerpoint/2012/main" xmlns="">
         <p15:guide id="1" orient="horz" pos="2160">
           <p15:clr>
             <a:srgbClr val="A4A3A4"/>
@@ -6043,7 +6043,7 @@
   <p:timing>
     <p:tnLst>
       <p:par>
-        <p:cTn id="1" dur="indefinite" restart="never" nodeType="tmRoot"/>
+        <p:cTn xmlns:p14="http://schemas.microsoft.com/office/powerpoint/2010/main" id="1" dur="indefinite" restart="never" nodeType="tmRoot"/>
       </p:par>
     </p:tnLst>
   </p:timing>
@@ -6192,7 +6192,7 @@
   <p:timing>
     <p:tnLst>
       <p:par>
-        <p:cTn id="1" dur="indefinite" restart="never" nodeType="tmRoot"/>
+        <p:cTn xmlns:p14="http://schemas.microsoft.com/office/powerpoint/2010/main" id="1" dur="indefinite" restart="never" nodeType="tmRoot"/>
       </p:par>
     </p:tnLst>
   </p:timing>
@@ -6256,13 +6256,8 @@
           <a:p>
             <a:r>
               <a:rPr lang="en-US" b="1" u="sng" dirty="0" smtClean="0"/>
-              <a:t>4.2 General System </a:t>
-            </a:r>
-            <a:r>
-              <a:rPr lang="en-US" b="1" u="sng" dirty="0" smtClean="0"/>
-              <a:t>Features</a:t>
-            </a:r>
-            <a:endParaRPr lang="en-US" b="1" u="sng" dirty="0" smtClean="0"/>
+              <a:t>4.2 General System Features</a:t>
+            </a:r>
           </a:p>
           <a:p>
             <a:pPr lvl="1"/>
@@ -6289,23 +6284,14 @@
             <a:pPr lvl="1"/>
             <a:r>
               <a:rPr lang="en-US" dirty="0" smtClean="0"/>
-              <a:t>4.2.4 </a:t>
-            </a:r>
-            <a:r>
-              <a:rPr lang="en-US" dirty="0" smtClean="0"/>
-              <a:t>Worksheet Difficult</a:t>
-            </a:r>
-            <a:endParaRPr lang="en-US" dirty="0" smtClean="0"/>
+              <a:t>4.2.4 Worksheet Difficult</a:t>
+            </a:r>
           </a:p>
           <a:p>
             <a:pPr lvl="1"/>
             <a:r>
               <a:rPr lang="en-US" dirty="0" smtClean="0"/>
-              <a:t>4</a:t>
-            </a:r>
-            <a:r>
-              <a:rPr lang="en-US" dirty="0" smtClean="0"/>
-              <a:t>.2.5 Worksheet Types</a:t>
+              <a:t>4.2.5 Worksheet Types</a:t>
             </a:r>
           </a:p>
           <a:p>
@@ -6371,7 +6357,7 @@
   <p:timing>
     <p:tnLst>
       <p:par>
-        <p:cTn id="1" dur="indefinite" restart="never" nodeType="tmRoot"/>
+        <p:cTn xmlns:p14="http://schemas.microsoft.com/office/powerpoint/2010/main" id="1" dur="indefinite" restart="never" nodeType="tmRoot"/>
       </p:par>
     </p:tnLst>
   </p:timing>
@@ -6481,13 +6467,8 @@
             </a:pPr>
             <a:r>
               <a:rPr lang="en-US" dirty="0" smtClean="0"/>
-              <a:t>4.3.4 Worksheet Parameter </a:t>
-            </a:r>
-            <a:r>
-              <a:rPr lang="en-US" dirty="0" smtClean="0"/>
-              <a:t>Options</a:t>
-            </a:r>
-            <a:endParaRPr lang="en-US" dirty="0" smtClean="0"/>
+              <a:t>4.3.4 Worksheet Parameter Options</a:t>
+            </a:r>
           </a:p>
           <a:p>
             <a:pPr lvl="1">
@@ -6572,7 +6553,7 @@
   <p:timing>
     <p:tnLst>
       <p:par>
-        <p:cTn id="1" dur="indefinite" restart="never" nodeType="tmRoot"/>
+        <p:cTn xmlns:p14="http://schemas.microsoft.com/office/powerpoint/2010/main" id="1" dur="indefinite" restart="never" nodeType="tmRoot"/>
       </p:par>
     </p:tnLst>
   </p:timing>
@@ -6861,7 +6842,7 @@
   <p:timing>
     <p:tnLst>
       <p:par>
-        <p:cTn id="1" dur="indefinite" restart="never" nodeType="tmRoot"/>
+        <p:cTn xmlns:p14="http://schemas.microsoft.com/office/powerpoint/2010/main" id="1" dur="indefinite" restart="never" nodeType="tmRoot"/>
       </p:par>
     </p:tnLst>
   </p:timing>
@@ -7004,7 +6985,7 @@
   <p:timing>
     <p:tnLst>
       <p:par>
-        <p:cTn id="1" dur="indefinite" restart="never" nodeType="tmRoot"/>
+        <p:cTn xmlns:p14="http://schemas.microsoft.com/office/powerpoint/2010/main" id="1" dur="indefinite" restart="never" nodeType="tmRoot"/>
       </p:par>
     </p:tnLst>
   </p:timing>
@@ -7165,7 +7146,7 @@
   <p:timing>
     <p:tnLst>
       <p:par>
-        <p:cTn id="1" dur="indefinite" restart="never" nodeType="tmRoot"/>
+        <p:cTn xmlns:p14="http://schemas.microsoft.com/office/powerpoint/2010/main" id="1" dur="indefinite" restart="never" nodeType="tmRoot"/>
       </p:par>
     </p:tnLst>
   </p:timing>
@@ -7266,7 +7247,7 @@
   <p:timing>
     <p:tnLst>
       <p:par>
-        <p:cTn id="1" dur="indefinite" restart="never" nodeType="tmRoot"/>
+        <p:cTn xmlns:p14="http://schemas.microsoft.com/office/powerpoint/2010/main" id="1" dur="indefinite" restart="never" nodeType="tmRoot"/>
       </p:par>
     </p:tnLst>
   </p:timing>
@@ -7456,7 +7437,7 @@
   <p:timing>
     <p:tnLst>
       <p:par>
-        <p:cTn id="1" dur="indefinite" restart="never" nodeType="tmRoot"/>
+        <p:cTn xmlns:p14="http://schemas.microsoft.com/office/powerpoint/2010/main" id="1" dur="indefinite" restart="never" nodeType="tmRoot"/>
       </p:par>
     </p:tnLst>
   </p:timing>
@@ -7581,7 +7562,7 @@
         <p:spPr>
           <a:xfrm>
             <a:off x="6117240" y="3171264"/>
-            <a:ext cx="5388959" cy="1969770"/>
+            <a:ext cx="5388959" cy="2400657"/>
           </a:xfrm>
           <a:prstGeom prst="rect">
             <a:avLst/>
@@ -7603,10 +7584,23 @@
             <a:endParaRPr lang="en-US" b="1" u="sng" dirty="0"/>
           </a:p>
           <a:p>
-            <a:pPr lvl="1"/>
-            <a:r>
-              <a:rPr lang="en-US" sz="2000" dirty="0"/>
-              <a:t>To be read by the customer, development team, the project managers, testers, documentation writers and end users. </a:t>
+            <a:r>
+              <a:rPr lang="en-US" dirty="0"/>
+              <a:t>1] IEEE Software Engineering Standards Committee, “IEEE </a:t>
+            </a:r>
+            <a:r>
+              <a:rPr lang="en-US" dirty="0" err="1"/>
+              <a:t>Std</a:t>
+            </a:r>
+            <a:r>
+              <a:rPr lang="en-US" dirty="0"/>
+              <a:t> 830-1998, IEEE Recommended Practice for Software Requirements Specifications”, October 20, 1998.</a:t>
+            </a:r>
+          </a:p>
+          <a:p>
+            <a:r>
+              <a:rPr lang="en-US" dirty="0"/>
+              <a:t>[2] –[5]</a:t>
             </a:r>
           </a:p>
         </p:txBody>
@@ -7668,7 +7662,7 @@
   <p:timing>
     <p:tnLst>
       <p:par>
-        <p:cTn id="1" dur="indefinite" restart="never" nodeType="tmRoot"/>
+        <p:cTn xmlns:p14="http://schemas.microsoft.com/office/powerpoint/2010/main" id="1" dur="indefinite" restart="never" nodeType="tmRoot"/>
       </p:par>
     </p:tnLst>
   </p:timing>
@@ -7825,7 +7819,7 @@
   <p:timing>
     <p:tnLst>
       <p:par>
-        <p:cTn id="1" dur="indefinite" restart="never" nodeType="tmRoot"/>
+        <p:cTn xmlns:p14="http://schemas.microsoft.com/office/powerpoint/2010/main" id="1" dur="indefinite" restart="never" nodeType="tmRoot"/>
       </p:par>
     </p:tnLst>
   </p:timing>
@@ -8007,7 +8001,7 @@
   <p:timing>
     <p:tnLst>
       <p:par>
-        <p:cTn id="1" dur="indefinite" restart="never" nodeType="tmRoot"/>
+        <p:cTn xmlns:p14="http://schemas.microsoft.com/office/powerpoint/2010/main" id="1" dur="indefinite" restart="never" nodeType="tmRoot"/>
       </p:par>
     </p:tnLst>
   </p:timing>
@@ -8189,7 +8183,7 @@
   <p:timing>
     <p:tnLst>
       <p:par>
-        <p:cTn id="1" dur="indefinite" restart="never" nodeType="tmRoot"/>
+        <p:cTn xmlns:p14="http://schemas.microsoft.com/office/powerpoint/2010/main" id="1" dur="indefinite" restart="never" nodeType="tmRoot"/>
       </p:par>
     </p:tnLst>
   </p:timing>
@@ -8465,7 +8459,7 @@
   <p:timing>
     <p:tnLst>
       <p:par>
-        <p:cTn id="1" dur="indefinite" restart="never" nodeType="tmRoot"/>
+        <p:cTn xmlns:p14="http://schemas.microsoft.com/office/powerpoint/2010/main" id="1" dur="indefinite" restart="never" nodeType="tmRoot"/>
       </p:par>
     </p:tnLst>
   </p:timing>
@@ -8611,7 +8605,7 @@
   <p:timing>
     <p:tnLst>
       <p:par>
-        <p:cTn id="1" dur="indefinite" restart="never" nodeType="tmRoot"/>
+        <p:cTn xmlns:p14="http://schemas.microsoft.com/office/powerpoint/2010/main" id="1" dur="indefinite" restart="never" nodeType="tmRoot"/>
       </p:par>
     </p:tnLst>
   </p:timing>
@@ -8728,7 +8722,7 @@
   <p:timing>
     <p:tnLst>
       <p:par>
-        <p:cTn id="1" dur="indefinite" restart="never" nodeType="tmRoot"/>
+        <p:cTn xmlns:p14="http://schemas.microsoft.com/office/powerpoint/2010/main" id="1" dur="indefinite" restart="never" nodeType="tmRoot"/>
       </p:par>
     </p:tnLst>
   </p:timing>
@@ -8999,7 +8993,7 @@
   <a:extraClrSchemeLst/>
   <a:extLst>
     <a:ext uri="{05A4C25C-085E-4340-85A3-A5531E510DB2}">
-      <thm15:themeFamily xmlns:thm15="http://schemas.microsoft.com/office/thememl/2012/main" name="Vapor Trail" id="{4FDF2955-7D9C-493C-B9F9-C205151B46CD}" vid="{8F31A783-2159-4870-BC29-2BA7D038EA44}"/>
+      <thm15:themeFamily xmlns:thm15="http://schemas.microsoft.com/office/thememl/2012/main" xmlns="" name="Vapor Trail" id="{4FDF2955-7D9C-493C-B9F9-C205151B46CD}" vid="{8F31A783-2159-4870-BC29-2BA7D038EA44}"/>
     </a:ext>
   </a:extLst>
 </a:theme>

</xml_diff>